<commit_message>
Add high-level descriptions for non-technical players
- Add plain language descriptions for all 10 measures explaining what they do
- Add simple level explanations showing what improves at each level
- Add detailed event descriptions with background explanations
- Update slide layouts to display new descriptions prominently
- Keep bonus values hidden as requested
</commit_message>
<xml_diff>
--- a/pptx_output/Events.pptx
+++ b/pptx_output/Events.pptx
@@ -3237,7 +3237,7 @@
         <p:spPr>
           <a:xfrm>
             <a:off x="0" y="0"/>
-            <a:ext cx="9144000" cy="1645920"/>
+            <a:ext cx="9144000" cy="1371600"/>
           </a:xfrm>
           <a:prstGeom prst="rect">
             <a:avLst/>
@@ -3279,8 +3279,8 @@
         </p:nvSpPr>
         <p:spPr>
           <a:xfrm>
-            <a:off x="457200" y="274320"/>
-            <a:ext cx="8229600" cy="731520"/>
+            <a:off x="457200" y="182880"/>
+            <a:ext cx="8229600" cy="548640"/>
           </a:xfrm>
           <a:prstGeom prst="rect">
             <a:avLst/>
@@ -3294,7 +3294,7 @@
           <a:lstStyle/>
           <a:p>
             <a:pPr algn="ctr">
-              <a:defRPr sz="4000" b="1">
+              <a:defRPr sz="3600" b="1">
                 <a:solidFill>
                   <a:srgbClr val="FFFFFF"/>
                 </a:solidFill>
@@ -3314,7 +3314,7 @@
         </p:nvSpPr>
         <p:spPr>
           <a:xfrm>
-            <a:off x="457200" y="1051560"/>
+            <a:off x="457200" y="777240"/>
             <a:ext cx="8229600" cy="457200"/>
           </a:xfrm>
           <a:prstGeom prst="rect">
@@ -3329,7 +3329,7 @@
           <a:lstStyle/>
           <a:p>
             <a:pPr algn="ctr">
-              <a:defRPr sz="2000">
+              <a:defRPr sz="1800">
                 <a:solidFill>
                   <a:srgbClr val="FFFFFF"/>
                 </a:solidFill>
@@ -3349,8 +3349,8 @@
         </p:nvSpPr>
         <p:spPr>
           <a:xfrm>
-            <a:off x="457200" y="2011680"/>
-            <a:ext cx="8229600" cy="914400"/>
+            <a:off x="457200" y="1554480"/>
+            <a:ext cx="8229600" cy="822960"/>
           </a:xfrm>
           <a:prstGeom prst="rect">
             <a:avLst/>
@@ -3364,14 +3364,14 @@
           <a:lstStyle/>
           <a:p>
             <a:pPr algn="ctr">
-              <a:defRPr sz="2200">
+              <a:defRPr sz="1800">
                 <a:solidFill>
                   <a:srgbClr val="343A40"/>
                 </a:solidFill>
               </a:defRPr>
             </a:pPr>
             <a:r>
-              <a:t>OEM-Audit prüft Sicherheitsstandards</a:t>
+              <a:t>Der große Automobilkunde prüft die Sicherheitsstandards. Wer gut vorbereitet ist, gewinnt Vertrauen - wer schlecht abschneidet, riskiert Aufträge.</a:t>
             </a:r>
           </a:p>
         </p:txBody>
@@ -3384,8 +3384,8 @@
         </p:nvSpPr>
         <p:spPr>
           <a:xfrm>
-            <a:off x="457200" y="3108960"/>
-            <a:ext cx="8229600" cy="1097280"/>
+            <a:off x="457200" y="2514600"/>
+            <a:ext cx="8229600" cy="1188720"/>
           </a:xfrm>
           <a:prstGeom prst="roundRect">
             <a:avLst/>
@@ -3429,8 +3429,8 @@
         </p:nvSpPr>
         <p:spPr>
           <a:xfrm>
-            <a:off x="640080" y="3200400"/>
-            <a:ext cx="7863840" cy="914400"/>
+            <a:off x="640080" y="2606040"/>
+            <a:ext cx="7863840" cy="1005840"/>
           </a:xfrm>
           <a:prstGeom prst="rect">
             <a:avLst/>
@@ -3444,7 +3444,7 @@
           <a:lstStyle/>
           <a:p>
             <a:pPr>
-              <a:defRPr sz="1600" b="1">
+              <a:defRPr sz="1400" b="1">
                 <a:solidFill>
                   <a:srgbClr val="343A40"/>
                 </a:solidFill>
@@ -3456,14 +3456,14 @@
           </a:p>
           <a:p>
             <a:pPr>
-              <a:defRPr sz="1800">
+              <a:defRPr sz="1600">
                 <a:solidFill>
                   <a:srgbClr val="005293"/>
                 </a:solidFill>
               </a:defRPr>
             </a:pPr>
             <a:r>
-              <a:t>Nach Welle 1: E-Wert ≥ Zielwert?</a:t>
+              <a:t>Wurde der Sicherheits-Zielwert nach Welle 1 erreicht?</a:t>
             </a:r>
           </a:p>
         </p:txBody>
@@ -3476,8 +3476,8 @@
         </p:nvSpPr>
         <p:spPr>
           <a:xfrm>
-            <a:off x="457200" y="4480560"/>
-            <a:ext cx="3931920" cy="1097280"/>
+            <a:off x="457200" y="3840480"/>
+            <a:ext cx="3931920" cy="1280160"/>
           </a:xfrm>
           <a:prstGeom prst="roundRect">
             <a:avLst/>
@@ -3519,8 +3519,8 @@
         </p:nvSpPr>
         <p:spPr>
           <a:xfrm>
-            <a:off x="640080" y="4617720"/>
-            <a:ext cx="3566160" cy="822960"/>
+            <a:off x="594360" y="3931920"/>
+            <a:ext cx="3657600" cy="1097280"/>
           </a:xfrm>
           <a:prstGeom prst="rect">
             <a:avLst/>
@@ -3534,7 +3534,7 @@
           <a:lstStyle/>
           <a:p>
             <a:pPr>
-              <a:defRPr sz="1400" b="1">
+              <a:defRPr sz="1300" b="1">
                 <a:solidFill>
                   <a:srgbClr val="FFFFFF"/>
                 </a:solidFill>
@@ -3546,7 +3546,7 @@
           </a:p>
           <a:p>
             <a:pPr>
-              <a:defRPr sz="2000" b="1">
+              <a:defRPr sz="1800" b="1">
                 <a:solidFill>
                   <a:srgbClr val="FFFFFF"/>
                 </a:solidFill>
@@ -3566,8 +3566,8 @@
         </p:nvSpPr>
         <p:spPr>
           <a:xfrm>
-            <a:off x="4754880" y="4480560"/>
-            <a:ext cx="3931920" cy="1097280"/>
+            <a:off x="4754880" y="3840480"/>
+            <a:ext cx="3931920" cy="1280160"/>
           </a:xfrm>
           <a:prstGeom prst="roundRect">
             <a:avLst/>
@@ -3609,8 +3609,8 @@
         </p:nvSpPr>
         <p:spPr>
           <a:xfrm>
-            <a:off x="4937760" y="4617720"/>
-            <a:ext cx="3566160" cy="822960"/>
+            <a:off x="4892040" y="3931920"/>
+            <a:ext cx="3657600" cy="1097280"/>
           </a:xfrm>
           <a:prstGeom prst="rect">
             <a:avLst/>
@@ -3624,7 +3624,7 @@
           <a:lstStyle/>
           <a:p>
             <a:pPr>
-              <a:defRPr sz="1400" b="1">
+              <a:defRPr sz="1300" b="1">
                 <a:solidFill>
                   <a:srgbClr val="FFFFFF"/>
                 </a:solidFill>
@@ -3636,7 +3636,7 @@
           </a:p>
           <a:p>
             <a:pPr>
-              <a:defRPr sz="2000" b="1">
+              <a:defRPr sz="1800" b="1">
                 <a:solidFill>
                   <a:srgbClr val="FFFFFF"/>
                 </a:solidFill>
@@ -3644,6 +3644,41 @@
             </a:pPr>
             <a:r>
               <a:t>KZ -3</a:t>
+            </a:r>
+          </a:p>
+        </p:txBody>
+      </p:sp>
+      <p:sp>
+        <p:nvSpPr>
+          <p:cNvPr id="12" name="TextBox 11"/>
+          <p:cNvSpPr txBox="1"/>
+          <p:nvPr/>
+        </p:nvSpPr>
+        <p:spPr>
+          <a:xfrm>
+            <a:off x="457200" y="5303520"/>
+            <a:ext cx="8229600" cy="731520"/>
+          </a:xfrm>
+          <a:prstGeom prst="rect">
+            <a:avLst/>
+          </a:prstGeom>
+          <a:noFill/>
+        </p:spPr>
+        <p:txBody>
+          <a:bodyPr wrap="square">
+            <a:spAutoFit/>
+          </a:bodyPr>
+          <a:lstStyle/>
+          <a:p>
+            <a:pPr algn="ctr">
+              <a:defRPr sz="1400" i="1">
+                <a:solidFill>
+                  <a:srgbClr val="343A40"/>
+                </a:solidFill>
+              </a:defRPr>
+            </a:pPr>
+            <a:r>
+              <a:t>Hintergrund: Bestanden: Kundenvertrauen steigt deutlich. Nicht bestanden: Vertrauen sinkt, Folgeaufträge gefährdet.</a:t>
             </a:r>
           </a:p>
         </p:txBody>
@@ -3675,7 +3710,7 @@
         <p:spPr>
           <a:xfrm>
             <a:off x="0" y="0"/>
-            <a:ext cx="9144000" cy="1645920"/>
+            <a:ext cx="9144000" cy="1371600"/>
           </a:xfrm>
           <a:prstGeom prst="rect">
             <a:avLst/>
@@ -3717,8 +3752,8 @@
         </p:nvSpPr>
         <p:spPr>
           <a:xfrm>
-            <a:off x="457200" y="274320"/>
-            <a:ext cx="8229600" cy="731520"/>
+            <a:off x="457200" y="182880"/>
+            <a:ext cx="8229600" cy="548640"/>
           </a:xfrm>
           <a:prstGeom prst="rect">
             <a:avLst/>
@@ -3732,7 +3767,7 @@
           <a:lstStyle/>
           <a:p>
             <a:pPr algn="ctr">
-              <a:defRPr sz="4000" b="1">
+              <a:defRPr sz="3600" b="1">
                 <a:solidFill>
                   <a:srgbClr val="FFFFFF"/>
                 </a:solidFill>
@@ -3752,7 +3787,7 @@
         </p:nvSpPr>
         <p:spPr>
           <a:xfrm>
-            <a:off x="457200" y="1051560"/>
+            <a:off x="457200" y="777240"/>
             <a:ext cx="8229600" cy="457200"/>
           </a:xfrm>
           <a:prstGeom prst="rect">
@@ -3767,7 +3802,7 @@
           <a:lstStyle/>
           <a:p>
             <a:pPr algn="ctr">
-              <a:defRPr sz="2000">
+              <a:defRPr sz="1800">
                 <a:solidFill>
                   <a:srgbClr val="FFFFFF"/>
                 </a:solidFill>
@@ -3787,8 +3822,8 @@
         </p:nvSpPr>
         <p:spPr>
           <a:xfrm>
-            <a:off x="457200" y="2011680"/>
-            <a:ext cx="8229600" cy="914400"/>
+            <a:off x="457200" y="1554480"/>
+            <a:ext cx="8229600" cy="822960"/>
           </a:xfrm>
           <a:prstGeom prst="rect">
             <a:avLst/>
@@ -3802,14 +3837,14 @@
           <a:lstStyle/>
           <a:p>
             <a:pPr algn="ctr">
-              <a:defRPr sz="2200">
+              <a:defRPr sz="1800">
                 <a:solidFill>
                   <a:srgbClr val="343A40"/>
                 </a:solidFill>
               </a:defRPr>
             </a:pPr>
             <a:r>
-              <a:t>Personalwechsel erfordert Einarbeitung</a:t>
+              <a:t>Ohne regelmäßige Schulungen und Sensibilisierung werden IT-Sicherheitsaufgaben zur Belastung. Überlastete Mitarbeiter verlassen das Unternehmen.</a:t>
             </a:r>
           </a:p>
         </p:txBody>
@@ -3822,8 +3857,8 @@
         </p:nvSpPr>
         <p:spPr>
           <a:xfrm>
-            <a:off x="457200" y="3108960"/>
-            <a:ext cx="8229600" cy="1097280"/>
+            <a:off x="457200" y="2514600"/>
+            <a:ext cx="8229600" cy="1188720"/>
           </a:xfrm>
           <a:prstGeom prst="roundRect">
             <a:avLst/>
@@ -3867,8 +3902,8 @@
         </p:nvSpPr>
         <p:spPr>
           <a:xfrm>
-            <a:off x="640080" y="3200400"/>
-            <a:ext cx="7863840" cy="914400"/>
+            <a:off x="640080" y="2606040"/>
+            <a:ext cx="7863840" cy="1005840"/>
           </a:xfrm>
           <a:prstGeom prst="rect">
             <a:avLst/>
@@ -3882,7 +3917,7 @@
           <a:lstStyle/>
           <a:p>
             <a:pPr>
-              <a:defRPr sz="1600" b="1">
+              <a:defRPr sz="1400" b="1">
                 <a:solidFill>
                   <a:srgbClr val="343A40"/>
                 </a:solidFill>
@@ -3894,14 +3929,14 @@
           </a:p>
           <a:p>
             <a:pPr>
-              <a:defRPr sz="1800">
+              <a:defRPr sz="1600">
                 <a:solidFill>
                   <a:srgbClr val="005293"/>
                 </a:solidFill>
               </a:defRPr>
             </a:pPr>
             <a:r>
-              <a:t>M6 (Security Awareness) &lt; Level 2?</a:t>
+              <a:t>Wurden die Mitarbeiter nicht ausreichend geschult (Awareness unter Level 2)?</a:t>
             </a:r>
           </a:p>
         </p:txBody>
@@ -3914,8 +3949,8 @@
         </p:nvSpPr>
         <p:spPr>
           <a:xfrm>
-            <a:off x="4754880" y="4480560"/>
-            <a:ext cx="3931920" cy="1097280"/>
+            <a:off x="2286000" y="3840480"/>
+            <a:ext cx="4572000" cy="1280160"/>
           </a:xfrm>
           <a:prstGeom prst="roundRect">
             <a:avLst/>
@@ -3957,8 +3992,8 @@
         </p:nvSpPr>
         <p:spPr>
           <a:xfrm>
-            <a:off x="4937760" y="4617720"/>
-            <a:ext cx="3566160" cy="822960"/>
+            <a:off x="2423160" y="3931920"/>
+            <a:ext cx="4297680" cy="1097280"/>
           </a:xfrm>
           <a:prstGeom prst="rect">
             <a:avLst/>
@@ -3972,7 +4007,7 @@
           <a:lstStyle/>
           <a:p>
             <a:pPr>
-              <a:defRPr sz="1400" b="1">
+              <a:defRPr sz="1300" b="1">
                 <a:solidFill>
                   <a:srgbClr val="FFFFFF"/>
                 </a:solidFill>
@@ -3984,7 +4019,7 @@
           </a:p>
           <a:p>
             <a:pPr>
-              <a:defRPr sz="2000" b="1">
+              <a:defRPr sz="1800" b="1">
                 <a:solidFill>
                   <a:srgbClr val="FFFFFF"/>
                 </a:solidFill>
@@ -3992,6 +4027,41 @@
             </a:pPr>
             <a:r>
               <a:t>KZ -2, OPEX +5k€</a:t>
+            </a:r>
+          </a:p>
+        </p:txBody>
+      </p:sp>
+      <p:sp>
+        <p:nvSpPr>
+          <p:cNvPr id="10" name="TextBox 9"/>
+          <p:cNvSpPr txBox="1"/>
+          <p:nvPr/>
+        </p:nvSpPr>
+        <p:spPr>
+          <a:xfrm>
+            <a:off x="457200" y="5303520"/>
+            <a:ext cx="8229600" cy="731520"/>
+          </a:xfrm>
+          <a:prstGeom prst="rect">
+            <a:avLst/>
+          </a:prstGeom>
+          <a:noFill/>
+        </p:spPr>
+        <p:txBody>
+          <a:bodyPr wrap="square">
+            <a:spAutoFit/>
+          </a:bodyPr>
+          <a:lstStyle/>
+          <a:p>
+            <a:pPr algn="ctr">
+              <a:defRPr sz="1400" i="1">
+                <a:solidFill>
+                  <a:srgbClr val="343A40"/>
+                </a:solidFill>
+              </a:defRPr>
+            </a:pPr>
+            <a:r>
+              <a:t>Hintergrund: Fluktuation kostet Geld (Einarbeitung) und Know-how geht verloren.</a:t>
             </a:r>
           </a:p>
         </p:txBody>
@@ -4023,7 +4093,7 @@
         <p:spPr>
           <a:xfrm>
             <a:off x="0" y="0"/>
-            <a:ext cx="9144000" cy="1645920"/>
+            <a:ext cx="9144000" cy="1371600"/>
           </a:xfrm>
           <a:prstGeom prst="rect">
             <a:avLst/>
@@ -4065,8 +4135,8 @@
         </p:nvSpPr>
         <p:spPr>
           <a:xfrm>
-            <a:off x="457200" y="274320"/>
-            <a:ext cx="8229600" cy="731520"/>
+            <a:off x="457200" y="182880"/>
+            <a:ext cx="8229600" cy="548640"/>
           </a:xfrm>
           <a:prstGeom prst="rect">
             <a:avLst/>
@@ -4080,7 +4150,7 @@
           <a:lstStyle/>
           <a:p>
             <a:pPr algn="ctr">
-              <a:defRPr sz="4000" b="1">
+              <a:defRPr sz="3600" b="1">
                 <a:solidFill>
                   <a:srgbClr val="FFFFFF"/>
                 </a:solidFill>
@@ -4100,7 +4170,7 @@
         </p:nvSpPr>
         <p:spPr>
           <a:xfrm>
-            <a:off x="457200" y="1051560"/>
+            <a:off x="457200" y="777240"/>
             <a:ext cx="8229600" cy="457200"/>
           </a:xfrm>
           <a:prstGeom prst="rect">
@@ -4115,7 +4185,7 @@
           <a:lstStyle/>
           <a:p>
             <a:pPr algn="ctr">
-              <a:defRPr sz="2000">
+              <a:defRPr sz="1800">
                 <a:solidFill>
                   <a:srgbClr val="FFFFFF"/>
                 </a:solidFill>
@@ -4135,8 +4205,8 @@
         </p:nvSpPr>
         <p:spPr>
           <a:xfrm>
-            <a:off x="457200" y="2011680"/>
-            <a:ext cx="8229600" cy="914400"/>
+            <a:off x="457200" y="1554480"/>
+            <a:ext cx="8229600" cy="822960"/>
           </a:xfrm>
           <a:prstGeom prst="rect">
             <a:avLst/>
@@ -4150,14 +4220,14 @@
           <a:lstStyle/>
           <a:p>
             <a:pPr algn="ctr">
-              <a:defRPr sz="2200">
+              <a:defRPr sz="1800">
                 <a:solidFill>
                   <a:srgbClr val="343A40"/>
                 </a:solidFill>
               </a:defRPr>
             </a:pPr>
             <a:r>
-              <a:t>DSGVO-Konformität wird belohnt</a:t>
+              <a:t>Gute Zugriffskontrolle und Logging sind die Basis für Datenschutz-Compliance. Wer hier investiert hat, wird belohnt.</a:t>
             </a:r>
           </a:p>
         </p:txBody>
@@ -4170,8 +4240,8 @@
         </p:nvSpPr>
         <p:spPr>
           <a:xfrm>
-            <a:off x="457200" y="3108960"/>
-            <a:ext cx="8229600" cy="1097280"/>
+            <a:off x="457200" y="2514600"/>
+            <a:ext cx="8229600" cy="1188720"/>
           </a:xfrm>
           <a:prstGeom prst="roundRect">
             <a:avLst/>
@@ -4215,8 +4285,8 @@
         </p:nvSpPr>
         <p:spPr>
           <a:xfrm>
-            <a:off x="640080" y="3200400"/>
-            <a:ext cx="7863840" cy="914400"/>
+            <a:off x="640080" y="2606040"/>
+            <a:ext cx="7863840" cy="1005840"/>
           </a:xfrm>
           <a:prstGeom prst="rect">
             <a:avLst/>
@@ -4230,7 +4300,7 @@
           <a:lstStyle/>
           <a:p>
             <a:pPr>
-              <a:defRPr sz="1600" b="1">
+              <a:defRPr sz="1400" b="1">
                 <a:solidFill>
                   <a:srgbClr val="343A40"/>
                 </a:solidFill>
@@ -4242,14 +4312,14 @@
           </a:p>
           <a:p>
             <a:pPr>
-              <a:defRPr sz="1800">
+              <a:defRPr sz="1600">
                 <a:solidFill>
                   <a:srgbClr val="005293"/>
                 </a:solidFill>
               </a:defRPr>
             </a:pPr>
             <a:r>
-              <a:t>M1 ≥ L2 UND M2 ≥ L2?</a:t>
+              <a:t>Sind Zugriffskontrolle (M1) UND Logging (M2) mindestens auf Level 2?</a:t>
             </a:r>
           </a:p>
         </p:txBody>
@@ -4262,8 +4332,8 @@
         </p:nvSpPr>
         <p:spPr>
           <a:xfrm>
-            <a:off x="457200" y="4480560"/>
-            <a:ext cx="3931920" cy="1097280"/>
+            <a:off x="2286000" y="3840480"/>
+            <a:ext cx="4572000" cy="1280160"/>
           </a:xfrm>
           <a:prstGeom prst="roundRect">
             <a:avLst/>
@@ -4305,8 +4375,8 @@
         </p:nvSpPr>
         <p:spPr>
           <a:xfrm>
-            <a:off x="640080" y="4617720"/>
-            <a:ext cx="3566160" cy="822960"/>
+            <a:off x="2423160" y="3931920"/>
+            <a:ext cx="4297680" cy="1097280"/>
           </a:xfrm>
           <a:prstGeom prst="rect">
             <a:avLst/>
@@ -4320,7 +4390,7 @@
           <a:lstStyle/>
           <a:p>
             <a:pPr>
-              <a:defRPr sz="1400" b="1">
+              <a:defRPr sz="1300" b="1">
                 <a:solidFill>
                   <a:srgbClr val="FFFFFF"/>
                 </a:solidFill>
@@ -4332,7 +4402,7 @@
           </a:p>
           <a:p>
             <a:pPr>
-              <a:defRPr sz="2000" b="1">
+              <a:defRPr sz="1800" b="1">
                 <a:solidFill>
                   <a:srgbClr val="FFFFFF"/>
                 </a:solidFill>
@@ -4340,6 +4410,41 @@
             </a:pPr>
             <a:r>
               <a:t>KZ +3, Budget +10k€</a:t>
+            </a:r>
+          </a:p>
+        </p:txBody>
+      </p:sp>
+      <p:sp>
+        <p:nvSpPr>
+          <p:cNvPr id="10" name="TextBox 9"/>
+          <p:cNvSpPr txBox="1"/>
+          <p:nvPr/>
+        </p:nvSpPr>
+        <p:spPr>
+          <a:xfrm>
+            <a:off x="457200" y="5303520"/>
+            <a:ext cx="8229600" cy="731520"/>
+          </a:xfrm>
+          <a:prstGeom prst="rect">
+            <a:avLst/>
+          </a:prstGeom>
+          <a:noFill/>
+        </p:spPr>
+        <p:txBody>
+          <a:bodyPr wrap="square">
+            <a:spAutoFit/>
+          </a:bodyPr>
+          <a:lstStyle/>
+          <a:p>
+            <a:pPr algn="ctr">
+              <a:defRPr sz="1400" i="1">
+                <a:solidFill>
+                  <a:srgbClr val="343A40"/>
+                </a:solidFill>
+              </a:defRPr>
+            </a:pPr>
+            <a:r>
+              <a:t>Hintergrund: Compliance-Nachweis erleichtert Kundengewinnung und spart Bußgelder.</a:t>
             </a:r>
           </a:p>
         </p:txBody>
@@ -4371,7 +4476,7 @@
         <p:spPr>
           <a:xfrm>
             <a:off x="0" y="0"/>
-            <a:ext cx="9144000" cy="1645920"/>
+            <a:ext cx="9144000" cy="1371600"/>
           </a:xfrm>
           <a:prstGeom prst="rect">
             <a:avLst/>
@@ -4413,8 +4518,8 @@
         </p:nvSpPr>
         <p:spPr>
           <a:xfrm>
-            <a:off x="457200" y="274320"/>
-            <a:ext cx="8229600" cy="731520"/>
+            <a:off x="457200" y="182880"/>
+            <a:ext cx="8229600" cy="548640"/>
           </a:xfrm>
           <a:prstGeom prst="rect">
             <a:avLst/>
@@ -4428,7 +4533,7 @@
           <a:lstStyle/>
           <a:p>
             <a:pPr algn="ctr">
-              <a:defRPr sz="4000" b="1">
+              <a:defRPr sz="3600" b="1">
                 <a:solidFill>
                   <a:srgbClr val="FFFFFF"/>
                 </a:solidFill>
@@ -4448,7 +4553,7 @@
         </p:nvSpPr>
         <p:spPr>
           <a:xfrm>
-            <a:off x="457200" y="1051560"/>
+            <a:off x="457200" y="777240"/>
             <a:ext cx="8229600" cy="457200"/>
           </a:xfrm>
           <a:prstGeom prst="rect">
@@ -4463,7 +4568,7 @@
           <a:lstStyle/>
           <a:p>
             <a:pPr algn="ctr">
-              <a:defRPr sz="2000">
+              <a:defRPr sz="1800">
                 <a:solidFill>
                   <a:srgbClr val="FFFFFF"/>
                 </a:solidFill>
@@ -4483,8 +4588,8 @@
         </p:nvSpPr>
         <p:spPr>
           <a:xfrm>
-            <a:off x="457200" y="2011680"/>
-            <a:ext cx="8229600" cy="914400"/>
+            <a:off x="457200" y="1554480"/>
+            <a:ext cx="8229600" cy="822960"/>
           </a:xfrm>
           <a:prstGeom prst="rect">
             <a:avLst/>
@@ -4498,14 +4603,14 @@
           <a:lstStyle/>
           <a:p>
             <a:pPr algn="ctr">
-              <a:defRPr sz="2200">
+              <a:defRPr sz="1800">
                 <a:solidFill>
                   <a:srgbClr val="343A40"/>
                 </a:solidFill>
               </a:defRPr>
             </a:pPr>
             <a:r>
-              <a:t>Hohe Sicherheitsinvestitionen stärken Investorenvertrauen und Marktposition</a:t>
+              <a:t>Wer viel in Sicherheit investiert, zeigt Weitsicht. Das überzeugt Investoren und Geldgeber.</a:t>
             </a:r>
           </a:p>
         </p:txBody>
@@ -4518,8 +4623,8 @@
         </p:nvSpPr>
         <p:spPr>
           <a:xfrm>
-            <a:off x="457200" y="3108960"/>
-            <a:ext cx="8229600" cy="1097280"/>
+            <a:off x="457200" y="2514600"/>
+            <a:ext cx="8229600" cy="1188720"/>
           </a:xfrm>
           <a:prstGeom prst="roundRect">
             <a:avLst/>
@@ -4563,8 +4668,8 @@
         </p:nvSpPr>
         <p:spPr>
           <a:xfrm>
-            <a:off x="640080" y="3200400"/>
-            <a:ext cx="7863840" cy="914400"/>
+            <a:off x="640080" y="2606040"/>
+            <a:ext cx="7863840" cy="1005840"/>
           </a:xfrm>
           <a:prstGeom prst="rect">
             <a:avLst/>
@@ -4578,7 +4683,7 @@
           <a:lstStyle/>
           <a:p>
             <a:pPr>
-              <a:defRPr sz="1600" b="1">
+              <a:defRPr sz="1400" b="1">
                 <a:solidFill>
                   <a:srgbClr val="343A40"/>
                 </a:solidFill>
@@ -4590,14 +4695,14 @@
           </a:p>
           <a:p>
             <a:pPr>
-              <a:defRPr sz="1800">
+              <a:defRPr sz="1600">
                 <a:solidFill>
                   <a:srgbClr val="005293"/>
                 </a:solidFill>
               </a:defRPr>
             </a:pPr>
             <a:r>
-              <a:t>Budget-Tier = HIGH</a:t>
+              <a:t>Wurde das höchste Budget-Level gewählt?</a:t>
             </a:r>
           </a:p>
         </p:txBody>
@@ -4610,8 +4715,8 @@
         </p:nvSpPr>
         <p:spPr>
           <a:xfrm>
-            <a:off x="457200" y="4480560"/>
-            <a:ext cx="3931920" cy="1097280"/>
+            <a:off x="2286000" y="3840480"/>
+            <a:ext cx="4572000" cy="1280160"/>
           </a:xfrm>
           <a:prstGeom prst="roundRect">
             <a:avLst/>
@@ -4653,8 +4758,8 @@
         </p:nvSpPr>
         <p:spPr>
           <a:xfrm>
-            <a:off x="640080" y="4617720"/>
-            <a:ext cx="3566160" cy="822960"/>
+            <a:off x="2423160" y="3931920"/>
+            <a:ext cx="4297680" cy="1097280"/>
           </a:xfrm>
           <a:prstGeom prst="rect">
             <a:avLst/>
@@ -4668,7 +4773,7 @@
           <a:lstStyle/>
           <a:p>
             <a:pPr>
-              <a:defRPr sz="1400" b="1">
+              <a:defRPr sz="1300" b="1">
                 <a:solidFill>
                   <a:srgbClr val="FFFFFF"/>
                 </a:solidFill>
@@ -4680,7 +4785,7 @@
           </a:p>
           <a:p>
             <a:pPr>
-              <a:defRPr sz="2000" b="1">
+              <a:defRPr sz="1800" b="1">
                 <a:solidFill>
                   <a:srgbClr val="FFFFFF"/>
                 </a:solidFill>
@@ -4688,6 +4793,41 @@
             </a:pPr>
             <a:r>
               <a:t>KZ +8</a:t>
+            </a:r>
+          </a:p>
+        </p:txBody>
+      </p:sp>
+      <p:sp>
+        <p:nvSpPr>
+          <p:cNvPr id="10" name="TextBox 9"/>
+          <p:cNvSpPr txBox="1"/>
+          <p:nvPr/>
+        </p:nvSpPr>
+        <p:spPr>
+          <a:xfrm>
+            <a:off x="457200" y="5303520"/>
+            <a:ext cx="8229600" cy="731520"/>
+          </a:xfrm>
+          <a:prstGeom prst="rect">
+            <a:avLst/>
+          </a:prstGeom>
+          <a:noFill/>
+        </p:spPr>
+        <p:txBody>
+          <a:bodyPr wrap="square">
+            <a:spAutoFit/>
+          </a:bodyPr>
+          <a:lstStyle/>
+          <a:p>
+            <a:pPr algn="ctr">
+              <a:defRPr sz="1400" i="1">
+                <a:solidFill>
+                  <a:srgbClr val="343A40"/>
+                </a:solidFill>
+              </a:defRPr>
+            </a:pPr>
+            <a:r>
+              <a:t>Hintergrund: Hohe Sicherheitsinvestitionen signalisieren professionelles Risikomanagement.</a:t>
             </a:r>
           </a:p>
         </p:txBody>
@@ -4719,7 +4859,7 @@
         <p:spPr>
           <a:xfrm>
             <a:off x="0" y="0"/>
-            <a:ext cx="9144000" cy="1645920"/>
+            <a:ext cx="9144000" cy="1371600"/>
           </a:xfrm>
           <a:prstGeom prst="rect">
             <a:avLst/>
@@ -4761,8 +4901,8 @@
         </p:nvSpPr>
         <p:spPr>
           <a:xfrm>
-            <a:off x="457200" y="274320"/>
-            <a:ext cx="8229600" cy="731520"/>
+            <a:off x="457200" y="182880"/>
+            <a:ext cx="8229600" cy="548640"/>
           </a:xfrm>
           <a:prstGeom prst="rect">
             <a:avLst/>
@@ -4776,7 +4916,7 @@
           <a:lstStyle/>
           <a:p>
             <a:pPr algn="ctr">
-              <a:defRPr sz="4000" b="1">
+              <a:defRPr sz="3600" b="1">
                 <a:solidFill>
                   <a:srgbClr val="FFFFFF"/>
                 </a:solidFill>
@@ -4796,7 +4936,7 @@
         </p:nvSpPr>
         <p:spPr>
           <a:xfrm>
-            <a:off x="457200" y="1051560"/>
+            <a:off x="457200" y="777240"/>
             <a:ext cx="8229600" cy="457200"/>
           </a:xfrm>
           <a:prstGeom prst="rect">
@@ -4811,7 +4951,7 @@
           <a:lstStyle/>
           <a:p>
             <a:pPr algn="ctr">
-              <a:defRPr sz="2000">
+              <a:defRPr sz="1800">
                 <a:solidFill>
                   <a:srgbClr val="FFFFFF"/>
                 </a:solidFill>
@@ -4831,8 +4971,8 @@
         </p:nvSpPr>
         <p:spPr>
           <a:xfrm>
-            <a:off x="457200" y="2011680"/>
-            <a:ext cx="8229600" cy="914400"/>
+            <a:off x="457200" y="1554480"/>
+            <a:ext cx="8229600" cy="822960"/>
           </a:xfrm>
           <a:prstGeom prst="rect">
             <a:avLst/>
@@ -4846,14 +4986,14 @@
           <a:lstStyle/>
           <a:p>
             <a:pPr algn="ctr">
-              <a:defRPr sz="2200">
+              <a:defRPr sz="1800">
                 <a:solidFill>
                   <a:srgbClr val="343A40"/>
                 </a:solidFill>
               </a:defRPr>
             </a:pPr>
             <a:r>
-              <a:t>Begrenztes Budget führt zu Compliance-Lücken bei Audit</a:t>
+              <a:t>Zu wenig Budget bedeutet Kompromisse bei der Sicherheit. Das fällt spätestens bei Audits und Kundenanfragen negativ auf.</a:t>
             </a:r>
           </a:p>
         </p:txBody>
@@ -4866,8 +5006,8 @@
         </p:nvSpPr>
         <p:spPr>
           <a:xfrm>
-            <a:off x="457200" y="3108960"/>
-            <a:ext cx="8229600" cy="1097280"/>
+            <a:off x="457200" y="2514600"/>
+            <a:ext cx="8229600" cy="1188720"/>
           </a:xfrm>
           <a:prstGeom prst="roundRect">
             <a:avLst/>
@@ -4911,8 +5051,8 @@
         </p:nvSpPr>
         <p:spPr>
           <a:xfrm>
-            <a:off x="640080" y="3200400"/>
-            <a:ext cx="7863840" cy="914400"/>
+            <a:off x="640080" y="2606040"/>
+            <a:ext cx="7863840" cy="1005840"/>
           </a:xfrm>
           <a:prstGeom prst="rect">
             <a:avLst/>
@@ -4926,7 +5066,7 @@
           <a:lstStyle/>
           <a:p>
             <a:pPr>
-              <a:defRPr sz="1600" b="1">
+              <a:defRPr sz="1400" b="1">
                 <a:solidFill>
                   <a:srgbClr val="343A40"/>
                 </a:solidFill>
@@ -4938,14 +5078,14 @@
           </a:p>
           <a:p>
             <a:pPr>
-              <a:defRPr sz="1800">
+              <a:defRPr sz="1600">
                 <a:solidFill>
                   <a:srgbClr val="005293"/>
                 </a:solidFill>
               </a:defRPr>
             </a:pPr>
             <a:r>
-              <a:t>Budget-Tier = LOW</a:t>
+              <a:t>Wurde das niedrigste Budget-Level gewählt?</a:t>
             </a:r>
           </a:p>
         </p:txBody>
@@ -4958,8 +5098,8 @@
         </p:nvSpPr>
         <p:spPr>
           <a:xfrm>
-            <a:off x="4754880" y="4480560"/>
-            <a:ext cx="3931920" cy="1097280"/>
+            <a:off x="2286000" y="3840480"/>
+            <a:ext cx="4572000" cy="1280160"/>
           </a:xfrm>
           <a:prstGeom prst="roundRect">
             <a:avLst/>
@@ -5001,8 +5141,8 @@
         </p:nvSpPr>
         <p:spPr>
           <a:xfrm>
-            <a:off x="4937760" y="4617720"/>
-            <a:ext cx="3566160" cy="822960"/>
+            <a:off x="2423160" y="3931920"/>
+            <a:ext cx="4297680" cy="1097280"/>
           </a:xfrm>
           <a:prstGeom prst="rect">
             <a:avLst/>
@@ -5016,7 +5156,7 @@
           <a:lstStyle/>
           <a:p>
             <a:pPr>
-              <a:defRPr sz="1400" b="1">
+              <a:defRPr sz="1300" b="1">
                 <a:solidFill>
                   <a:srgbClr val="FFFFFF"/>
                 </a:solidFill>
@@ -5028,7 +5168,7 @@
           </a:p>
           <a:p>
             <a:pPr>
-              <a:defRPr sz="2000" b="1">
+              <a:defRPr sz="1800" b="1">
                 <a:solidFill>
                   <a:srgbClr val="FFFFFF"/>
                 </a:solidFill>
@@ -5036,6 +5176,41 @@
             </a:pPr>
             <a:r>
               <a:t>KZ -3</a:t>
+            </a:r>
+          </a:p>
+        </p:txBody>
+      </p:sp>
+      <p:sp>
+        <p:nvSpPr>
+          <p:cNvPr id="10" name="TextBox 9"/>
+          <p:cNvSpPr txBox="1"/>
+          <p:nvPr/>
+        </p:nvSpPr>
+        <p:spPr>
+          <a:xfrm>
+            <a:off x="457200" y="5303520"/>
+            <a:ext cx="8229600" cy="731520"/>
+          </a:xfrm>
+          <a:prstGeom prst="rect">
+            <a:avLst/>
+          </a:prstGeom>
+          <a:noFill/>
+        </p:spPr>
+        <p:txBody>
+          <a:bodyPr wrap="square">
+            <a:spAutoFit/>
+          </a:bodyPr>
+          <a:lstStyle/>
+          <a:p>
+            <a:pPr algn="ctr">
+              <a:defRPr sz="1400" i="1">
+                <a:solidFill>
+                  <a:srgbClr val="343A40"/>
+                </a:solidFill>
+              </a:defRPr>
+            </a:pPr>
+            <a:r>
+              <a:t>Hintergrund: Sichtbare Sicherheitslücken schaden dem Ruf bei Kunden und Partnern.</a:t>
             </a:r>
           </a:p>
         </p:txBody>

</xml_diff>

<commit_message>
Add balance analysis script for security simulation strategies
- Implemented a new Python script `balance_analysis.py` to simulate and analyze various security strategies across different budget tiers.
- Defined multiple strategies with detailed descriptions and cost calculations.
- Included functions to calculate return on security (ROS) and combined scores based on outcomes.
- Integrated the analysis with existing simulation components to evaluate the effectiveness of strategies against baseline outcomes.
- Added comprehensive output for strategy performance, including cost, damage, and key performance indicators.
</commit_message>
<xml_diff>
--- a/pptx_output/Events.pptx
+++ b/pptx_output/Events.pptx
@@ -6,11 +6,6 @@
   </p:sldMasterIdLst>
   <p:sldIdLst>
     <p:sldId id="256" r:id="rId7"/>
-    <p:sldId id="257" r:id="rId8"/>
-    <p:sldId id="258" r:id="rId9"/>
-    <p:sldId id="259" r:id="rId10"/>
-    <p:sldId id="260" r:id="rId11"/>
-    <p:sldId id="261" r:id="rId12"/>
   </p:sldIdLst>
   <p:sldSz cx="9144000" cy="6858000" type="screen4x3"/>
   <p:notesSz cx="6858000" cy="9144000"/>
@@ -3206,2011 +3201,6 @@
             <a:br/>
             <a:r>
               <a:t>Dynamische Spielereignisse</a:t>
-            </a:r>
-          </a:p>
-        </p:txBody>
-      </p:sp>
-    </p:spTree>
-  </p:cSld>
-  <p:clrMapOvr>
-    <a:masterClrMapping/>
-  </p:clrMapOvr>
-</p:sld>
-</file>
-
-<file path=ppt/slides/slide2.xml><?xml version="1.0" encoding="utf-8"?>
-<p:sld xmlns:a="http://schemas.openxmlformats.org/drawingml/2006/main" xmlns:p="http://schemas.openxmlformats.org/presentationml/2006/main" xmlns:r="http://schemas.openxmlformats.org/officeDocument/2006/relationships">
-  <p:cSld>
-    <p:spTree>
-      <p:nvGrpSpPr>
-        <p:cNvPr id="1" name=""/>
-        <p:cNvGrpSpPr/>
-        <p:nvPr/>
-      </p:nvGrpSpPr>
-      <p:grpSpPr/>
-      <p:sp>
-        <p:nvSpPr>
-          <p:cNvPr id="2" name="Rectangle 1"/>
-          <p:cNvSpPr/>
-          <p:nvPr/>
-        </p:nvSpPr>
-        <p:spPr>
-          <a:xfrm>
-            <a:off x="0" y="0"/>
-            <a:ext cx="9144000" cy="1371600"/>
-          </a:xfrm>
-          <a:prstGeom prst="rect">
-            <a:avLst/>
-          </a:prstGeom>
-          <a:solidFill>
-            <a:srgbClr val="FF9900"/>
-          </a:solidFill>
-          <a:ln>
-            <a:noFill/>
-          </a:ln>
-        </p:spPr>
-        <p:style>
-          <a:lnRef idx="1">
-            <a:schemeClr val="accent1"/>
-          </a:lnRef>
-          <a:fillRef idx="3">
-            <a:schemeClr val="accent1"/>
-          </a:fillRef>
-          <a:effectRef idx="2">
-            <a:schemeClr val="accent1"/>
-          </a:effectRef>
-          <a:fontRef idx="minor">
-            <a:schemeClr val="lt1"/>
-          </a:fontRef>
-        </p:style>
-        <p:txBody>
-          <a:bodyPr rtlCol="0" anchor="ctr"/>
-          <a:lstStyle/>
-          <a:p>
-            <a:pPr algn="ctr"/>
-          </a:p>
-        </p:txBody>
-      </p:sp>
-      <p:sp>
-        <p:nvSpPr>
-          <p:cNvPr id="3" name="TextBox 2"/>
-          <p:cNvSpPr txBox="1"/>
-          <p:nvPr/>
-        </p:nvSpPr>
-        <p:spPr>
-          <a:xfrm>
-            <a:off x="457200" y="182880"/>
-            <a:ext cx="8229600" cy="548640"/>
-          </a:xfrm>
-          <a:prstGeom prst="rect">
-            <a:avLst/>
-          </a:prstGeom>
-          <a:noFill/>
-        </p:spPr>
-        <p:txBody>
-          <a:bodyPr wrap="none">
-            <a:spAutoFit/>
-          </a:bodyPr>
-          <a:lstStyle/>
-          <a:p>
-            <a:pPr algn="ctr">
-              <a:defRPr sz="3600" b="1">
-                <a:solidFill>
-                  <a:srgbClr val="FFFFFF"/>
-                </a:solidFill>
-              </a:defRPr>
-            </a:pPr>
-            <a:r>
-              <a:t>📋 OEM-Audit</a:t>
-            </a:r>
-          </a:p>
-        </p:txBody>
-      </p:sp>
-      <p:sp>
-        <p:nvSpPr>
-          <p:cNvPr id="4" name="TextBox 3"/>
-          <p:cNvSpPr txBox="1"/>
-          <p:nvPr/>
-        </p:nvSpPr>
-        <p:spPr>
-          <a:xfrm>
-            <a:off x="457200" y="777240"/>
-            <a:ext cx="8229600" cy="457200"/>
-          </a:xfrm>
-          <a:prstGeom prst="rect">
-            <a:avLst/>
-          </a:prstGeom>
-          <a:noFill/>
-        </p:spPr>
-        <p:txBody>
-          <a:bodyPr wrap="none">
-            <a:spAutoFit/>
-          </a:bodyPr>
-          <a:lstStyle/>
-          <a:p>
-            <a:pPr algn="ctr">
-              <a:defRPr sz="1800">
-                <a:solidFill>
-                  <a:srgbClr val="FFFFFF"/>
-                </a:solidFill>
-              </a:defRPr>
-            </a:pPr>
-            <a:r>
-              <a:t>Trigger: Nach Welle 2</a:t>
-            </a:r>
-          </a:p>
-        </p:txBody>
-      </p:sp>
-      <p:sp>
-        <p:nvSpPr>
-          <p:cNvPr id="5" name="TextBox 4"/>
-          <p:cNvSpPr txBox="1"/>
-          <p:nvPr/>
-        </p:nvSpPr>
-        <p:spPr>
-          <a:xfrm>
-            <a:off x="457200" y="1554480"/>
-            <a:ext cx="8229600" cy="822960"/>
-          </a:xfrm>
-          <a:prstGeom prst="rect">
-            <a:avLst/>
-          </a:prstGeom>
-          <a:noFill/>
-        </p:spPr>
-        <p:txBody>
-          <a:bodyPr wrap="square">
-            <a:spAutoFit/>
-          </a:bodyPr>
-          <a:lstStyle/>
-          <a:p>
-            <a:pPr algn="ctr">
-              <a:defRPr sz="1800">
-                <a:solidFill>
-                  <a:srgbClr val="343A40"/>
-                </a:solidFill>
-              </a:defRPr>
-            </a:pPr>
-            <a:r>
-              <a:t>Der große Automobilkunde prüft die Sicherheitsstandards. Wer gut vorbereitet ist, gewinnt Vertrauen - wer schlecht abschneidet, riskiert Aufträge.</a:t>
-            </a:r>
-          </a:p>
-        </p:txBody>
-      </p:sp>
-      <p:sp>
-        <p:nvSpPr>
-          <p:cNvPr id="6" name="Rounded Rectangle 5"/>
-          <p:cNvSpPr/>
-          <p:nvPr/>
-        </p:nvSpPr>
-        <p:spPr>
-          <a:xfrm>
-            <a:off x="457200" y="2514600"/>
-            <a:ext cx="8229600" cy="1188720"/>
-          </a:xfrm>
-          <a:prstGeom prst="roundRect">
-            <a:avLst/>
-          </a:prstGeom>
-          <a:solidFill>
-            <a:srgbClr val="F8F9FA"/>
-          </a:solidFill>
-          <a:ln w="25400">
-            <a:solidFill>
-              <a:srgbClr val="007AC2"/>
-            </a:solidFill>
-          </a:ln>
-        </p:spPr>
-        <p:style>
-          <a:lnRef idx="1">
-            <a:schemeClr val="accent1"/>
-          </a:lnRef>
-          <a:fillRef idx="3">
-            <a:schemeClr val="accent1"/>
-          </a:fillRef>
-          <a:effectRef idx="2">
-            <a:schemeClr val="accent1"/>
-          </a:effectRef>
-          <a:fontRef idx="minor">
-            <a:schemeClr val="lt1"/>
-          </a:fontRef>
-        </p:style>
-        <p:txBody>
-          <a:bodyPr rtlCol="0" anchor="ctr"/>
-          <a:lstStyle/>
-          <a:p>
-            <a:pPr algn="ctr"/>
-          </a:p>
-        </p:txBody>
-      </p:sp>
-      <p:sp>
-        <p:nvSpPr>
-          <p:cNvPr id="7" name="TextBox 6"/>
-          <p:cNvSpPr txBox="1"/>
-          <p:nvPr/>
-        </p:nvSpPr>
-        <p:spPr>
-          <a:xfrm>
-            <a:off x="640080" y="2606040"/>
-            <a:ext cx="7863840" cy="1005840"/>
-          </a:xfrm>
-          <a:prstGeom prst="rect">
-            <a:avLst/>
-          </a:prstGeom>
-          <a:noFill/>
-        </p:spPr>
-        <p:txBody>
-          <a:bodyPr wrap="square">
-            <a:spAutoFit/>
-          </a:bodyPr>
-          <a:lstStyle/>
-          <a:p>
-            <a:pPr>
-              <a:defRPr sz="1400" b="1">
-                <a:solidFill>
-                  <a:srgbClr val="343A40"/>
-                </a:solidFill>
-              </a:defRPr>
-            </a:pPr>
-            <a:r>
-              <a:t>Bedingung:</a:t>
-            </a:r>
-          </a:p>
-          <a:p>
-            <a:pPr>
-              <a:defRPr sz="1600">
-                <a:solidFill>
-                  <a:srgbClr val="005293"/>
-                </a:solidFill>
-              </a:defRPr>
-            </a:pPr>
-            <a:r>
-              <a:t>Wurde der Sicherheits-Zielwert nach Welle 1 erreicht?</a:t>
-            </a:r>
-          </a:p>
-        </p:txBody>
-      </p:sp>
-      <p:sp>
-        <p:nvSpPr>
-          <p:cNvPr id="8" name="Rounded Rectangle 7"/>
-          <p:cNvSpPr/>
-          <p:nvPr/>
-        </p:nvSpPr>
-        <p:spPr>
-          <a:xfrm>
-            <a:off x="457200" y="3840480"/>
-            <a:ext cx="3931920" cy="1280160"/>
-          </a:xfrm>
-          <a:prstGeom prst="roundRect">
-            <a:avLst/>
-          </a:prstGeom>
-          <a:solidFill>
-            <a:srgbClr val="00994C"/>
-          </a:solidFill>
-          <a:ln>
-            <a:noFill/>
-          </a:ln>
-        </p:spPr>
-        <p:style>
-          <a:lnRef idx="1">
-            <a:schemeClr val="accent1"/>
-          </a:lnRef>
-          <a:fillRef idx="3">
-            <a:schemeClr val="accent1"/>
-          </a:fillRef>
-          <a:effectRef idx="2">
-            <a:schemeClr val="accent1"/>
-          </a:effectRef>
-          <a:fontRef idx="minor">
-            <a:schemeClr val="lt1"/>
-          </a:fontRef>
-        </p:style>
-        <p:txBody>
-          <a:bodyPr rtlCol="0" anchor="ctr"/>
-          <a:lstStyle/>
-          <a:p>
-            <a:pPr algn="ctr"/>
-          </a:p>
-        </p:txBody>
-      </p:sp>
-      <p:sp>
-        <p:nvSpPr>
-          <p:cNvPr id="9" name="TextBox 8"/>
-          <p:cNvSpPr txBox="1"/>
-          <p:nvPr/>
-        </p:nvSpPr>
-        <p:spPr>
-          <a:xfrm>
-            <a:off x="594360" y="3931920"/>
-            <a:ext cx="3657600" cy="1097280"/>
-          </a:xfrm>
-          <a:prstGeom prst="rect">
-            <a:avLst/>
-          </a:prstGeom>
-          <a:noFill/>
-        </p:spPr>
-        <p:txBody>
-          <a:bodyPr wrap="square">
-            <a:spAutoFit/>
-          </a:bodyPr>
-          <a:lstStyle/>
-          <a:p>
-            <a:pPr>
-              <a:defRPr sz="1300" b="1">
-                <a:solidFill>
-                  <a:srgbClr val="FFFFFF"/>
-                </a:solidFill>
-              </a:defRPr>
-            </a:pPr>
-            <a:r>
-              <a:t>Bei Erfüllung:</a:t>
-            </a:r>
-          </a:p>
-          <a:p>
-            <a:pPr>
-              <a:defRPr sz="1800" b="1">
-                <a:solidFill>
-                  <a:srgbClr val="FFFFFF"/>
-                </a:solidFill>
-              </a:defRPr>
-            </a:pPr>
-            <a:r>
-              <a:t>KZ +5</a:t>
-            </a:r>
-          </a:p>
-        </p:txBody>
-      </p:sp>
-      <p:sp>
-        <p:nvSpPr>
-          <p:cNvPr id="10" name="Rounded Rectangle 9"/>
-          <p:cNvSpPr/>
-          <p:nvPr/>
-        </p:nvSpPr>
-        <p:spPr>
-          <a:xfrm>
-            <a:off x="4754880" y="3840480"/>
-            <a:ext cx="3931920" cy="1280160"/>
-          </a:xfrm>
-          <a:prstGeom prst="roundRect">
-            <a:avLst/>
-          </a:prstGeom>
-          <a:solidFill>
-            <a:srgbClr val="DC3545"/>
-          </a:solidFill>
-          <a:ln>
-            <a:noFill/>
-          </a:ln>
-        </p:spPr>
-        <p:style>
-          <a:lnRef idx="1">
-            <a:schemeClr val="accent1"/>
-          </a:lnRef>
-          <a:fillRef idx="3">
-            <a:schemeClr val="accent1"/>
-          </a:fillRef>
-          <a:effectRef idx="2">
-            <a:schemeClr val="accent1"/>
-          </a:effectRef>
-          <a:fontRef idx="minor">
-            <a:schemeClr val="lt1"/>
-          </a:fontRef>
-        </p:style>
-        <p:txBody>
-          <a:bodyPr rtlCol="0" anchor="ctr"/>
-          <a:lstStyle/>
-          <a:p>
-            <a:pPr algn="ctr"/>
-          </a:p>
-        </p:txBody>
-      </p:sp>
-      <p:sp>
-        <p:nvSpPr>
-          <p:cNvPr id="11" name="TextBox 10"/>
-          <p:cNvSpPr txBox="1"/>
-          <p:nvPr/>
-        </p:nvSpPr>
-        <p:spPr>
-          <a:xfrm>
-            <a:off x="4892040" y="3931920"/>
-            <a:ext cx="3657600" cy="1097280"/>
-          </a:xfrm>
-          <a:prstGeom prst="rect">
-            <a:avLst/>
-          </a:prstGeom>
-          <a:noFill/>
-        </p:spPr>
-        <p:txBody>
-          <a:bodyPr wrap="square">
-            <a:spAutoFit/>
-          </a:bodyPr>
-          <a:lstStyle/>
-          <a:p>
-            <a:pPr>
-              <a:defRPr sz="1300" b="1">
-                <a:solidFill>
-                  <a:srgbClr val="FFFFFF"/>
-                </a:solidFill>
-              </a:defRPr>
-            </a:pPr>
-            <a:r>
-              <a:t>Bei Nicht-Erfüllung:</a:t>
-            </a:r>
-          </a:p>
-          <a:p>
-            <a:pPr>
-              <a:defRPr sz="1800" b="1">
-                <a:solidFill>
-                  <a:srgbClr val="FFFFFF"/>
-                </a:solidFill>
-              </a:defRPr>
-            </a:pPr>
-            <a:r>
-              <a:t>KZ -3</a:t>
-            </a:r>
-          </a:p>
-        </p:txBody>
-      </p:sp>
-      <p:sp>
-        <p:nvSpPr>
-          <p:cNvPr id="12" name="TextBox 11"/>
-          <p:cNvSpPr txBox="1"/>
-          <p:nvPr/>
-        </p:nvSpPr>
-        <p:spPr>
-          <a:xfrm>
-            <a:off x="457200" y="5303520"/>
-            <a:ext cx="8229600" cy="731520"/>
-          </a:xfrm>
-          <a:prstGeom prst="rect">
-            <a:avLst/>
-          </a:prstGeom>
-          <a:noFill/>
-        </p:spPr>
-        <p:txBody>
-          <a:bodyPr wrap="square">
-            <a:spAutoFit/>
-          </a:bodyPr>
-          <a:lstStyle/>
-          <a:p>
-            <a:pPr algn="ctr">
-              <a:defRPr sz="1400" i="1">
-                <a:solidFill>
-                  <a:srgbClr val="343A40"/>
-                </a:solidFill>
-              </a:defRPr>
-            </a:pPr>
-            <a:r>
-              <a:t>Hintergrund: Bestanden: Kundenvertrauen steigt deutlich. Nicht bestanden: Vertrauen sinkt, Folgeaufträge gefährdet.</a:t>
-            </a:r>
-          </a:p>
-        </p:txBody>
-      </p:sp>
-    </p:spTree>
-  </p:cSld>
-  <p:clrMapOvr>
-    <a:masterClrMapping/>
-  </p:clrMapOvr>
-</p:sld>
-</file>
-
-<file path=ppt/slides/slide3.xml><?xml version="1.0" encoding="utf-8"?>
-<p:sld xmlns:a="http://schemas.openxmlformats.org/drawingml/2006/main" xmlns:p="http://schemas.openxmlformats.org/presentationml/2006/main" xmlns:r="http://schemas.openxmlformats.org/officeDocument/2006/relationships">
-  <p:cSld>
-    <p:spTree>
-      <p:nvGrpSpPr>
-        <p:cNvPr id="1" name=""/>
-        <p:cNvGrpSpPr/>
-        <p:nvPr/>
-      </p:nvGrpSpPr>
-      <p:grpSpPr/>
-      <p:sp>
-        <p:nvSpPr>
-          <p:cNvPr id="2" name="Rectangle 1"/>
-          <p:cNvSpPr/>
-          <p:nvPr/>
-        </p:nvSpPr>
-        <p:spPr>
-          <a:xfrm>
-            <a:off x="0" y="0"/>
-            <a:ext cx="9144000" cy="1371600"/>
-          </a:xfrm>
-          <a:prstGeom prst="rect">
-            <a:avLst/>
-          </a:prstGeom>
-          <a:solidFill>
-            <a:srgbClr val="FF9900"/>
-          </a:solidFill>
-          <a:ln>
-            <a:noFill/>
-          </a:ln>
-        </p:spPr>
-        <p:style>
-          <a:lnRef idx="1">
-            <a:schemeClr val="accent1"/>
-          </a:lnRef>
-          <a:fillRef idx="3">
-            <a:schemeClr val="accent1"/>
-          </a:fillRef>
-          <a:effectRef idx="2">
-            <a:schemeClr val="accent1"/>
-          </a:effectRef>
-          <a:fontRef idx="minor">
-            <a:schemeClr val="lt1"/>
-          </a:fontRef>
-        </p:style>
-        <p:txBody>
-          <a:bodyPr rtlCol="0" anchor="ctr"/>
-          <a:lstStyle/>
-          <a:p>
-            <a:pPr algn="ctr"/>
-          </a:p>
-        </p:txBody>
-      </p:sp>
-      <p:sp>
-        <p:nvSpPr>
-          <p:cNvPr id="3" name="TextBox 2"/>
-          <p:cNvSpPr txBox="1"/>
-          <p:nvPr/>
-        </p:nvSpPr>
-        <p:spPr>
-          <a:xfrm>
-            <a:off x="457200" y="182880"/>
-            <a:ext cx="8229600" cy="548640"/>
-          </a:xfrm>
-          <a:prstGeom prst="rect">
-            <a:avLst/>
-          </a:prstGeom>
-          <a:noFill/>
-        </p:spPr>
-        <p:txBody>
-          <a:bodyPr wrap="none">
-            <a:spAutoFit/>
-          </a:bodyPr>
-          <a:lstStyle/>
-          <a:p>
-            <a:pPr algn="ctr">
-              <a:defRPr sz="3600" b="1">
-                <a:solidFill>
-                  <a:srgbClr val="FFFFFF"/>
-                </a:solidFill>
-              </a:defRPr>
-            </a:pPr>
-            <a:r>
-              <a:t>👥 Personalwechsel</a:t>
-            </a:r>
-          </a:p>
-        </p:txBody>
-      </p:sp>
-      <p:sp>
-        <p:nvSpPr>
-          <p:cNvPr id="4" name="TextBox 3"/>
-          <p:cNvSpPr txBox="1"/>
-          <p:nvPr/>
-        </p:nvSpPr>
-        <p:spPr>
-          <a:xfrm>
-            <a:off x="457200" y="777240"/>
-            <a:ext cx="8229600" cy="457200"/>
-          </a:xfrm>
-          <a:prstGeom prst="rect">
-            <a:avLst/>
-          </a:prstGeom>
-          <a:noFill/>
-        </p:spPr>
-        <p:txBody>
-          <a:bodyPr wrap="none">
-            <a:spAutoFit/>
-          </a:bodyPr>
-          <a:lstStyle/>
-          <a:p>
-            <a:pPr algn="ctr">
-              <a:defRPr sz="1800">
-                <a:solidFill>
-                  <a:srgbClr val="FFFFFF"/>
-                </a:solidFill>
-              </a:defRPr>
-            </a:pPr>
-            <a:r>
-              <a:t>Trigger: Nach Welle 2</a:t>
-            </a:r>
-          </a:p>
-        </p:txBody>
-      </p:sp>
-      <p:sp>
-        <p:nvSpPr>
-          <p:cNvPr id="5" name="TextBox 4"/>
-          <p:cNvSpPr txBox="1"/>
-          <p:nvPr/>
-        </p:nvSpPr>
-        <p:spPr>
-          <a:xfrm>
-            <a:off x="457200" y="1554480"/>
-            <a:ext cx="8229600" cy="822960"/>
-          </a:xfrm>
-          <a:prstGeom prst="rect">
-            <a:avLst/>
-          </a:prstGeom>
-          <a:noFill/>
-        </p:spPr>
-        <p:txBody>
-          <a:bodyPr wrap="square">
-            <a:spAutoFit/>
-          </a:bodyPr>
-          <a:lstStyle/>
-          <a:p>
-            <a:pPr algn="ctr">
-              <a:defRPr sz="1800">
-                <a:solidFill>
-                  <a:srgbClr val="343A40"/>
-                </a:solidFill>
-              </a:defRPr>
-            </a:pPr>
-            <a:r>
-              <a:t>Ohne regelmäßige Schulungen und Sensibilisierung werden IT-Sicherheitsaufgaben zur Belastung. Überlastete Mitarbeiter verlassen das Unternehmen.</a:t>
-            </a:r>
-          </a:p>
-        </p:txBody>
-      </p:sp>
-      <p:sp>
-        <p:nvSpPr>
-          <p:cNvPr id="6" name="Rounded Rectangle 5"/>
-          <p:cNvSpPr/>
-          <p:nvPr/>
-        </p:nvSpPr>
-        <p:spPr>
-          <a:xfrm>
-            <a:off x="457200" y="2514600"/>
-            <a:ext cx="8229600" cy="1188720"/>
-          </a:xfrm>
-          <a:prstGeom prst="roundRect">
-            <a:avLst/>
-          </a:prstGeom>
-          <a:solidFill>
-            <a:srgbClr val="F8F9FA"/>
-          </a:solidFill>
-          <a:ln w="25400">
-            <a:solidFill>
-              <a:srgbClr val="007AC2"/>
-            </a:solidFill>
-          </a:ln>
-        </p:spPr>
-        <p:style>
-          <a:lnRef idx="1">
-            <a:schemeClr val="accent1"/>
-          </a:lnRef>
-          <a:fillRef idx="3">
-            <a:schemeClr val="accent1"/>
-          </a:fillRef>
-          <a:effectRef idx="2">
-            <a:schemeClr val="accent1"/>
-          </a:effectRef>
-          <a:fontRef idx="minor">
-            <a:schemeClr val="lt1"/>
-          </a:fontRef>
-        </p:style>
-        <p:txBody>
-          <a:bodyPr rtlCol="0" anchor="ctr"/>
-          <a:lstStyle/>
-          <a:p>
-            <a:pPr algn="ctr"/>
-          </a:p>
-        </p:txBody>
-      </p:sp>
-      <p:sp>
-        <p:nvSpPr>
-          <p:cNvPr id="7" name="TextBox 6"/>
-          <p:cNvSpPr txBox="1"/>
-          <p:nvPr/>
-        </p:nvSpPr>
-        <p:spPr>
-          <a:xfrm>
-            <a:off x="640080" y="2606040"/>
-            <a:ext cx="7863840" cy="1005840"/>
-          </a:xfrm>
-          <a:prstGeom prst="rect">
-            <a:avLst/>
-          </a:prstGeom>
-          <a:noFill/>
-        </p:spPr>
-        <p:txBody>
-          <a:bodyPr wrap="square">
-            <a:spAutoFit/>
-          </a:bodyPr>
-          <a:lstStyle/>
-          <a:p>
-            <a:pPr>
-              <a:defRPr sz="1400" b="1">
-                <a:solidFill>
-                  <a:srgbClr val="343A40"/>
-                </a:solidFill>
-              </a:defRPr>
-            </a:pPr>
-            <a:r>
-              <a:t>Bedingung:</a:t>
-            </a:r>
-          </a:p>
-          <a:p>
-            <a:pPr>
-              <a:defRPr sz="1600">
-                <a:solidFill>
-                  <a:srgbClr val="005293"/>
-                </a:solidFill>
-              </a:defRPr>
-            </a:pPr>
-            <a:r>
-              <a:t>Wurden die Mitarbeiter nicht ausreichend geschult (Awareness unter Level 2)?</a:t>
-            </a:r>
-          </a:p>
-        </p:txBody>
-      </p:sp>
-      <p:sp>
-        <p:nvSpPr>
-          <p:cNvPr id="8" name="Rounded Rectangle 7"/>
-          <p:cNvSpPr/>
-          <p:nvPr/>
-        </p:nvSpPr>
-        <p:spPr>
-          <a:xfrm>
-            <a:off x="2286000" y="3840480"/>
-            <a:ext cx="4572000" cy="1280160"/>
-          </a:xfrm>
-          <a:prstGeom prst="roundRect">
-            <a:avLst/>
-          </a:prstGeom>
-          <a:solidFill>
-            <a:srgbClr val="DC3545"/>
-          </a:solidFill>
-          <a:ln>
-            <a:noFill/>
-          </a:ln>
-        </p:spPr>
-        <p:style>
-          <a:lnRef idx="1">
-            <a:schemeClr val="accent1"/>
-          </a:lnRef>
-          <a:fillRef idx="3">
-            <a:schemeClr val="accent1"/>
-          </a:fillRef>
-          <a:effectRef idx="2">
-            <a:schemeClr val="accent1"/>
-          </a:effectRef>
-          <a:fontRef idx="minor">
-            <a:schemeClr val="lt1"/>
-          </a:fontRef>
-        </p:style>
-        <p:txBody>
-          <a:bodyPr rtlCol="0" anchor="ctr"/>
-          <a:lstStyle/>
-          <a:p>
-            <a:pPr algn="ctr"/>
-          </a:p>
-        </p:txBody>
-      </p:sp>
-      <p:sp>
-        <p:nvSpPr>
-          <p:cNvPr id="9" name="TextBox 8"/>
-          <p:cNvSpPr txBox="1"/>
-          <p:nvPr/>
-        </p:nvSpPr>
-        <p:spPr>
-          <a:xfrm>
-            <a:off x="2423160" y="3931920"/>
-            <a:ext cx="4297680" cy="1097280"/>
-          </a:xfrm>
-          <a:prstGeom prst="rect">
-            <a:avLst/>
-          </a:prstGeom>
-          <a:noFill/>
-        </p:spPr>
-        <p:txBody>
-          <a:bodyPr wrap="square">
-            <a:spAutoFit/>
-          </a:bodyPr>
-          <a:lstStyle/>
-          <a:p>
-            <a:pPr>
-              <a:defRPr sz="1300" b="1">
-                <a:solidFill>
-                  <a:srgbClr val="FFFFFF"/>
-                </a:solidFill>
-              </a:defRPr>
-            </a:pPr>
-            <a:r>
-              <a:t>Bei Nicht-Erfüllung:</a:t>
-            </a:r>
-          </a:p>
-          <a:p>
-            <a:pPr>
-              <a:defRPr sz="1800" b="1">
-                <a:solidFill>
-                  <a:srgbClr val="FFFFFF"/>
-                </a:solidFill>
-              </a:defRPr>
-            </a:pPr>
-            <a:r>
-              <a:t>KZ -2, OPEX +5k€</a:t>
-            </a:r>
-          </a:p>
-        </p:txBody>
-      </p:sp>
-      <p:sp>
-        <p:nvSpPr>
-          <p:cNvPr id="10" name="TextBox 9"/>
-          <p:cNvSpPr txBox="1"/>
-          <p:nvPr/>
-        </p:nvSpPr>
-        <p:spPr>
-          <a:xfrm>
-            <a:off x="457200" y="5303520"/>
-            <a:ext cx="8229600" cy="731520"/>
-          </a:xfrm>
-          <a:prstGeom prst="rect">
-            <a:avLst/>
-          </a:prstGeom>
-          <a:noFill/>
-        </p:spPr>
-        <p:txBody>
-          <a:bodyPr wrap="square">
-            <a:spAutoFit/>
-          </a:bodyPr>
-          <a:lstStyle/>
-          <a:p>
-            <a:pPr algn="ctr">
-              <a:defRPr sz="1400" i="1">
-                <a:solidFill>
-                  <a:srgbClr val="343A40"/>
-                </a:solidFill>
-              </a:defRPr>
-            </a:pPr>
-            <a:r>
-              <a:t>Hintergrund: Fluktuation kostet Geld (Einarbeitung) und Know-how geht verloren.</a:t>
-            </a:r>
-          </a:p>
-        </p:txBody>
-      </p:sp>
-    </p:spTree>
-  </p:cSld>
-  <p:clrMapOvr>
-    <a:masterClrMapping/>
-  </p:clrMapOvr>
-</p:sld>
-</file>
-
-<file path=ppt/slides/slide4.xml><?xml version="1.0" encoding="utf-8"?>
-<p:sld xmlns:a="http://schemas.openxmlformats.org/drawingml/2006/main" xmlns:p="http://schemas.openxmlformats.org/presentationml/2006/main" xmlns:r="http://schemas.openxmlformats.org/officeDocument/2006/relationships">
-  <p:cSld>
-    <p:spTree>
-      <p:nvGrpSpPr>
-        <p:cNvPr id="1" name=""/>
-        <p:cNvGrpSpPr/>
-        <p:nvPr/>
-      </p:nvGrpSpPr>
-      <p:grpSpPr/>
-      <p:sp>
-        <p:nvSpPr>
-          <p:cNvPr id="2" name="Rectangle 1"/>
-          <p:cNvSpPr/>
-          <p:nvPr/>
-        </p:nvSpPr>
-        <p:spPr>
-          <a:xfrm>
-            <a:off x="0" y="0"/>
-            <a:ext cx="9144000" cy="1371600"/>
-          </a:xfrm>
-          <a:prstGeom prst="rect">
-            <a:avLst/>
-          </a:prstGeom>
-          <a:solidFill>
-            <a:srgbClr val="FF9900"/>
-          </a:solidFill>
-          <a:ln>
-            <a:noFill/>
-          </a:ln>
-        </p:spPr>
-        <p:style>
-          <a:lnRef idx="1">
-            <a:schemeClr val="accent1"/>
-          </a:lnRef>
-          <a:fillRef idx="3">
-            <a:schemeClr val="accent1"/>
-          </a:fillRef>
-          <a:effectRef idx="2">
-            <a:schemeClr val="accent1"/>
-          </a:effectRef>
-          <a:fontRef idx="minor">
-            <a:schemeClr val="lt1"/>
-          </a:fontRef>
-        </p:style>
-        <p:txBody>
-          <a:bodyPr rtlCol="0" anchor="ctr"/>
-          <a:lstStyle/>
-          <a:p>
-            <a:pPr algn="ctr"/>
-          </a:p>
-        </p:txBody>
-      </p:sp>
-      <p:sp>
-        <p:nvSpPr>
-          <p:cNvPr id="3" name="TextBox 2"/>
-          <p:cNvSpPr txBox="1"/>
-          <p:nvPr/>
-        </p:nvSpPr>
-        <p:spPr>
-          <a:xfrm>
-            <a:off x="457200" y="182880"/>
-            <a:ext cx="8229600" cy="548640"/>
-          </a:xfrm>
-          <a:prstGeom prst="rect">
-            <a:avLst/>
-          </a:prstGeom>
-          <a:noFill/>
-        </p:spPr>
-        <p:txBody>
-          <a:bodyPr wrap="none">
-            <a:spAutoFit/>
-          </a:bodyPr>
-          <a:lstStyle/>
-          <a:p>
-            <a:pPr algn="ctr">
-              <a:defRPr sz="3600" b="1">
-                <a:solidFill>
-                  <a:srgbClr val="FFFFFF"/>
-                </a:solidFill>
-              </a:defRPr>
-            </a:pPr>
-            <a:r>
-              <a:t>🏆 DSGVO-Bonus</a:t>
-            </a:r>
-          </a:p>
-        </p:txBody>
-      </p:sp>
-      <p:sp>
-        <p:nvSpPr>
-          <p:cNvPr id="4" name="TextBox 3"/>
-          <p:cNvSpPr txBox="1"/>
-          <p:nvPr/>
-        </p:nvSpPr>
-        <p:spPr>
-          <a:xfrm>
-            <a:off x="457200" y="777240"/>
-            <a:ext cx="8229600" cy="457200"/>
-          </a:xfrm>
-          <a:prstGeom prst="rect">
-            <a:avLst/>
-          </a:prstGeom>
-          <a:noFill/>
-        </p:spPr>
-        <p:txBody>
-          <a:bodyPr wrap="none">
-            <a:spAutoFit/>
-          </a:bodyPr>
-          <a:lstStyle/>
-          <a:p>
-            <a:pPr algn="ctr">
-              <a:defRPr sz="1800">
-                <a:solidFill>
-                  <a:srgbClr val="FFFFFF"/>
-                </a:solidFill>
-              </a:defRPr>
-            </a:pPr>
-            <a:r>
-              <a:t>Trigger: Nach Welle 3</a:t>
-            </a:r>
-          </a:p>
-        </p:txBody>
-      </p:sp>
-      <p:sp>
-        <p:nvSpPr>
-          <p:cNvPr id="5" name="TextBox 4"/>
-          <p:cNvSpPr txBox="1"/>
-          <p:nvPr/>
-        </p:nvSpPr>
-        <p:spPr>
-          <a:xfrm>
-            <a:off x="457200" y="1554480"/>
-            <a:ext cx="8229600" cy="822960"/>
-          </a:xfrm>
-          <a:prstGeom prst="rect">
-            <a:avLst/>
-          </a:prstGeom>
-          <a:noFill/>
-        </p:spPr>
-        <p:txBody>
-          <a:bodyPr wrap="square">
-            <a:spAutoFit/>
-          </a:bodyPr>
-          <a:lstStyle/>
-          <a:p>
-            <a:pPr algn="ctr">
-              <a:defRPr sz="1800">
-                <a:solidFill>
-                  <a:srgbClr val="343A40"/>
-                </a:solidFill>
-              </a:defRPr>
-            </a:pPr>
-            <a:r>
-              <a:t>Gute Zugriffskontrolle und Logging sind die Basis für Datenschutz-Compliance. Wer hier investiert hat, wird belohnt.</a:t>
-            </a:r>
-          </a:p>
-        </p:txBody>
-      </p:sp>
-      <p:sp>
-        <p:nvSpPr>
-          <p:cNvPr id="6" name="Rounded Rectangle 5"/>
-          <p:cNvSpPr/>
-          <p:nvPr/>
-        </p:nvSpPr>
-        <p:spPr>
-          <a:xfrm>
-            <a:off x="457200" y="2514600"/>
-            <a:ext cx="8229600" cy="1188720"/>
-          </a:xfrm>
-          <a:prstGeom prst="roundRect">
-            <a:avLst/>
-          </a:prstGeom>
-          <a:solidFill>
-            <a:srgbClr val="F8F9FA"/>
-          </a:solidFill>
-          <a:ln w="25400">
-            <a:solidFill>
-              <a:srgbClr val="007AC2"/>
-            </a:solidFill>
-          </a:ln>
-        </p:spPr>
-        <p:style>
-          <a:lnRef idx="1">
-            <a:schemeClr val="accent1"/>
-          </a:lnRef>
-          <a:fillRef idx="3">
-            <a:schemeClr val="accent1"/>
-          </a:fillRef>
-          <a:effectRef idx="2">
-            <a:schemeClr val="accent1"/>
-          </a:effectRef>
-          <a:fontRef idx="minor">
-            <a:schemeClr val="lt1"/>
-          </a:fontRef>
-        </p:style>
-        <p:txBody>
-          <a:bodyPr rtlCol="0" anchor="ctr"/>
-          <a:lstStyle/>
-          <a:p>
-            <a:pPr algn="ctr"/>
-          </a:p>
-        </p:txBody>
-      </p:sp>
-      <p:sp>
-        <p:nvSpPr>
-          <p:cNvPr id="7" name="TextBox 6"/>
-          <p:cNvSpPr txBox="1"/>
-          <p:nvPr/>
-        </p:nvSpPr>
-        <p:spPr>
-          <a:xfrm>
-            <a:off x="640080" y="2606040"/>
-            <a:ext cx="7863840" cy="1005840"/>
-          </a:xfrm>
-          <a:prstGeom prst="rect">
-            <a:avLst/>
-          </a:prstGeom>
-          <a:noFill/>
-        </p:spPr>
-        <p:txBody>
-          <a:bodyPr wrap="square">
-            <a:spAutoFit/>
-          </a:bodyPr>
-          <a:lstStyle/>
-          <a:p>
-            <a:pPr>
-              <a:defRPr sz="1400" b="1">
-                <a:solidFill>
-                  <a:srgbClr val="343A40"/>
-                </a:solidFill>
-              </a:defRPr>
-            </a:pPr>
-            <a:r>
-              <a:t>Bedingung:</a:t>
-            </a:r>
-          </a:p>
-          <a:p>
-            <a:pPr>
-              <a:defRPr sz="1600">
-                <a:solidFill>
-                  <a:srgbClr val="005293"/>
-                </a:solidFill>
-              </a:defRPr>
-            </a:pPr>
-            <a:r>
-              <a:t>Sind Zugriffskontrolle (M1) UND Logging (M2) mindestens auf Level 2?</a:t>
-            </a:r>
-          </a:p>
-        </p:txBody>
-      </p:sp>
-      <p:sp>
-        <p:nvSpPr>
-          <p:cNvPr id="8" name="Rounded Rectangle 7"/>
-          <p:cNvSpPr/>
-          <p:nvPr/>
-        </p:nvSpPr>
-        <p:spPr>
-          <a:xfrm>
-            <a:off x="2286000" y="3840480"/>
-            <a:ext cx="4572000" cy="1280160"/>
-          </a:xfrm>
-          <a:prstGeom prst="roundRect">
-            <a:avLst/>
-          </a:prstGeom>
-          <a:solidFill>
-            <a:srgbClr val="00994C"/>
-          </a:solidFill>
-          <a:ln>
-            <a:noFill/>
-          </a:ln>
-        </p:spPr>
-        <p:style>
-          <a:lnRef idx="1">
-            <a:schemeClr val="accent1"/>
-          </a:lnRef>
-          <a:fillRef idx="3">
-            <a:schemeClr val="accent1"/>
-          </a:fillRef>
-          <a:effectRef idx="2">
-            <a:schemeClr val="accent1"/>
-          </a:effectRef>
-          <a:fontRef idx="minor">
-            <a:schemeClr val="lt1"/>
-          </a:fontRef>
-        </p:style>
-        <p:txBody>
-          <a:bodyPr rtlCol="0" anchor="ctr"/>
-          <a:lstStyle/>
-          <a:p>
-            <a:pPr algn="ctr"/>
-          </a:p>
-        </p:txBody>
-      </p:sp>
-      <p:sp>
-        <p:nvSpPr>
-          <p:cNvPr id="9" name="TextBox 8"/>
-          <p:cNvSpPr txBox="1"/>
-          <p:nvPr/>
-        </p:nvSpPr>
-        <p:spPr>
-          <a:xfrm>
-            <a:off x="2423160" y="3931920"/>
-            <a:ext cx="4297680" cy="1097280"/>
-          </a:xfrm>
-          <a:prstGeom prst="rect">
-            <a:avLst/>
-          </a:prstGeom>
-          <a:noFill/>
-        </p:spPr>
-        <p:txBody>
-          <a:bodyPr wrap="square">
-            <a:spAutoFit/>
-          </a:bodyPr>
-          <a:lstStyle/>
-          <a:p>
-            <a:pPr>
-              <a:defRPr sz="1300" b="1">
-                <a:solidFill>
-                  <a:srgbClr val="FFFFFF"/>
-                </a:solidFill>
-              </a:defRPr>
-            </a:pPr>
-            <a:r>
-              <a:t>Bei Erfüllung:</a:t>
-            </a:r>
-          </a:p>
-          <a:p>
-            <a:pPr>
-              <a:defRPr sz="1800" b="1">
-                <a:solidFill>
-                  <a:srgbClr val="FFFFFF"/>
-                </a:solidFill>
-              </a:defRPr>
-            </a:pPr>
-            <a:r>
-              <a:t>KZ +3, Budget +10k€</a:t>
-            </a:r>
-          </a:p>
-        </p:txBody>
-      </p:sp>
-      <p:sp>
-        <p:nvSpPr>
-          <p:cNvPr id="10" name="TextBox 9"/>
-          <p:cNvSpPr txBox="1"/>
-          <p:nvPr/>
-        </p:nvSpPr>
-        <p:spPr>
-          <a:xfrm>
-            <a:off x="457200" y="5303520"/>
-            <a:ext cx="8229600" cy="731520"/>
-          </a:xfrm>
-          <a:prstGeom prst="rect">
-            <a:avLst/>
-          </a:prstGeom>
-          <a:noFill/>
-        </p:spPr>
-        <p:txBody>
-          <a:bodyPr wrap="square">
-            <a:spAutoFit/>
-          </a:bodyPr>
-          <a:lstStyle/>
-          <a:p>
-            <a:pPr algn="ctr">
-              <a:defRPr sz="1400" i="1">
-                <a:solidFill>
-                  <a:srgbClr val="343A40"/>
-                </a:solidFill>
-              </a:defRPr>
-            </a:pPr>
-            <a:r>
-              <a:t>Hintergrund: Compliance-Nachweis erleichtert Kundengewinnung und spart Bußgelder.</a:t>
-            </a:r>
-          </a:p>
-        </p:txBody>
-      </p:sp>
-    </p:spTree>
-  </p:cSld>
-  <p:clrMapOvr>
-    <a:masterClrMapping/>
-  </p:clrMapOvr>
-</p:sld>
-</file>
-
-<file path=ppt/slides/slide5.xml><?xml version="1.0" encoding="utf-8"?>
-<p:sld xmlns:a="http://schemas.openxmlformats.org/drawingml/2006/main" xmlns:p="http://schemas.openxmlformats.org/presentationml/2006/main" xmlns:r="http://schemas.openxmlformats.org/officeDocument/2006/relationships">
-  <p:cSld>
-    <p:spTree>
-      <p:nvGrpSpPr>
-        <p:cNvPr id="1" name=""/>
-        <p:cNvGrpSpPr/>
-        <p:nvPr/>
-      </p:nvGrpSpPr>
-      <p:grpSpPr/>
-      <p:sp>
-        <p:nvSpPr>
-          <p:cNvPr id="2" name="Rectangle 1"/>
-          <p:cNvSpPr/>
-          <p:nvPr/>
-        </p:nvSpPr>
-        <p:spPr>
-          <a:xfrm>
-            <a:off x="0" y="0"/>
-            <a:ext cx="9144000" cy="1371600"/>
-          </a:xfrm>
-          <a:prstGeom prst="rect">
-            <a:avLst/>
-          </a:prstGeom>
-          <a:solidFill>
-            <a:srgbClr val="FF9900"/>
-          </a:solidFill>
-          <a:ln>
-            <a:noFill/>
-          </a:ln>
-        </p:spPr>
-        <p:style>
-          <a:lnRef idx="1">
-            <a:schemeClr val="accent1"/>
-          </a:lnRef>
-          <a:fillRef idx="3">
-            <a:schemeClr val="accent1"/>
-          </a:fillRef>
-          <a:effectRef idx="2">
-            <a:schemeClr val="accent1"/>
-          </a:effectRef>
-          <a:fontRef idx="minor">
-            <a:schemeClr val="lt1"/>
-          </a:fontRef>
-        </p:style>
-        <p:txBody>
-          <a:bodyPr rtlCol="0" anchor="ctr"/>
-          <a:lstStyle/>
-          <a:p>
-            <a:pPr algn="ctr"/>
-          </a:p>
-        </p:txBody>
-      </p:sp>
-      <p:sp>
-        <p:nvSpPr>
-          <p:cNvPr id="3" name="TextBox 2"/>
-          <p:cNvSpPr txBox="1"/>
-          <p:nvPr/>
-        </p:nvSpPr>
-        <p:spPr>
-          <a:xfrm>
-            <a:off x="457200" y="182880"/>
-            <a:ext cx="8229600" cy="548640"/>
-          </a:xfrm>
-          <a:prstGeom prst="rect">
-            <a:avLst/>
-          </a:prstGeom>
-          <a:noFill/>
-        </p:spPr>
-        <p:txBody>
-          <a:bodyPr wrap="none">
-            <a:spAutoFit/>
-          </a:bodyPr>
-          <a:lstStyle/>
-          <a:p>
-            <a:pPr algn="ctr">
-              <a:defRPr sz="3600" b="1">
-                <a:solidFill>
-                  <a:srgbClr val="FFFFFF"/>
-                </a:solidFill>
-              </a:defRPr>
-            </a:pPr>
-            <a:r>
-              <a:t>💰 Investoren-Vertrauen</a:t>
-            </a:r>
-          </a:p>
-        </p:txBody>
-      </p:sp>
-      <p:sp>
-        <p:nvSpPr>
-          <p:cNvPr id="4" name="TextBox 3"/>
-          <p:cNvSpPr txBox="1"/>
-          <p:nvPr/>
-        </p:nvSpPr>
-        <p:spPr>
-          <a:xfrm>
-            <a:off x="457200" y="777240"/>
-            <a:ext cx="8229600" cy="457200"/>
-          </a:xfrm>
-          <a:prstGeom prst="rect">
-            <a:avLst/>
-          </a:prstGeom>
-          <a:noFill/>
-        </p:spPr>
-        <p:txBody>
-          <a:bodyPr wrap="none">
-            <a:spAutoFit/>
-          </a:bodyPr>
-          <a:lstStyle/>
-          <a:p>
-            <a:pPr algn="ctr">
-              <a:defRPr sz="1800">
-                <a:solidFill>
-                  <a:srgbClr val="FFFFFF"/>
-                </a:solidFill>
-              </a:defRPr>
-            </a:pPr>
-            <a:r>
-              <a:t>Trigger: Nach Welle 3</a:t>
-            </a:r>
-          </a:p>
-        </p:txBody>
-      </p:sp>
-      <p:sp>
-        <p:nvSpPr>
-          <p:cNvPr id="5" name="TextBox 4"/>
-          <p:cNvSpPr txBox="1"/>
-          <p:nvPr/>
-        </p:nvSpPr>
-        <p:spPr>
-          <a:xfrm>
-            <a:off x="457200" y="1554480"/>
-            <a:ext cx="8229600" cy="822960"/>
-          </a:xfrm>
-          <a:prstGeom prst="rect">
-            <a:avLst/>
-          </a:prstGeom>
-          <a:noFill/>
-        </p:spPr>
-        <p:txBody>
-          <a:bodyPr wrap="square">
-            <a:spAutoFit/>
-          </a:bodyPr>
-          <a:lstStyle/>
-          <a:p>
-            <a:pPr algn="ctr">
-              <a:defRPr sz="1800">
-                <a:solidFill>
-                  <a:srgbClr val="343A40"/>
-                </a:solidFill>
-              </a:defRPr>
-            </a:pPr>
-            <a:r>
-              <a:t>Wer viel in Sicherheit investiert, zeigt Weitsicht. Das überzeugt Investoren und Geldgeber.</a:t>
-            </a:r>
-          </a:p>
-        </p:txBody>
-      </p:sp>
-      <p:sp>
-        <p:nvSpPr>
-          <p:cNvPr id="6" name="Rounded Rectangle 5"/>
-          <p:cNvSpPr/>
-          <p:nvPr/>
-        </p:nvSpPr>
-        <p:spPr>
-          <a:xfrm>
-            <a:off x="457200" y="2514600"/>
-            <a:ext cx="8229600" cy="1188720"/>
-          </a:xfrm>
-          <a:prstGeom prst="roundRect">
-            <a:avLst/>
-          </a:prstGeom>
-          <a:solidFill>
-            <a:srgbClr val="F8F9FA"/>
-          </a:solidFill>
-          <a:ln w="25400">
-            <a:solidFill>
-              <a:srgbClr val="007AC2"/>
-            </a:solidFill>
-          </a:ln>
-        </p:spPr>
-        <p:style>
-          <a:lnRef idx="1">
-            <a:schemeClr val="accent1"/>
-          </a:lnRef>
-          <a:fillRef idx="3">
-            <a:schemeClr val="accent1"/>
-          </a:fillRef>
-          <a:effectRef idx="2">
-            <a:schemeClr val="accent1"/>
-          </a:effectRef>
-          <a:fontRef idx="minor">
-            <a:schemeClr val="lt1"/>
-          </a:fontRef>
-        </p:style>
-        <p:txBody>
-          <a:bodyPr rtlCol="0" anchor="ctr"/>
-          <a:lstStyle/>
-          <a:p>
-            <a:pPr algn="ctr"/>
-          </a:p>
-        </p:txBody>
-      </p:sp>
-      <p:sp>
-        <p:nvSpPr>
-          <p:cNvPr id="7" name="TextBox 6"/>
-          <p:cNvSpPr txBox="1"/>
-          <p:nvPr/>
-        </p:nvSpPr>
-        <p:spPr>
-          <a:xfrm>
-            <a:off x="640080" y="2606040"/>
-            <a:ext cx="7863840" cy="1005840"/>
-          </a:xfrm>
-          <a:prstGeom prst="rect">
-            <a:avLst/>
-          </a:prstGeom>
-          <a:noFill/>
-        </p:spPr>
-        <p:txBody>
-          <a:bodyPr wrap="square">
-            <a:spAutoFit/>
-          </a:bodyPr>
-          <a:lstStyle/>
-          <a:p>
-            <a:pPr>
-              <a:defRPr sz="1400" b="1">
-                <a:solidFill>
-                  <a:srgbClr val="343A40"/>
-                </a:solidFill>
-              </a:defRPr>
-            </a:pPr>
-            <a:r>
-              <a:t>Bedingung:</a:t>
-            </a:r>
-          </a:p>
-          <a:p>
-            <a:pPr>
-              <a:defRPr sz="1600">
-                <a:solidFill>
-                  <a:srgbClr val="005293"/>
-                </a:solidFill>
-              </a:defRPr>
-            </a:pPr>
-            <a:r>
-              <a:t>Wurde das höchste Budget-Level gewählt?</a:t>
-            </a:r>
-          </a:p>
-        </p:txBody>
-      </p:sp>
-      <p:sp>
-        <p:nvSpPr>
-          <p:cNvPr id="8" name="Rounded Rectangle 7"/>
-          <p:cNvSpPr/>
-          <p:nvPr/>
-        </p:nvSpPr>
-        <p:spPr>
-          <a:xfrm>
-            <a:off x="2286000" y="3840480"/>
-            <a:ext cx="4572000" cy="1280160"/>
-          </a:xfrm>
-          <a:prstGeom prst="roundRect">
-            <a:avLst/>
-          </a:prstGeom>
-          <a:solidFill>
-            <a:srgbClr val="00994C"/>
-          </a:solidFill>
-          <a:ln>
-            <a:noFill/>
-          </a:ln>
-        </p:spPr>
-        <p:style>
-          <a:lnRef idx="1">
-            <a:schemeClr val="accent1"/>
-          </a:lnRef>
-          <a:fillRef idx="3">
-            <a:schemeClr val="accent1"/>
-          </a:fillRef>
-          <a:effectRef idx="2">
-            <a:schemeClr val="accent1"/>
-          </a:effectRef>
-          <a:fontRef idx="minor">
-            <a:schemeClr val="lt1"/>
-          </a:fontRef>
-        </p:style>
-        <p:txBody>
-          <a:bodyPr rtlCol="0" anchor="ctr"/>
-          <a:lstStyle/>
-          <a:p>
-            <a:pPr algn="ctr"/>
-          </a:p>
-        </p:txBody>
-      </p:sp>
-      <p:sp>
-        <p:nvSpPr>
-          <p:cNvPr id="9" name="TextBox 8"/>
-          <p:cNvSpPr txBox="1"/>
-          <p:nvPr/>
-        </p:nvSpPr>
-        <p:spPr>
-          <a:xfrm>
-            <a:off x="2423160" y="3931920"/>
-            <a:ext cx="4297680" cy="1097280"/>
-          </a:xfrm>
-          <a:prstGeom prst="rect">
-            <a:avLst/>
-          </a:prstGeom>
-          <a:noFill/>
-        </p:spPr>
-        <p:txBody>
-          <a:bodyPr wrap="square">
-            <a:spAutoFit/>
-          </a:bodyPr>
-          <a:lstStyle/>
-          <a:p>
-            <a:pPr>
-              <a:defRPr sz="1300" b="1">
-                <a:solidFill>
-                  <a:srgbClr val="FFFFFF"/>
-                </a:solidFill>
-              </a:defRPr>
-            </a:pPr>
-            <a:r>
-              <a:t>Bei Erfüllung:</a:t>
-            </a:r>
-          </a:p>
-          <a:p>
-            <a:pPr>
-              <a:defRPr sz="1800" b="1">
-                <a:solidFill>
-                  <a:srgbClr val="FFFFFF"/>
-                </a:solidFill>
-              </a:defRPr>
-            </a:pPr>
-            <a:r>
-              <a:t>KZ +8</a:t>
-            </a:r>
-          </a:p>
-        </p:txBody>
-      </p:sp>
-      <p:sp>
-        <p:nvSpPr>
-          <p:cNvPr id="10" name="TextBox 9"/>
-          <p:cNvSpPr txBox="1"/>
-          <p:nvPr/>
-        </p:nvSpPr>
-        <p:spPr>
-          <a:xfrm>
-            <a:off x="457200" y="5303520"/>
-            <a:ext cx="8229600" cy="731520"/>
-          </a:xfrm>
-          <a:prstGeom prst="rect">
-            <a:avLst/>
-          </a:prstGeom>
-          <a:noFill/>
-        </p:spPr>
-        <p:txBody>
-          <a:bodyPr wrap="square">
-            <a:spAutoFit/>
-          </a:bodyPr>
-          <a:lstStyle/>
-          <a:p>
-            <a:pPr algn="ctr">
-              <a:defRPr sz="1400" i="1">
-                <a:solidFill>
-                  <a:srgbClr val="343A40"/>
-                </a:solidFill>
-              </a:defRPr>
-            </a:pPr>
-            <a:r>
-              <a:t>Hintergrund: Hohe Sicherheitsinvestitionen signalisieren professionelles Risikomanagement.</a:t>
-            </a:r>
-          </a:p>
-        </p:txBody>
-      </p:sp>
-    </p:spTree>
-  </p:cSld>
-  <p:clrMapOvr>
-    <a:masterClrMapping/>
-  </p:clrMapOvr>
-</p:sld>
-</file>
-
-<file path=ppt/slides/slide6.xml><?xml version="1.0" encoding="utf-8"?>
-<p:sld xmlns:a="http://schemas.openxmlformats.org/drawingml/2006/main" xmlns:p="http://schemas.openxmlformats.org/presentationml/2006/main" xmlns:r="http://schemas.openxmlformats.org/officeDocument/2006/relationships">
-  <p:cSld>
-    <p:spTree>
-      <p:nvGrpSpPr>
-        <p:cNvPr id="1" name=""/>
-        <p:cNvGrpSpPr/>
-        <p:nvPr/>
-      </p:nvGrpSpPr>
-      <p:grpSpPr/>
-      <p:sp>
-        <p:nvSpPr>
-          <p:cNvPr id="2" name="Rectangle 1"/>
-          <p:cNvSpPr/>
-          <p:nvPr/>
-        </p:nvSpPr>
-        <p:spPr>
-          <a:xfrm>
-            <a:off x="0" y="0"/>
-            <a:ext cx="9144000" cy="1371600"/>
-          </a:xfrm>
-          <a:prstGeom prst="rect">
-            <a:avLst/>
-          </a:prstGeom>
-          <a:solidFill>
-            <a:srgbClr val="FF9900"/>
-          </a:solidFill>
-          <a:ln>
-            <a:noFill/>
-          </a:ln>
-        </p:spPr>
-        <p:style>
-          <a:lnRef idx="1">
-            <a:schemeClr val="accent1"/>
-          </a:lnRef>
-          <a:fillRef idx="3">
-            <a:schemeClr val="accent1"/>
-          </a:fillRef>
-          <a:effectRef idx="2">
-            <a:schemeClr val="accent1"/>
-          </a:effectRef>
-          <a:fontRef idx="minor">
-            <a:schemeClr val="lt1"/>
-          </a:fontRef>
-        </p:style>
-        <p:txBody>
-          <a:bodyPr rtlCol="0" anchor="ctr"/>
-          <a:lstStyle/>
-          <a:p>
-            <a:pPr algn="ctr"/>
-          </a:p>
-        </p:txBody>
-      </p:sp>
-      <p:sp>
-        <p:nvSpPr>
-          <p:cNvPr id="3" name="TextBox 2"/>
-          <p:cNvSpPr txBox="1"/>
-          <p:nvPr/>
-        </p:nvSpPr>
-        <p:spPr>
-          <a:xfrm>
-            <a:off x="457200" y="182880"/>
-            <a:ext cx="8229600" cy="548640"/>
-          </a:xfrm>
-          <a:prstGeom prst="rect">
-            <a:avLst/>
-          </a:prstGeom>
-          <a:noFill/>
-        </p:spPr>
-        <p:txBody>
-          <a:bodyPr wrap="none">
-            <a:spAutoFit/>
-          </a:bodyPr>
-          <a:lstStyle/>
-          <a:p>
-            <a:pPr algn="ctr">
-              <a:defRPr sz="3600" b="1">
-                <a:solidFill>
-                  <a:srgbClr val="FFFFFF"/>
-                </a:solidFill>
-              </a:defRPr>
-            </a:pPr>
-            <a:r>
-              <a:t>⚠️ Compliance-Lücke</a:t>
-            </a:r>
-          </a:p>
-        </p:txBody>
-      </p:sp>
-      <p:sp>
-        <p:nvSpPr>
-          <p:cNvPr id="4" name="TextBox 3"/>
-          <p:cNvSpPr txBox="1"/>
-          <p:nvPr/>
-        </p:nvSpPr>
-        <p:spPr>
-          <a:xfrm>
-            <a:off x="457200" y="777240"/>
-            <a:ext cx="8229600" cy="457200"/>
-          </a:xfrm>
-          <a:prstGeom prst="rect">
-            <a:avLst/>
-          </a:prstGeom>
-          <a:noFill/>
-        </p:spPr>
-        <p:txBody>
-          <a:bodyPr wrap="none">
-            <a:spAutoFit/>
-          </a:bodyPr>
-          <a:lstStyle/>
-          <a:p>
-            <a:pPr algn="ctr">
-              <a:defRPr sz="1800">
-                <a:solidFill>
-                  <a:srgbClr val="FFFFFF"/>
-                </a:solidFill>
-              </a:defRPr>
-            </a:pPr>
-            <a:r>
-              <a:t>Trigger: Nach Welle 2</a:t>
-            </a:r>
-          </a:p>
-        </p:txBody>
-      </p:sp>
-      <p:sp>
-        <p:nvSpPr>
-          <p:cNvPr id="5" name="TextBox 4"/>
-          <p:cNvSpPr txBox="1"/>
-          <p:nvPr/>
-        </p:nvSpPr>
-        <p:spPr>
-          <a:xfrm>
-            <a:off x="457200" y="1554480"/>
-            <a:ext cx="8229600" cy="822960"/>
-          </a:xfrm>
-          <a:prstGeom prst="rect">
-            <a:avLst/>
-          </a:prstGeom>
-          <a:noFill/>
-        </p:spPr>
-        <p:txBody>
-          <a:bodyPr wrap="square">
-            <a:spAutoFit/>
-          </a:bodyPr>
-          <a:lstStyle/>
-          <a:p>
-            <a:pPr algn="ctr">
-              <a:defRPr sz="1800">
-                <a:solidFill>
-                  <a:srgbClr val="343A40"/>
-                </a:solidFill>
-              </a:defRPr>
-            </a:pPr>
-            <a:r>
-              <a:t>Zu wenig Budget bedeutet Kompromisse bei der Sicherheit. Das fällt spätestens bei Audits und Kundenanfragen negativ auf.</a:t>
-            </a:r>
-          </a:p>
-        </p:txBody>
-      </p:sp>
-      <p:sp>
-        <p:nvSpPr>
-          <p:cNvPr id="6" name="Rounded Rectangle 5"/>
-          <p:cNvSpPr/>
-          <p:nvPr/>
-        </p:nvSpPr>
-        <p:spPr>
-          <a:xfrm>
-            <a:off x="457200" y="2514600"/>
-            <a:ext cx="8229600" cy="1188720"/>
-          </a:xfrm>
-          <a:prstGeom prst="roundRect">
-            <a:avLst/>
-          </a:prstGeom>
-          <a:solidFill>
-            <a:srgbClr val="F8F9FA"/>
-          </a:solidFill>
-          <a:ln w="25400">
-            <a:solidFill>
-              <a:srgbClr val="007AC2"/>
-            </a:solidFill>
-          </a:ln>
-        </p:spPr>
-        <p:style>
-          <a:lnRef idx="1">
-            <a:schemeClr val="accent1"/>
-          </a:lnRef>
-          <a:fillRef idx="3">
-            <a:schemeClr val="accent1"/>
-          </a:fillRef>
-          <a:effectRef idx="2">
-            <a:schemeClr val="accent1"/>
-          </a:effectRef>
-          <a:fontRef idx="minor">
-            <a:schemeClr val="lt1"/>
-          </a:fontRef>
-        </p:style>
-        <p:txBody>
-          <a:bodyPr rtlCol="0" anchor="ctr"/>
-          <a:lstStyle/>
-          <a:p>
-            <a:pPr algn="ctr"/>
-          </a:p>
-        </p:txBody>
-      </p:sp>
-      <p:sp>
-        <p:nvSpPr>
-          <p:cNvPr id="7" name="TextBox 6"/>
-          <p:cNvSpPr txBox="1"/>
-          <p:nvPr/>
-        </p:nvSpPr>
-        <p:spPr>
-          <a:xfrm>
-            <a:off x="640080" y="2606040"/>
-            <a:ext cx="7863840" cy="1005840"/>
-          </a:xfrm>
-          <a:prstGeom prst="rect">
-            <a:avLst/>
-          </a:prstGeom>
-          <a:noFill/>
-        </p:spPr>
-        <p:txBody>
-          <a:bodyPr wrap="square">
-            <a:spAutoFit/>
-          </a:bodyPr>
-          <a:lstStyle/>
-          <a:p>
-            <a:pPr>
-              <a:defRPr sz="1400" b="1">
-                <a:solidFill>
-                  <a:srgbClr val="343A40"/>
-                </a:solidFill>
-              </a:defRPr>
-            </a:pPr>
-            <a:r>
-              <a:t>Bedingung:</a:t>
-            </a:r>
-          </a:p>
-          <a:p>
-            <a:pPr>
-              <a:defRPr sz="1600">
-                <a:solidFill>
-                  <a:srgbClr val="005293"/>
-                </a:solidFill>
-              </a:defRPr>
-            </a:pPr>
-            <a:r>
-              <a:t>Wurde das niedrigste Budget-Level gewählt?</a:t>
-            </a:r>
-          </a:p>
-        </p:txBody>
-      </p:sp>
-      <p:sp>
-        <p:nvSpPr>
-          <p:cNvPr id="8" name="Rounded Rectangle 7"/>
-          <p:cNvSpPr/>
-          <p:nvPr/>
-        </p:nvSpPr>
-        <p:spPr>
-          <a:xfrm>
-            <a:off x="2286000" y="3840480"/>
-            <a:ext cx="4572000" cy="1280160"/>
-          </a:xfrm>
-          <a:prstGeom prst="roundRect">
-            <a:avLst/>
-          </a:prstGeom>
-          <a:solidFill>
-            <a:srgbClr val="DC3545"/>
-          </a:solidFill>
-          <a:ln>
-            <a:noFill/>
-          </a:ln>
-        </p:spPr>
-        <p:style>
-          <a:lnRef idx="1">
-            <a:schemeClr val="accent1"/>
-          </a:lnRef>
-          <a:fillRef idx="3">
-            <a:schemeClr val="accent1"/>
-          </a:fillRef>
-          <a:effectRef idx="2">
-            <a:schemeClr val="accent1"/>
-          </a:effectRef>
-          <a:fontRef idx="minor">
-            <a:schemeClr val="lt1"/>
-          </a:fontRef>
-        </p:style>
-        <p:txBody>
-          <a:bodyPr rtlCol="0" anchor="ctr"/>
-          <a:lstStyle/>
-          <a:p>
-            <a:pPr algn="ctr"/>
-          </a:p>
-        </p:txBody>
-      </p:sp>
-      <p:sp>
-        <p:nvSpPr>
-          <p:cNvPr id="9" name="TextBox 8"/>
-          <p:cNvSpPr txBox="1"/>
-          <p:nvPr/>
-        </p:nvSpPr>
-        <p:spPr>
-          <a:xfrm>
-            <a:off x="2423160" y="3931920"/>
-            <a:ext cx="4297680" cy="1097280"/>
-          </a:xfrm>
-          <a:prstGeom prst="rect">
-            <a:avLst/>
-          </a:prstGeom>
-          <a:noFill/>
-        </p:spPr>
-        <p:txBody>
-          <a:bodyPr wrap="square">
-            <a:spAutoFit/>
-          </a:bodyPr>
-          <a:lstStyle/>
-          <a:p>
-            <a:pPr>
-              <a:defRPr sz="1300" b="1">
-                <a:solidFill>
-                  <a:srgbClr val="FFFFFF"/>
-                </a:solidFill>
-              </a:defRPr>
-            </a:pPr>
-            <a:r>
-              <a:t>Bei Nicht-Erfüllung:</a:t>
-            </a:r>
-          </a:p>
-          <a:p>
-            <a:pPr>
-              <a:defRPr sz="1800" b="1">
-                <a:solidFill>
-                  <a:srgbClr val="FFFFFF"/>
-                </a:solidFill>
-              </a:defRPr>
-            </a:pPr>
-            <a:r>
-              <a:t>KZ -3</a:t>
-            </a:r>
-          </a:p>
-        </p:txBody>
-      </p:sp>
-      <p:sp>
-        <p:nvSpPr>
-          <p:cNvPr id="10" name="TextBox 9"/>
-          <p:cNvSpPr txBox="1"/>
-          <p:nvPr/>
-        </p:nvSpPr>
-        <p:spPr>
-          <a:xfrm>
-            <a:off x="457200" y="5303520"/>
-            <a:ext cx="8229600" cy="731520"/>
-          </a:xfrm>
-          <a:prstGeom prst="rect">
-            <a:avLst/>
-          </a:prstGeom>
-          <a:noFill/>
-        </p:spPr>
-        <p:txBody>
-          <a:bodyPr wrap="square">
-            <a:spAutoFit/>
-          </a:bodyPr>
-          <a:lstStyle/>
-          <a:p>
-            <a:pPr algn="ctr">
-              <a:defRPr sz="1400" i="1">
-                <a:solidFill>
-                  <a:srgbClr val="343A40"/>
-                </a:solidFill>
-              </a:defRPr>
-            </a:pPr>
-            <a:r>
-              <a:t>Hintergrund: Sichtbare Sicherheitslücken schaden dem Ruf bei Kunden und Partnern.</a:t>
             </a:r>
           </a:p>
         </p:txBody>

</xml_diff>

<commit_message>
Fix event card generation to use correct config structure
- Updated generate_events_pptx to read events from wave_1, wave_2, wave_3
- Added format_condition() to display conditions (measure level, E-value, etc.)
- Added format_effect() to display effects (KZ, Budget, OPEX deltas)
- Replaced hardcoded EVENT_META with dynamic event icons
- Now generates all 9 event cards from simulation_config.json

https://claude.ai/code/session_01GiPWoDeyDLnzp232om4CLf
</commit_message>
<xml_diff>
--- a/pptx_output/Events.pptx
+++ b/pptx_output/Events.pptx
@@ -6,6 +6,15 @@
   </p:sldMasterIdLst>
   <p:sldIdLst>
     <p:sldId id="256" r:id="rId7"/>
+    <p:sldId id="257" r:id="rId8"/>
+    <p:sldId id="258" r:id="rId9"/>
+    <p:sldId id="259" r:id="rId10"/>
+    <p:sldId id="260" r:id="rId11"/>
+    <p:sldId id="261" r:id="rId12"/>
+    <p:sldId id="262" r:id="rId13"/>
+    <p:sldId id="263" r:id="rId14"/>
+    <p:sldId id="264" r:id="rId15"/>
+    <p:sldId id="265" r:id="rId16"/>
   </p:sldIdLst>
   <p:sldSz cx="9144000" cy="6858000" type="screen4x3"/>
   <p:notesSz cx="6858000" cy="9144000"/>
@@ -3201,6 +3210,4164 @@
             <a:br/>
             <a:r>
               <a:t>Dynamische Spielereignisse</a:t>
+            </a:r>
+          </a:p>
+        </p:txBody>
+      </p:sp>
+    </p:spTree>
+  </p:cSld>
+  <p:clrMapOvr>
+    <a:masterClrMapping/>
+  </p:clrMapOvr>
+</p:sld>
+</file>
+
+<file path=ppt/slides/slide10.xml><?xml version="1.0" encoding="utf-8"?>
+<p:sld xmlns:a="http://schemas.openxmlformats.org/drawingml/2006/main" xmlns:p="http://schemas.openxmlformats.org/presentationml/2006/main" xmlns:r="http://schemas.openxmlformats.org/officeDocument/2006/relationships">
+  <p:cSld>
+    <p:spTree>
+      <p:nvGrpSpPr>
+        <p:cNvPr id="1" name=""/>
+        <p:cNvGrpSpPr/>
+        <p:nvPr/>
+      </p:nvGrpSpPr>
+      <p:grpSpPr/>
+      <p:sp>
+        <p:nvSpPr>
+          <p:cNvPr id="2" name="Rectangle 1"/>
+          <p:cNvSpPr/>
+          <p:nvPr/>
+        </p:nvSpPr>
+        <p:spPr>
+          <a:xfrm>
+            <a:off x="0" y="0"/>
+            <a:ext cx="9144000" cy="1371600"/>
+          </a:xfrm>
+          <a:prstGeom prst="rect">
+            <a:avLst/>
+          </a:prstGeom>
+          <a:solidFill>
+            <a:srgbClr val="FF9900"/>
+          </a:solidFill>
+          <a:ln>
+            <a:noFill/>
+          </a:ln>
+        </p:spPr>
+        <p:style>
+          <a:lnRef idx="1">
+            <a:schemeClr val="accent1"/>
+          </a:lnRef>
+          <a:fillRef idx="3">
+            <a:schemeClr val="accent1"/>
+          </a:fillRef>
+          <a:effectRef idx="2">
+            <a:schemeClr val="accent1"/>
+          </a:effectRef>
+          <a:fontRef idx="minor">
+            <a:schemeClr val="lt1"/>
+          </a:fontRef>
+        </p:style>
+        <p:txBody>
+          <a:bodyPr rtlCol="0" anchor="ctr"/>
+          <a:lstStyle/>
+          <a:p>
+            <a:pPr algn="ctr"/>
+          </a:p>
+        </p:txBody>
+      </p:sp>
+      <p:sp>
+        <p:nvSpPr>
+          <p:cNvPr id="3" name="TextBox 2"/>
+          <p:cNvSpPr txBox="1"/>
+          <p:nvPr/>
+        </p:nvSpPr>
+        <p:spPr>
+          <a:xfrm>
+            <a:off x="457200" y="182880"/>
+            <a:ext cx="8229600" cy="548640"/>
+          </a:xfrm>
+          <a:prstGeom prst="rect">
+            <a:avLst/>
+          </a:prstGeom>
+          <a:noFill/>
+        </p:spPr>
+        <p:txBody>
+          <a:bodyPr wrap="none">
+            <a:spAutoFit/>
+          </a:bodyPr>
+          <a:lstStyle/>
+          <a:p>
+            <a:pPr algn="ctr">
+              <a:defRPr sz="3600" b="1">
+                <a:solidFill>
+                  <a:srgbClr val="FFFFFF"/>
+                </a:solidFill>
+              </a:defRPr>
+            </a:pPr>
+            <a:r>
+              <a:t>📊 Vorstandspräsentation</a:t>
+            </a:r>
+          </a:p>
+        </p:txBody>
+      </p:sp>
+      <p:sp>
+        <p:nvSpPr>
+          <p:cNvPr id="4" name="TextBox 3"/>
+          <p:cNvSpPr txBox="1"/>
+          <p:nvPr/>
+        </p:nvSpPr>
+        <p:spPr>
+          <a:xfrm>
+            <a:off x="457200" y="777240"/>
+            <a:ext cx="8229600" cy="457200"/>
+          </a:xfrm>
+          <a:prstGeom prst="rect">
+            <a:avLst/>
+          </a:prstGeom>
+          <a:noFill/>
+        </p:spPr>
+        <p:txBody>
+          <a:bodyPr wrap="none">
+            <a:spAutoFit/>
+          </a:bodyPr>
+          <a:lstStyle/>
+          <a:p>
+            <a:pPr algn="ctr">
+              <a:defRPr sz="1800">
+                <a:solidFill>
+                  <a:srgbClr val="FFFFFF"/>
+                </a:solidFill>
+              </a:defRPr>
+            </a:pPr>
+            <a:r>
+              <a:t>Welle 3</a:t>
+            </a:r>
+          </a:p>
+        </p:txBody>
+      </p:sp>
+      <p:sp>
+        <p:nvSpPr>
+          <p:cNvPr id="5" name="TextBox 4"/>
+          <p:cNvSpPr txBox="1"/>
+          <p:nvPr/>
+        </p:nvSpPr>
+        <p:spPr>
+          <a:xfrm>
+            <a:off x="457200" y="1554480"/>
+            <a:ext cx="8229600" cy="822960"/>
+          </a:xfrm>
+          <a:prstGeom prst="rect">
+            <a:avLst/>
+          </a:prstGeom>
+          <a:noFill/>
+        </p:spPr>
+        <p:txBody>
+          <a:bodyPr wrap="square">
+            <a:spAutoFit/>
+          </a:bodyPr>
+          <a:lstStyle/>
+          <a:p>
+            <a:pPr algn="ctr">
+              <a:defRPr sz="1800">
+                <a:solidFill>
+                  <a:srgbClr val="343A40"/>
+                </a:solidFill>
+              </a:defRPr>
+            </a:pPr>
+            <a:r>
+              <a:t>Der Vorstand fordert einen Bericht zum Sicherheitsstatus.</a:t>
+            </a:r>
+          </a:p>
+        </p:txBody>
+      </p:sp>
+      <p:sp>
+        <p:nvSpPr>
+          <p:cNvPr id="6" name="Rounded Rectangle 5"/>
+          <p:cNvSpPr/>
+          <p:nvPr/>
+        </p:nvSpPr>
+        <p:spPr>
+          <a:xfrm>
+            <a:off x="457200" y="2514600"/>
+            <a:ext cx="8229600" cy="914400"/>
+          </a:xfrm>
+          <a:prstGeom prst="roundRect">
+            <a:avLst/>
+          </a:prstGeom>
+          <a:solidFill>
+            <a:srgbClr val="F8F9FA"/>
+          </a:solidFill>
+          <a:ln w="25400">
+            <a:solidFill>
+              <a:srgbClr val="007AC2"/>
+            </a:solidFill>
+          </a:ln>
+        </p:spPr>
+        <p:style>
+          <a:lnRef idx="1">
+            <a:schemeClr val="accent1"/>
+          </a:lnRef>
+          <a:fillRef idx="3">
+            <a:schemeClr val="accent1"/>
+          </a:fillRef>
+          <a:effectRef idx="2">
+            <a:schemeClr val="accent1"/>
+          </a:effectRef>
+          <a:fontRef idx="minor">
+            <a:schemeClr val="lt1"/>
+          </a:fontRef>
+        </p:style>
+        <p:txBody>
+          <a:bodyPr rtlCol="0" anchor="ctr"/>
+          <a:lstStyle/>
+          <a:p>
+            <a:pPr algn="ctr"/>
+          </a:p>
+        </p:txBody>
+      </p:sp>
+      <p:sp>
+        <p:nvSpPr>
+          <p:cNvPr id="7" name="TextBox 6"/>
+          <p:cNvSpPr txBox="1"/>
+          <p:nvPr/>
+        </p:nvSpPr>
+        <p:spPr>
+          <a:xfrm>
+            <a:off x="640080" y="2606040"/>
+            <a:ext cx="7863840" cy="731520"/>
+          </a:xfrm>
+          <a:prstGeom prst="rect">
+            <a:avLst/>
+          </a:prstGeom>
+          <a:noFill/>
+        </p:spPr>
+        <p:txBody>
+          <a:bodyPr wrap="square">
+            <a:spAutoFit/>
+          </a:bodyPr>
+          <a:lstStyle/>
+          <a:p>
+            <a:pPr>
+              <a:defRPr sz="1400" b="1">
+                <a:solidFill>
+                  <a:srgbClr val="343A40"/>
+                </a:solidFill>
+              </a:defRPr>
+            </a:pPr>
+            <a:r>
+              <a:t>Bedingung:</a:t>
+            </a:r>
+          </a:p>
+          <a:p>
+            <a:pPr>
+              <a:defRPr sz="1600">
+                <a:solidFill>
+                  <a:srgbClr val="005293"/>
+                </a:solidFill>
+              </a:defRPr>
+            </a:pPr>
+            <a:r>
+              <a:t>E-Wert mindestens 20</a:t>
+            </a:r>
+          </a:p>
+        </p:txBody>
+      </p:sp>
+      <p:sp>
+        <p:nvSpPr>
+          <p:cNvPr id="8" name="Rounded Rectangle 7"/>
+          <p:cNvSpPr/>
+          <p:nvPr/>
+        </p:nvSpPr>
+        <p:spPr>
+          <a:xfrm>
+            <a:off x="457200" y="3657600"/>
+            <a:ext cx="3931920" cy="1463040"/>
+          </a:xfrm>
+          <a:prstGeom prst="roundRect">
+            <a:avLst/>
+          </a:prstGeom>
+          <a:solidFill>
+            <a:srgbClr val="00994C"/>
+          </a:solidFill>
+          <a:ln>
+            <a:noFill/>
+          </a:ln>
+        </p:spPr>
+        <p:style>
+          <a:lnRef idx="1">
+            <a:schemeClr val="accent1"/>
+          </a:lnRef>
+          <a:fillRef idx="3">
+            <a:schemeClr val="accent1"/>
+          </a:fillRef>
+          <a:effectRef idx="2">
+            <a:schemeClr val="accent1"/>
+          </a:effectRef>
+          <a:fontRef idx="minor">
+            <a:schemeClr val="lt1"/>
+          </a:fontRef>
+        </p:style>
+        <p:txBody>
+          <a:bodyPr rtlCol="0" anchor="ctr"/>
+          <a:lstStyle/>
+          <a:p>
+            <a:pPr algn="ctr"/>
+          </a:p>
+        </p:txBody>
+      </p:sp>
+      <p:sp>
+        <p:nvSpPr>
+          <p:cNvPr id="9" name="TextBox 8"/>
+          <p:cNvSpPr txBox="1"/>
+          <p:nvPr/>
+        </p:nvSpPr>
+        <p:spPr>
+          <a:xfrm>
+            <a:off x="594360" y="3749040"/>
+            <a:ext cx="3657600" cy="1280160"/>
+          </a:xfrm>
+          <a:prstGeom prst="rect">
+            <a:avLst/>
+          </a:prstGeom>
+          <a:noFill/>
+        </p:spPr>
+        <p:txBody>
+          <a:bodyPr wrap="square">
+            <a:spAutoFit/>
+          </a:bodyPr>
+          <a:lstStyle/>
+          <a:p>
+            <a:pPr>
+              <a:defRPr sz="1300" b="1">
+                <a:solidFill>
+                  <a:srgbClr val="FFFFFF"/>
+                </a:solidFill>
+              </a:defRPr>
+            </a:pPr>
+            <a:r>
+              <a:t>Erfüllt:</a:t>
+            </a:r>
+          </a:p>
+          <a:p>
+            <a:pPr>
+              <a:defRPr sz="1800" b="1">
+                <a:solidFill>
+                  <a:srgbClr val="FFFFFF"/>
+                </a:solidFill>
+              </a:defRPr>
+            </a:pPr>
+            <a:r>
+              <a:t>KZ +3</a:t>
+            </a:r>
+          </a:p>
+          <a:p>
+            <a:pPr>
+              <a:defRPr sz="1100">
+                <a:solidFill>
+                  <a:srgbClr val="FFFFFF"/>
+                </a:solidFill>
+              </a:defRPr>
+            </a:pPr>
+            <a:r>
+              <a:t>Überzeugende Präsentation stärkt Position</a:t>
+            </a:r>
+          </a:p>
+        </p:txBody>
+      </p:sp>
+      <p:sp>
+        <p:nvSpPr>
+          <p:cNvPr id="10" name="Rounded Rectangle 9"/>
+          <p:cNvSpPr/>
+          <p:nvPr/>
+        </p:nvSpPr>
+        <p:spPr>
+          <a:xfrm>
+            <a:off x="4754880" y="3657600"/>
+            <a:ext cx="3931920" cy="1463040"/>
+          </a:xfrm>
+          <a:prstGeom prst="roundRect">
+            <a:avLst/>
+          </a:prstGeom>
+          <a:solidFill>
+            <a:srgbClr val="DC3545"/>
+          </a:solidFill>
+          <a:ln>
+            <a:noFill/>
+          </a:ln>
+        </p:spPr>
+        <p:style>
+          <a:lnRef idx="1">
+            <a:schemeClr val="accent1"/>
+          </a:lnRef>
+          <a:fillRef idx="3">
+            <a:schemeClr val="accent1"/>
+          </a:fillRef>
+          <a:effectRef idx="2">
+            <a:schemeClr val="accent1"/>
+          </a:effectRef>
+          <a:fontRef idx="minor">
+            <a:schemeClr val="lt1"/>
+          </a:fontRef>
+        </p:style>
+        <p:txBody>
+          <a:bodyPr rtlCol="0" anchor="ctr"/>
+          <a:lstStyle/>
+          <a:p>
+            <a:pPr algn="ctr"/>
+          </a:p>
+        </p:txBody>
+      </p:sp>
+      <p:sp>
+        <p:nvSpPr>
+          <p:cNvPr id="11" name="TextBox 10"/>
+          <p:cNvSpPr txBox="1"/>
+          <p:nvPr/>
+        </p:nvSpPr>
+        <p:spPr>
+          <a:xfrm>
+            <a:off x="4892040" y="3749040"/>
+            <a:ext cx="3657600" cy="1280160"/>
+          </a:xfrm>
+          <a:prstGeom prst="rect">
+            <a:avLst/>
+          </a:prstGeom>
+          <a:noFill/>
+        </p:spPr>
+        <p:txBody>
+          <a:bodyPr wrap="square">
+            <a:spAutoFit/>
+          </a:bodyPr>
+          <a:lstStyle/>
+          <a:p>
+            <a:pPr>
+              <a:defRPr sz="1300" b="1">
+                <a:solidFill>
+                  <a:srgbClr val="FFFFFF"/>
+                </a:solidFill>
+              </a:defRPr>
+            </a:pPr>
+            <a:r>
+              <a:t>Nicht erfüllt:</a:t>
+            </a:r>
+          </a:p>
+          <a:p>
+            <a:pPr>
+              <a:defRPr sz="1800" b="1">
+                <a:solidFill>
+                  <a:srgbClr val="FFFFFF"/>
+                </a:solidFill>
+              </a:defRPr>
+            </a:pPr>
+            <a:r>
+              <a:t>KZ -2</a:t>
+            </a:r>
+          </a:p>
+          <a:p>
+            <a:pPr>
+              <a:defRPr sz="1100">
+                <a:solidFill>
+                  <a:srgbClr val="FFFFFF"/>
+                </a:solidFill>
+              </a:defRPr>
+            </a:pPr>
+            <a:r>
+              <a:t>Kritische Nachfragen zu Investitionsentscheidungen</a:t>
+            </a:r>
+          </a:p>
+        </p:txBody>
+      </p:sp>
+    </p:spTree>
+  </p:cSld>
+  <p:clrMapOvr>
+    <a:masterClrMapping/>
+  </p:clrMapOvr>
+</p:sld>
+</file>
+
+<file path=ppt/slides/slide2.xml><?xml version="1.0" encoding="utf-8"?>
+<p:sld xmlns:a="http://schemas.openxmlformats.org/drawingml/2006/main" xmlns:p="http://schemas.openxmlformats.org/presentationml/2006/main" xmlns:r="http://schemas.openxmlformats.org/officeDocument/2006/relationships">
+  <p:cSld>
+    <p:spTree>
+      <p:nvGrpSpPr>
+        <p:cNvPr id="1" name=""/>
+        <p:cNvGrpSpPr/>
+        <p:nvPr/>
+      </p:nvGrpSpPr>
+      <p:grpSpPr/>
+      <p:sp>
+        <p:nvSpPr>
+          <p:cNvPr id="2" name="Rectangle 1"/>
+          <p:cNvSpPr/>
+          <p:nvPr/>
+        </p:nvSpPr>
+        <p:spPr>
+          <a:xfrm>
+            <a:off x="0" y="0"/>
+            <a:ext cx="9144000" cy="1371600"/>
+          </a:xfrm>
+          <a:prstGeom prst="rect">
+            <a:avLst/>
+          </a:prstGeom>
+          <a:solidFill>
+            <a:srgbClr val="FF9900"/>
+          </a:solidFill>
+          <a:ln>
+            <a:noFill/>
+          </a:ln>
+        </p:spPr>
+        <p:style>
+          <a:lnRef idx="1">
+            <a:schemeClr val="accent1"/>
+          </a:lnRef>
+          <a:fillRef idx="3">
+            <a:schemeClr val="accent1"/>
+          </a:fillRef>
+          <a:effectRef idx="2">
+            <a:schemeClr val="accent1"/>
+          </a:effectRef>
+          <a:fontRef idx="minor">
+            <a:schemeClr val="lt1"/>
+          </a:fontRef>
+        </p:style>
+        <p:txBody>
+          <a:bodyPr rtlCol="0" anchor="ctr"/>
+          <a:lstStyle/>
+          <a:p>
+            <a:pPr algn="ctr"/>
+          </a:p>
+        </p:txBody>
+      </p:sp>
+      <p:sp>
+        <p:nvSpPr>
+          <p:cNvPr id="3" name="TextBox 2"/>
+          <p:cNvSpPr txBox="1"/>
+          <p:nvPr/>
+        </p:nvSpPr>
+        <p:spPr>
+          <a:xfrm>
+            <a:off x="457200" y="182880"/>
+            <a:ext cx="8229600" cy="548640"/>
+          </a:xfrm>
+          <a:prstGeom prst="rect">
+            <a:avLst/>
+          </a:prstGeom>
+          <a:noFill/>
+        </p:spPr>
+        <p:txBody>
+          <a:bodyPr wrap="none">
+            <a:spAutoFit/>
+          </a:bodyPr>
+          <a:lstStyle/>
+          <a:p>
+            <a:pPr algn="ctr">
+              <a:defRPr sz="3600" b="1">
+                <a:solidFill>
+                  <a:srgbClr val="FFFFFF"/>
+                </a:solidFill>
+              </a:defRPr>
+            </a:pPr>
+            <a:r>
+              <a:t>🎣 Phishing-Kampagne entdeckt</a:t>
+            </a:r>
+          </a:p>
+        </p:txBody>
+      </p:sp>
+      <p:sp>
+        <p:nvSpPr>
+          <p:cNvPr id="4" name="TextBox 3"/>
+          <p:cNvSpPr txBox="1"/>
+          <p:nvPr/>
+        </p:nvSpPr>
+        <p:spPr>
+          <a:xfrm>
+            <a:off x="457200" y="777240"/>
+            <a:ext cx="8229600" cy="457200"/>
+          </a:xfrm>
+          <a:prstGeom prst="rect">
+            <a:avLst/>
+          </a:prstGeom>
+          <a:noFill/>
+        </p:spPr>
+        <p:txBody>
+          <a:bodyPr wrap="none">
+            <a:spAutoFit/>
+          </a:bodyPr>
+          <a:lstStyle/>
+          <a:p>
+            <a:pPr algn="ctr">
+              <a:defRPr sz="1800">
+                <a:solidFill>
+                  <a:srgbClr val="FFFFFF"/>
+                </a:solidFill>
+              </a:defRPr>
+            </a:pPr>
+            <a:r>
+              <a:t>Welle 1</a:t>
+            </a:r>
+          </a:p>
+        </p:txBody>
+      </p:sp>
+      <p:sp>
+        <p:nvSpPr>
+          <p:cNvPr id="5" name="TextBox 4"/>
+          <p:cNvSpPr txBox="1"/>
+          <p:nvPr/>
+        </p:nvSpPr>
+        <p:spPr>
+          <a:xfrm>
+            <a:off x="457200" y="1554480"/>
+            <a:ext cx="8229600" cy="822960"/>
+          </a:xfrm>
+          <a:prstGeom prst="rect">
+            <a:avLst/>
+          </a:prstGeom>
+          <a:noFill/>
+        </p:spPr>
+        <p:txBody>
+          <a:bodyPr wrap="square">
+            <a:spAutoFit/>
+          </a:bodyPr>
+          <a:lstStyle/>
+          <a:p>
+            <a:pPr algn="ctr">
+              <a:defRPr sz="1800">
+                <a:solidFill>
+                  <a:srgbClr val="343A40"/>
+                </a:solidFill>
+              </a:defRPr>
+            </a:pPr>
+            <a:r>
+              <a:t>Eine gezielte Phishing-Kampagne gegen Ihre Mitarbeiter wurde entdeckt.</a:t>
+            </a:r>
+          </a:p>
+        </p:txBody>
+      </p:sp>
+      <p:sp>
+        <p:nvSpPr>
+          <p:cNvPr id="6" name="Rounded Rectangle 5"/>
+          <p:cNvSpPr/>
+          <p:nvPr/>
+        </p:nvSpPr>
+        <p:spPr>
+          <a:xfrm>
+            <a:off x="457200" y="2514600"/>
+            <a:ext cx="8229600" cy="914400"/>
+          </a:xfrm>
+          <a:prstGeom prst="roundRect">
+            <a:avLst/>
+          </a:prstGeom>
+          <a:solidFill>
+            <a:srgbClr val="F8F9FA"/>
+          </a:solidFill>
+          <a:ln w="25400">
+            <a:solidFill>
+              <a:srgbClr val="007AC2"/>
+            </a:solidFill>
+          </a:ln>
+        </p:spPr>
+        <p:style>
+          <a:lnRef idx="1">
+            <a:schemeClr val="accent1"/>
+          </a:lnRef>
+          <a:fillRef idx="3">
+            <a:schemeClr val="accent1"/>
+          </a:fillRef>
+          <a:effectRef idx="2">
+            <a:schemeClr val="accent1"/>
+          </a:effectRef>
+          <a:fontRef idx="minor">
+            <a:schemeClr val="lt1"/>
+          </a:fontRef>
+        </p:style>
+        <p:txBody>
+          <a:bodyPr rtlCol="0" anchor="ctr"/>
+          <a:lstStyle/>
+          <a:p>
+            <a:pPr algn="ctr"/>
+          </a:p>
+        </p:txBody>
+      </p:sp>
+      <p:sp>
+        <p:nvSpPr>
+          <p:cNvPr id="7" name="TextBox 6"/>
+          <p:cNvSpPr txBox="1"/>
+          <p:nvPr/>
+        </p:nvSpPr>
+        <p:spPr>
+          <a:xfrm>
+            <a:off x="640080" y="2606040"/>
+            <a:ext cx="7863840" cy="731520"/>
+          </a:xfrm>
+          <a:prstGeom prst="rect">
+            <a:avLst/>
+          </a:prstGeom>
+          <a:noFill/>
+        </p:spPr>
+        <p:txBody>
+          <a:bodyPr wrap="square">
+            <a:spAutoFit/>
+          </a:bodyPr>
+          <a:lstStyle/>
+          <a:p>
+            <a:pPr>
+              <a:defRPr sz="1400" b="1">
+                <a:solidFill>
+                  <a:srgbClr val="343A40"/>
+                </a:solidFill>
+              </a:defRPr>
+            </a:pPr>
+            <a:r>
+              <a:t>Bedingung:</a:t>
+            </a:r>
+          </a:p>
+          <a:p>
+            <a:pPr>
+              <a:defRPr sz="1600">
+                <a:solidFill>
+                  <a:srgbClr val="005293"/>
+                </a:solidFill>
+              </a:defRPr>
+            </a:pPr>
+            <a:r>
+              <a:t>M6 mindestens Level 2</a:t>
+            </a:r>
+          </a:p>
+        </p:txBody>
+      </p:sp>
+      <p:sp>
+        <p:nvSpPr>
+          <p:cNvPr id="8" name="Rounded Rectangle 7"/>
+          <p:cNvSpPr/>
+          <p:nvPr/>
+        </p:nvSpPr>
+        <p:spPr>
+          <a:xfrm>
+            <a:off x="457200" y="3657600"/>
+            <a:ext cx="3931920" cy="1463040"/>
+          </a:xfrm>
+          <a:prstGeom prst="roundRect">
+            <a:avLst/>
+          </a:prstGeom>
+          <a:solidFill>
+            <a:srgbClr val="00994C"/>
+          </a:solidFill>
+          <a:ln>
+            <a:noFill/>
+          </a:ln>
+        </p:spPr>
+        <p:style>
+          <a:lnRef idx="1">
+            <a:schemeClr val="accent1"/>
+          </a:lnRef>
+          <a:fillRef idx="3">
+            <a:schemeClr val="accent1"/>
+          </a:fillRef>
+          <a:effectRef idx="2">
+            <a:schemeClr val="accent1"/>
+          </a:effectRef>
+          <a:fontRef idx="minor">
+            <a:schemeClr val="lt1"/>
+          </a:fontRef>
+        </p:style>
+        <p:txBody>
+          <a:bodyPr rtlCol="0" anchor="ctr"/>
+          <a:lstStyle/>
+          <a:p>
+            <a:pPr algn="ctr"/>
+          </a:p>
+        </p:txBody>
+      </p:sp>
+      <p:sp>
+        <p:nvSpPr>
+          <p:cNvPr id="9" name="TextBox 8"/>
+          <p:cNvSpPr txBox="1"/>
+          <p:nvPr/>
+        </p:nvSpPr>
+        <p:spPr>
+          <a:xfrm>
+            <a:off x="594360" y="3749040"/>
+            <a:ext cx="3657600" cy="1280160"/>
+          </a:xfrm>
+          <a:prstGeom prst="rect">
+            <a:avLst/>
+          </a:prstGeom>
+          <a:noFill/>
+        </p:spPr>
+        <p:txBody>
+          <a:bodyPr wrap="square">
+            <a:spAutoFit/>
+          </a:bodyPr>
+          <a:lstStyle/>
+          <a:p>
+            <a:pPr>
+              <a:defRPr sz="1300" b="1">
+                <a:solidFill>
+                  <a:srgbClr val="FFFFFF"/>
+                </a:solidFill>
+              </a:defRPr>
+            </a:pPr>
+            <a:r>
+              <a:t>Erfüllt:</a:t>
+            </a:r>
+          </a:p>
+          <a:p>
+            <a:pPr>
+              <a:defRPr sz="1800" b="1">
+                <a:solidFill>
+                  <a:srgbClr val="FFFFFF"/>
+                </a:solidFill>
+              </a:defRPr>
+            </a:pPr>
+            <a:r>
+              <a:t>KZ +2</a:t>
+            </a:r>
+          </a:p>
+          <a:p>
+            <a:pPr>
+              <a:defRPr sz="1100">
+                <a:solidFill>
+                  <a:srgbClr val="FFFFFF"/>
+                </a:solidFill>
+              </a:defRPr>
+            </a:pPr>
+            <a:r>
+              <a:t>Geschulte Mitarbeiter melden verdächtige E-Mails</a:t>
+            </a:r>
+          </a:p>
+        </p:txBody>
+      </p:sp>
+      <p:sp>
+        <p:nvSpPr>
+          <p:cNvPr id="10" name="Rounded Rectangle 9"/>
+          <p:cNvSpPr/>
+          <p:nvPr/>
+        </p:nvSpPr>
+        <p:spPr>
+          <a:xfrm>
+            <a:off x="4754880" y="3657600"/>
+            <a:ext cx="3931920" cy="1463040"/>
+          </a:xfrm>
+          <a:prstGeom prst="roundRect">
+            <a:avLst/>
+          </a:prstGeom>
+          <a:solidFill>
+            <a:srgbClr val="DC3545"/>
+          </a:solidFill>
+          <a:ln>
+            <a:noFill/>
+          </a:ln>
+        </p:spPr>
+        <p:style>
+          <a:lnRef idx="1">
+            <a:schemeClr val="accent1"/>
+          </a:lnRef>
+          <a:fillRef idx="3">
+            <a:schemeClr val="accent1"/>
+          </a:fillRef>
+          <a:effectRef idx="2">
+            <a:schemeClr val="accent1"/>
+          </a:effectRef>
+          <a:fontRef idx="minor">
+            <a:schemeClr val="lt1"/>
+          </a:fontRef>
+        </p:style>
+        <p:txBody>
+          <a:bodyPr rtlCol="0" anchor="ctr"/>
+          <a:lstStyle/>
+          <a:p>
+            <a:pPr algn="ctr"/>
+          </a:p>
+        </p:txBody>
+      </p:sp>
+      <p:sp>
+        <p:nvSpPr>
+          <p:cNvPr id="11" name="TextBox 10"/>
+          <p:cNvSpPr txBox="1"/>
+          <p:nvPr/>
+        </p:nvSpPr>
+        <p:spPr>
+          <a:xfrm>
+            <a:off x="4892040" y="3749040"/>
+            <a:ext cx="3657600" cy="1280160"/>
+          </a:xfrm>
+          <a:prstGeom prst="rect">
+            <a:avLst/>
+          </a:prstGeom>
+          <a:noFill/>
+        </p:spPr>
+        <p:txBody>
+          <a:bodyPr wrap="square">
+            <a:spAutoFit/>
+          </a:bodyPr>
+          <a:lstStyle/>
+          <a:p>
+            <a:pPr>
+              <a:defRPr sz="1300" b="1">
+                <a:solidFill>
+                  <a:srgbClr val="FFFFFF"/>
+                </a:solidFill>
+              </a:defRPr>
+            </a:pPr>
+            <a:r>
+              <a:t>Nicht erfüllt:</a:t>
+            </a:r>
+          </a:p>
+          <a:p>
+            <a:pPr>
+              <a:defRPr sz="1800" b="1">
+                <a:solidFill>
+                  <a:srgbClr val="FFFFFF"/>
+                </a:solidFill>
+              </a:defRPr>
+            </a:pPr>
+            <a:r>
+              <a:t>KZ -3</a:t>
+            </a:r>
+          </a:p>
+          <a:p>
+            <a:pPr>
+              <a:defRPr sz="1100">
+                <a:solidFill>
+                  <a:srgbClr val="FFFFFF"/>
+                </a:solidFill>
+              </a:defRPr>
+            </a:pPr>
+            <a:r>
+              <a:t>Mehrere Mitarbeiter klicken auf schädliche Links</a:t>
+            </a:r>
+          </a:p>
+        </p:txBody>
+      </p:sp>
+    </p:spTree>
+  </p:cSld>
+  <p:clrMapOvr>
+    <a:masterClrMapping/>
+  </p:clrMapOvr>
+</p:sld>
+</file>
+
+<file path=ppt/slides/slide3.xml><?xml version="1.0" encoding="utf-8"?>
+<p:sld xmlns:a="http://schemas.openxmlformats.org/drawingml/2006/main" xmlns:p="http://schemas.openxmlformats.org/presentationml/2006/main" xmlns:r="http://schemas.openxmlformats.org/officeDocument/2006/relationships">
+  <p:cSld>
+    <p:spTree>
+      <p:nvGrpSpPr>
+        <p:cNvPr id="1" name=""/>
+        <p:cNvGrpSpPr/>
+        <p:nvPr/>
+      </p:nvGrpSpPr>
+      <p:grpSpPr/>
+      <p:sp>
+        <p:nvSpPr>
+          <p:cNvPr id="2" name="Rectangle 1"/>
+          <p:cNvSpPr/>
+          <p:nvPr/>
+        </p:nvSpPr>
+        <p:spPr>
+          <a:xfrm>
+            <a:off x="0" y="0"/>
+            <a:ext cx="9144000" cy="1371600"/>
+          </a:xfrm>
+          <a:prstGeom prst="rect">
+            <a:avLst/>
+          </a:prstGeom>
+          <a:solidFill>
+            <a:srgbClr val="FF9900"/>
+          </a:solidFill>
+          <a:ln>
+            <a:noFill/>
+          </a:ln>
+        </p:spPr>
+        <p:style>
+          <a:lnRef idx="1">
+            <a:schemeClr val="accent1"/>
+          </a:lnRef>
+          <a:fillRef idx="3">
+            <a:schemeClr val="accent1"/>
+          </a:fillRef>
+          <a:effectRef idx="2">
+            <a:schemeClr val="accent1"/>
+          </a:effectRef>
+          <a:fontRef idx="minor">
+            <a:schemeClr val="lt1"/>
+          </a:fontRef>
+        </p:style>
+        <p:txBody>
+          <a:bodyPr rtlCol="0" anchor="ctr"/>
+          <a:lstStyle/>
+          <a:p>
+            <a:pPr algn="ctr"/>
+          </a:p>
+        </p:txBody>
+      </p:sp>
+      <p:sp>
+        <p:nvSpPr>
+          <p:cNvPr id="3" name="TextBox 2"/>
+          <p:cNvSpPr txBox="1"/>
+          <p:nvPr/>
+        </p:nvSpPr>
+        <p:spPr>
+          <a:xfrm>
+            <a:off x="457200" y="182880"/>
+            <a:ext cx="8229600" cy="548640"/>
+          </a:xfrm>
+          <a:prstGeom prst="rect">
+            <a:avLst/>
+          </a:prstGeom>
+          <a:noFill/>
+        </p:spPr>
+        <p:txBody>
+          <a:bodyPr wrap="none">
+            <a:spAutoFit/>
+          </a:bodyPr>
+          <a:lstStyle/>
+          <a:p>
+            <a:pPr algn="ctr">
+              <a:defRPr sz="3600" b="1">
+                <a:solidFill>
+                  <a:srgbClr val="FFFFFF"/>
+                </a:solidFill>
+              </a:defRPr>
+            </a:pPr>
+            <a:r>
+              <a:t>📋 Cyber-Versicherung Prüfung</a:t>
+            </a:r>
+          </a:p>
+        </p:txBody>
+      </p:sp>
+      <p:sp>
+        <p:nvSpPr>
+          <p:cNvPr id="4" name="TextBox 3"/>
+          <p:cNvSpPr txBox="1"/>
+          <p:nvPr/>
+        </p:nvSpPr>
+        <p:spPr>
+          <a:xfrm>
+            <a:off x="457200" y="777240"/>
+            <a:ext cx="8229600" cy="457200"/>
+          </a:xfrm>
+          <a:prstGeom prst="rect">
+            <a:avLst/>
+          </a:prstGeom>
+          <a:noFill/>
+        </p:spPr>
+        <p:txBody>
+          <a:bodyPr wrap="none">
+            <a:spAutoFit/>
+          </a:bodyPr>
+          <a:lstStyle/>
+          <a:p>
+            <a:pPr algn="ctr">
+              <a:defRPr sz="1800">
+                <a:solidFill>
+                  <a:srgbClr val="FFFFFF"/>
+                </a:solidFill>
+              </a:defRPr>
+            </a:pPr>
+            <a:r>
+              <a:t>Welle 1</a:t>
+            </a:r>
+          </a:p>
+        </p:txBody>
+      </p:sp>
+      <p:sp>
+        <p:nvSpPr>
+          <p:cNvPr id="5" name="TextBox 4"/>
+          <p:cNvSpPr txBox="1"/>
+          <p:nvPr/>
+        </p:nvSpPr>
+        <p:spPr>
+          <a:xfrm>
+            <a:off x="457200" y="1554480"/>
+            <a:ext cx="8229600" cy="822960"/>
+          </a:xfrm>
+          <a:prstGeom prst="rect">
+            <a:avLst/>
+          </a:prstGeom>
+          <a:noFill/>
+        </p:spPr>
+        <p:txBody>
+          <a:bodyPr wrap="square">
+            <a:spAutoFit/>
+          </a:bodyPr>
+          <a:lstStyle/>
+          <a:p>
+            <a:pPr algn="ctr">
+              <a:defRPr sz="1800">
+                <a:solidFill>
+                  <a:srgbClr val="343A40"/>
+                </a:solidFill>
+              </a:defRPr>
+            </a:pPr>
+            <a:r>
+              <a:t>Ihre Cyber-Versicherung prüft Ihre Sicherheitsmaßnahmen für die Prämienkalkulation.</a:t>
+            </a:r>
+          </a:p>
+        </p:txBody>
+      </p:sp>
+      <p:sp>
+        <p:nvSpPr>
+          <p:cNvPr id="6" name="Rounded Rectangle 5"/>
+          <p:cNvSpPr/>
+          <p:nvPr/>
+        </p:nvSpPr>
+        <p:spPr>
+          <a:xfrm>
+            <a:off x="457200" y="2514600"/>
+            <a:ext cx="8229600" cy="914400"/>
+          </a:xfrm>
+          <a:prstGeom prst="roundRect">
+            <a:avLst/>
+          </a:prstGeom>
+          <a:solidFill>
+            <a:srgbClr val="F8F9FA"/>
+          </a:solidFill>
+          <a:ln w="25400">
+            <a:solidFill>
+              <a:srgbClr val="007AC2"/>
+            </a:solidFill>
+          </a:ln>
+        </p:spPr>
+        <p:style>
+          <a:lnRef idx="1">
+            <a:schemeClr val="accent1"/>
+          </a:lnRef>
+          <a:fillRef idx="3">
+            <a:schemeClr val="accent1"/>
+          </a:fillRef>
+          <a:effectRef idx="2">
+            <a:schemeClr val="accent1"/>
+          </a:effectRef>
+          <a:fontRef idx="minor">
+            <a:schemeClr val="lt1"/>
+          </a:fontRef>
+        </p:style>
+        <p:txBody>
+          <a:bodyPr rtlCol="0" anchor="ctr"/>
+          <a:lstStyle/>
+          <a:p>
+            <a:pPr algn="ctr"/>
+          </a:p>
+        </p:txBody>
+      </p:sp>
+      <p:sp>
+        <p:nvSpPr>
+          <p:cNvPr id="7" name="TextBox 6"/>
+          <p:cNvSpPr txBox="1"/>
+          <p:nvPr/>
+        </p:nvSpPr>
+        <p:spPr>
+          <a:xfrm>
+            <a:off x="640080" y="2606040"/>
+            <a:ext cx="7863840" cy="731520"/>
+          </a:xfrm>
+          <a:prstGeom prst="rect">
+            <a:avLst/>
+          </a:prstGeom>
+          <a:noFill/>
+        </p:spPr>
+        <p:txBody>
+          <a:bodyPr wrap="square">
+            <a:spAutoFit/>
+          </a:bodyPr>
+          <a:lstStyle/>
+          <a:p>
+            <a:pPr>
+              <a:defRPr sz="1400" b="1">
+                <a:solidFill>
+                  <a:srgbClr val="343A40"/>
+                </a:solidFill>
+              </a:defRPr>
+            </a:pPr>
+            <a:r>
+              <a:t>Bedingung:</a:t>
+            </a:r>
+          </a:p>
+          <a:p>
+            <a:pPr>
+              <a:defRPr sz="1600">
+                <a:solidFill>
+                  <a:srgbClr val="005293"/>
+                </a:solidFill>
+              </a:defRPr>
+            </a:pPr>
+            <a:r>
+              <a:t>E-Wert mindestens 16</a:t>
+            </a:r>
+          </a:p>
+        </p:txBody>
+      </p:sp>
+      <p:sp>
+        <p:nvSpPr>
+          <p:cNvPr id="8" name="Rounded Rectangle 7"/>
+          <p:cNvSpPr/>
+          <p:nvPr/>
+        </p:nvSpPr>
+        <p:spPr>
+          <a:xfrm>
+            <a:off x="457200" y="3657600"/>
+            <a:ext cx="3931920" cy="1463040"/>
+          </a:xfrm>
+          <a:prstGeom prst="roundRect">
+            <a:avLst/>
+          </a:prstGeom>
+          <a:solidFill>
+            <a:srgbClr val="00994C"/>
+          </a:solidFill>
+          <a:ln>
+            <a:noFill/>
+          </a:ln>
+        </p:spPr>
+        <p:style>
+          <a:lnRef idx="1">
+            <a:schemeClr val="accent1"/>
+          </a:lnRef>
+          <a:fillRef idx="3">
+            <a:schemeClr val="accent1"/>
+          </a:fillRef>
+          <a:effectRef idx="2">
+            <a:schemeClr val="accent1"/>
+          </a:effectRef>
+          <a:fontRef idx="minor">
+            <a:schemeClr val="lt1"/>
+          </a:fontRef>
+        </p:style>
+        <p:txBody>
+          <a:bodyPr rtlCol="0" anchor="ctr"/>
+          <a:lstStyle/>
+          <a:p>
+            <a:pPr algn="ctr"/>
+          </a:p>
+        </p:txBody>
+      </p:sp>
+      <p:sp>
+        <p:nvSpPr>
+          <p:cNvPr id="9" name="TextBox 8"/>
+          <p:cNvSpPr txBox="1"/>
+          <p:nvPr/>
+        </p:nvSpPr>
+        <p:spPr>
+          <a:xfrm>
+            <a:off x="594360" y="3749040"/>
+            <a:ext cx="3657600" cy="1280160"/>
+          </a:xfrm>
+          <a:prstGeom prst="rect">
+            <a:avLst/>
+          </a:prstGeom>
+          <a:noFill/>
+        </p:spPr>
+        <p:txBody>
+          <a:bodyPr wrap="square">
+            <a:spAutoFit/>
+          </a:bodyPr>
+          <a:lstStyle/>
+          <a:p>
+            <a:pPr>
+              <a:defRPr sz="1300" b="1">
+                <a:solidFill>
+                  <a:srgbClr val="FFFFFF"/>
+                </a:solidFill>
+              </a:defRPr>
+            </a:pPr>
+            <a:r>
+              <a:t>Erfüllt:</a:t>
+            </a:r>
+          </a:p>
+          <a:p>
+            <a:pPr>
+              <a:defRPr sz="1800" b="1">
+                <a:solidFill>
+                  <a:srgbClr val="FFFFFF"/>
+                </a:solidFill>
+              </a:defRPr>
+            </a:pPr>
+            <a:r>
+              <a:t>Budget +10k€</a:t>
+            </a:r>
+          </a:p>
+          <a:p>
+            <a:pPr>
+              <a:defRPr sz="1100">
+                <a:solidFill>
+                  <a:srgbClr val="FFFFFF"/>
+                </a:solidFill>
+              </a:defRPr>
+            </a:pPr>
+            <a:r>
+              <a:t>Niedrigere Prämie spart Budget</a:t>
+            </a:r>
+          </a:p>
+        </p:txBody>
+      </p:sp>
+      <p:sp>
+        <p:nvSpPr>
+          <p:cNvPr id="10" name="Rounded Rectangle 9"/>
+          <p:cNvSpPr/>
+          <p:nvPr/>
+        </p:nvSpPr>
+        <p:spPr>
+          <a:xfrm>
+            <a:off x="4754880" y="3657600"/>
+            <a:ext cx="3931920" cy="1463040"/>
+          </a:xfrm>
+          <a:prstGeom prst="roundRect">
+            <a:avLst/>
+          </a:prstGeom>
+          <a:solidFill>
+            <a:srgbClr val="DC3545"/>
+          </a:solidFill>
+          <a:ln>
+            <a:noFill/>
+          </a:ln>
+        </p:spPr>
+        <p:style>
+          <a:lnRef idx="1">
+            <a:schemeClr val="accent1"/>
+          </a:lnRef>
+          <a:fillRef idx="3">
+            <a:schemeClr val="accent1"/>
+          </a:fillRef>
+          <a:effectRef idx="2">
+            <a:schemeClr val="accent1"/>
+          </a:effectRef>
+          <a:fontRef idx="minor">
+            <a:schemeClr val="lt1"/>
+          </a:fontRef>
+        </p:style>
+        <p:txBody>
+          <a:bodyPr rtlCol="0" anchor="ctr"/>
+          <a:lstStyle/>
+          <a:p>
+            <a:pPr algn="ctr"/>
+          </a:p>
+        </p:txBody>
+      </p:sp>
+      <p:sp>
+        <p:nvSpPr>
+          <p:cNvPr id="11" name="TextBox 10"/>
+          <p:cNvSpPr txBox="1"/>
+          <p:nvPr/>
+        </p:nvSpPr>
+        <p:spPr>
+          <a:xfrm>
+            <a:off x="4892040" y="3749040"/>
+            <a:ext cx="3657600" cy="1280160"/>
+          </a:xfrm>
+          <a:prstGeom prst="rect">
+            <a:avLst/>
+          </a:prstGeom>
+          <a:noFill/>
+        </p:spPr>
+        <p:txBody>
+          <a:bodyPr wrap="square">
+            <a:spAutoFit/>
+          </a:bodyPr>
+          <a:lstStyle/>
+          <a:p>
+            <a:pPr>
+              <a:defRPr sz="1300" b="1">
+                <a:solidFill>
+                  <a:srgbClr val="FFFFFF"/>
+                </a:solidFill>
+              </a:defRPr>
+            </a:pPr>
+            <a:r>
+              <a:t>Nicht erfüllt:</a:t>
+            </a:r>
+          </a:p>
+          <a:p>
+            <a:pPr>
+              <a:defRPr sz="1800" b="1">
+                <a:solidFill>
+                  <a:srgbClr val="FFFFFF"/>
+                </a:solidFill>
+              </a:defRPr>
+            </a:pPr>
+            <a:r>
+              <a:t>Budget -15k€</a:t>
+            </a:r>
+          </a:p>
+          <a:p>
+            <a:pPr>
+              <a:defRPr sz="1100">
+                <a:solidFill>
+                  <a:srgbClr val="FFFFFF"/>
+                </a:solidFill>
+              </a:defRPr>
+            </a:pPr>
+            <a:r>
+              <a:t>Höhere Prämie belastet Budget</a:t>
+            </a:r>
+          </a:p>
+        </p:txBody>
+      </p:sp>
+    </p:spTree>
+  </p:cSld>
+  <p:clrMapOvr>
+    <a:masterClrMapping/>
+  </p:clrMapOvr>
+</p:sld>
+</file>
+
+<file path=ppt/slides/slide4.xml><?xml version="1.0" encoding="utf-8"?>
+<p:sld xmlns:a="http://schemas.openxmlformats.org/drawingml/2006/main" xmlns:p="http://schemas.openxmlformats.org/presentationml/2006/main" xmlns:r="http://schemas.openxmlformats.org/officeDocument/2006/relationships">
+  <p:cSld>
+    <p:spTree>
+      <p:nvGrpSpPr>
+        <p:cNvPr id="1" name=""/>
+        <p:cNvGrpSpPr/>
+        <p:nvPr/>
+      </p:nvGrpSpPr>
+      <p:grpSpPr/>
+      <p:sp>
+        <p:nvSpPr>
+          <p:cNvPr id="2" name="Rectangle 1"/>
+          <p:cNvSpPr/>
+          <p:nvPr/>
+        </p:nvSpPr>
+        <p:spPr>
+          <a:xfrm>
+            <a:off x="0" y="0"/>
+            <a:ext cx="9144000" cy="1371600"/>
+          </a:xfrm>
+          <a:prstGeom prst="rect">
+            <a:avLst/>
+          </a:prstGeom>
+          <a:solidFill>
+            <a:srgbClr val="FF9900"/>
+          </a:solidFill>
+          <a:ln>
+            <a:noFill/>
+          </a:ln>
+        </p:spPr>
+        <p:style>
+          <a:lnRef idx="1">
+            <a:schemeClr val="accent1"/>
+          </a:lnRef>
+          <a:fillRef idx="3">
+            <a:schemeClr val="accent1"/>
+          </a:fillRef>
+          <a:effectRef idx="2">
+            <a:schemeClr val="accent1"/>
+          </a:effectRef>
+          <a:fontRef idx="minor">
+            <a:schemeClr val="lt1"/>
+          </a:fontRef>
+        </p:style>
+        <p:txBody>
+          <a:bodyPr rtlCol="0" anchor="ctr"/>
+          <a:lstStyle/>
+          <a:p>
+            <a:pPr algn="ctr"/>
+          </a:p>
+        </p:txBody>
+      </p:sp>
+      <p:sp>
+        <p:nvSpPr>
+          <p:cNvPr id="3" name="TextBox 2"/>
+          <p:cNvSpPr txBox="1"/>
+          <p:nvPr/>
+        </p:nvSpPr>
+        <p:spPr>
+          <a:xfrm>
+            <a:off x="457200" y="182880"/>
+            <a:ext cx="8229600" cy="548640"/>
+          </a:xfrm>
+          <a:prstGeom prst="rect">
+            <a:avLst/>
+          </a:prstGeom>
+          <a:noFill/>
+        </p:spPr>
+        <p:txBody>
+          <a:bodyPr wrap="none">
+            <a:spAutoFit/>
+          </a:bodyPr>
+          <a:lstStyle/>
+          <a:p>
+            <a:pPr algn="ctr">
+              <a:defRPr sz="3600" b="1">
+                <a:solidFill>
+                  <a:srgbClr val="FFFFFF"/>
+                </a:solidFill>
+              </a:defRPr>
+            </a:pPr>
+            <a:r>
+              <a:t>🔓 Kritische Schwachstelle veröffentlicht</a:t>
+            </a:r>
+          </a:p>
+        </p:txBody>
+      </p:sp>
+      <p:sp>
+        <p:nvSpPr>
+          <p:cNvPr id="4" name="TextBox 3"/>
+          <p:cNvSpPr txBox="1"/>
+          <p:nvPr/>
+        </p:nvSpPr>
+        <p:spPr>
+          <a:xfrm>
+            <a:off x="457200" y="777240"/>
+            <a:ext cx="8229600" cy="457200"/>
+          </a:xfrm>
+          <a:prstGeom prst="rect">
+            <a:avLst/>
+          </a:prstGeom>
+          <a:noFill/>
+        </p:spPr>
+        <p:txBody>
+          <a:bodyPr wrap="none">
+            <a:spAutoFit/>
+          </a:bodyPr>
+          <a:lstStyle/>
+          <a:p>
+            <a:pPr algn="ctr">
+              <a:defRPr sz="1800">
+                <a:solidFill>
+                  <a:srgbClr val="FFFFFF"/>
+                </a:solidFill>
+              </a:defRPr>
+            </a:pPr>
+            <a:r>
+              <a:t>Welle 1</a:t>
+            </a:r>
+          </a:p>
+        </p:txBody>
+      </p:sp>
+      <p:sp>
+        <p:nvSpPr>
+          <p:cNvPr id="5" name="TextBox 4"/>
+          <p:cNvSpPr txBox="1"/>
+          <p:nvPr/>
+        </p:nvSpPr>
+        <p:spPr>
+          <a:xfrm>
+            <a:off x="457200" y="1554480"/>
+            <a:ext cx="8229600" cy="822960"/>
+          </a:xfrm>
+          <a:prstGeom prst="rect">
+            <a:avLst/>
+          </a:prstGeom>
+          <a:noFill/>
+        </p:spPr>
+        <p:txBody>
+          <a:bodyPr wrap="square">
+            <a:spAutoFit/>
+          </a:bodyPr>
+          <a:lstStyle/>
+          <a:p>
+            <a:pPr algn="ctr">
+              <a:defRPr sz="1800">
+                <a:solidFill>
+                  <a:srgbClr val="343A40"/>
+                </a:solidFill>
+              </a:defRPr>
+            </a:pPr>
+            <a:r>
+              <a:t>Eine kritische Zero-Day-Schwachstelle wird öffentlich bekannt.</a:t>
+            </a:r>
+          </a:p>
+        </p:txBody>
+      </p:sp>
+      <p:sp>
+        <p:nvSpPr>
+          <p:cNvPr id="6" name="Rounded Rectangle 5"/>
+          <p:cNvSpPr/>
+          <p:nvPr/>
+        </p:nvSpPr>
+        <p:spPr>
+          <a:xfrm>
+            <a:off x="457200" y="2514600"/>
+            <a:ext cx="8229600" cy="914400"/>
+          </a:xfrm>
+          <a:prstGeom prst="roundRect">
+            <a:avLst/>
+          </a:prstGeom>
+          <a:solidFill>
+            <a:srgbClr val="F8F9FA"/>
+          </a:solidFill>
+          <a:ln w="25400">
+            <a:solidFill>
+              <a:srgbClr val="007AC2"/>
+            </a:solidFill>
+          </a:ln>
+        </p:spPr>
+        <p:style>
+          <a:lnRef idx="1">
+            <a:schemeClr val="accent1"/>
+          </a:lnRef>
+          <a:fillRef idx="3">
+            <a:schemeClr val="accent1"/>
+          </a:fillRef>
+          <a:effectRef idx="2">
+            <a:schemeClr val="accent1"/>
+          </a:effectRef>
+          <a:fontRef idx="minor">
+            <a:schemeClr val="lt1"/>
+          </a:fontRef>
+        </p:style>
+        <p:txBody>
+          <a:bodyPr rtlCol="0" anchor="ctr"/>
+          <a:lstStyle/>
+          <a:p>
+            <a:pPr algn="ctr"/>
+          </a:p>
+        </p:txBody>
+      </p:sp>
+      <p:sp>
+        <p:nvSpPr>
+          <p:cNvPr id="7" name="TextBox 6"/>
+          <p:cNvSpPr txBox="1"/>
+          <p:nvPr/>
+        </p:nvSpPr>
+        <p:spPr>
+          <a:xfrm>
+            <a:off x="640080" y="2606040"/>
+            <a:ext cx="7863840" cy="731520"/>
+          </a:xfrm>
+          <a:prstGeom prst="rect">
+            <a:avLst/>
+          </a:prstGeom>
+          <a:noFill/>
+        </p:spPr>
+        <p:txBody>
+          <a:bodyPr wrap="square">
+            <a:spAutoFit/>
+          </a:bodyPr>
+          <a:lstStyle/>
+          <a:p>
+            <a:pPr>
+              <a:defRPr sz="1400" b="1">
+                <a:solidFill>
+                  <a:srgbClr val="343A40"/>
+                </a:solidFill>
+              </a:defRPr>
+            </a:pPr>
+            <a:r>
+              <a:t>Bedingung:</a:t>
+            </a:r>
+          </a:p>
+          <a:p>
+            <a:pPr>
+              <a:defRPr sz="1600">
+                <a:solidFill>
+                  <a:srgbClr val="005293"/>
+                </a:solidFill>
+              </a:defRPr>
+            </a:pPr>
+            <a:r>
+              <a:t>M7 mindestens Level 1</a:t>
+            </a:r>
+          </a:p>
+        </p:txBody>
+      </p:sp>
+      <p:sp>
+        <p:nvSpPr>
+          <p:cNvPr id="8" name="Rounded Rectangle 7"/>
+          <p:cNvSpPr/>
+          <p:nvPr/>
+        </p:nvSpPr>
+        <p:spPr>
+          <a:xfrm>
+            <a:off x="457200" y="3657600"/>
+            <a:ext cx="3931920" cy="1463040"/>
+          </a:xfrm>
+          <a:prstGeom prst="roundRect">
+            <a:avLst/>
+          </a:prstGeom>
+          <a:solidFill>
+            <a:srgbClr val="00994C"/>
+          </a:solidFill>
+          <a:ln>
+            <a:noFill/>
+          </a:ln>
+        </p:spPr>
+        <p:style>
+          <a:lnRef idx="1">
+            <a:schemeClr val="accent1"/>
+          </a:lnRef>
+          <a:fillRef idx="3">
+            <a:schemeClr val="accent1"/>
+          </a:fillRef>
+          <a:effectRef idx="2">
+            <a:schemeClr val="accent1"/>
+          </a:effectRef>
+          <a:fontRef idx="minor">
+            <a:schemeClr val="lt1"/>
+          </a:fontRef>
+        </p:style>
+        <p:txBody>
+          <a:bodyPr rtlCol="0" anchor="ctr"/>
+          <a:lstStyle/>
+          <a:p>
+            <a:pPr algn="ctr"/>
+          </a:p>
+        </p:txBody>
+      </p:sp>
+      <p:sp>
+        <p:nvSpPr>
+          <p:cNvPr id="9" name="TextBox 8"/>
+          <p:cNvSpPr txBox="1"/>
+          <p:nvPr/>
+        </p:nvSpPr>
+        <p:spPr>
+          <a:xfrm>
+            <a:off x="594360" y="3749040"/>
+            <a:ext cx="3657600" cy="1280160"/>
+          </a:xfrm>
+          <a:prstGeom prst="rect">
+            <a:avLst/>
+          </a:prstGeom>
+          <a:noFill/>
+        </p:spPr>
+        <p:txBody>
+          <a:bodyPr wrap="square">
+            <a:spAutoFit/>
+          </a:bodyPr>
+          <a:lstStyle/>
+          <a:p>
+            <a:pPr>
+              <a:defRPr sz="1300" b="1">
+                <a:solidFill>
+                  <a:srgbClr val="FFFFFF"/>
+                </a:solidFill>
+              </a:defRPr>
+            </a:pPr>
+            <a:r>
+              <a:t>Erfüllt:</a:t>
+            </a:r>
+          </a:p>
+          <a:p>
+            <a:pPr>
+              <a:defRPr sz="1800" b="1">
+                <a:solidFill>
+                  <a:srgbClr val="FFFFFF"/>
+                </a:solidFill>
+              </a:defRPr>
+            </a:pPr>
+            <a:r>
+              <a:t>Keine Auswirkung</a:t>
+            </a:r>
+          </a:p>
+          <a:p>
+            <a:pPr>
+              <a:defRPr sz="1100">
+                <a:solidFill>
+                  <a:srgbClr val="FFFFFF"/>
+                </a:solidFill>
+              </a:defRPr>
+            </a:pPr>
+            <a:r>
+              <a:t>Patch-Prozess greift, Schwachstelle wird geschlossen</a:t>
+            </a:r>
+          </a:p>
+        </p:txBody>
+      </p:sp>
+      <p:sp>
+        <p:nvSpPr>
+          <p:cNvPr id="10" name="Rounded Rectangle 9"/>
+          <p:cNvSpPr/>
+          <p:nvPr/>
+        </p:nvSpPr>
+        <p:spPr>
+          <a:xfrm>
+            <a:off x="4754880" y="3657600"/>
+            <a:ext cx="3931920" cy="1463040"/>
+          </a:xfrm>
+          <a:prstGeom prst="roundRect">
+            <a:avLst/>
+          </a:prstGeom>
+          <a:solidFill>
+            <a:srgbClr val="DC3545"/>
+          </a:solidFill>
+          <a:ln>
+            <a:noFill/>
+          </a:ln>
+        </p:spPr>
+        <p:style>
+          <a:lnRef idx="1">
+            <a:schemeClr val="accent1"/>
+          </a:lnRef>
+          <a:fillRef idx="3">
+            <a:schemeClr val="accent1"/>
+          </a:fillRef>
+          <a:effectRef idx="2">
+            <a:schemeClr val="accent1"/>
+          </a:effectRef>
+          <a:fontRef idx="minor">
+            <a:schemeClr val="lt1"/>
+          </a:fontRef>
+        </p:style>
+        <p:txBody>
+          <a:bodyPr rtlCol="0" anchor="ctr"/>
+          <a:lstStyle/>
+          <a:p>
+            <a:pPr algn="ctr"/>
+          </a:p>
+        </p:txBody>
+      </p:sp>
+      <p:sp>
+        <p:nvSpPr>
+          <p:cNvPr id="11" name="TextBox 10"/>
+          <p:cNvSpPr txBox="1"/>
+          <p:nvPr/>
+        </p:nvSpPr>
+        <p:spPr>
+          <a:xfrm>
+            <a:off x="4892040" y="3749040"/>
+            <a:ext cx="3657600" cy="1280160"/>
+          </a:xfrm>
+          <a:prstGeom prst="rect">
+            <a:avLst/>
+          </a:prstGeom>
+          <a:noFill/>
+        </p:spPr>
+        <p:txBody>
+          <a:bodyPr wrap="square">
+            <a:spAutoFit/>
+          </a:bodyPr>
+          <a:lstStyle/>
+          <a:p>
+            <a:pPr>
+              <a:defRPr sz="1300" b="1">
+                <a:solidFill>
+                  <a:srgbClr val="FFFFFF"/>
+                </a:solidFill>
+              </a:defRPr>
+            </a:pPr>
+            <a:r>
+              <a:t>Nicht erfüllt:</a:t>
+            </a:r>
+          </a:p>
+          <a:p>
+            <a:pPr>
+              <a:defRPr sz="1800" b="1">
+                <a:solidFill>
+                  <a:srgbClr val="FFFFFF"/>
+                </a:solidFill>
+              </a:defRPr>
+            </a:pPr>
+            <a:r>
+              <a:t>KZ -2</a:t>
+            </a:r>
+          </a:p>
+          <a:p>
+            <a:pPr>
+              <a:defRPr sz="1100">
+                <a:solidFill>
+                  <a:srgbClr val="FFFFFF"/>
+                </a:solidFill>
+              </a:defRPr>
+            </a:pPr>
+            <a:r>
+              <a:t>Verzögerung beim Patchen erzeugt Unsicherheit</a:t>
+            </a:r>
+          </a:p>
+        </p:txBody>
+      </p:sp>
+    </p:spTree>
+  </p:cSld>
+  <p:clrMapOvr>
+    <a:masterClrMapping/>
+  </p:clrMapOvr>
+</p:sld>
+</file>
+
+<file path=ppt/slides/slide5.xml><?xml version="1.0" encoding="utf-8"?>
+<p:sld xmlns:a="http://schemas.openxmlformats.org/drawingml/2006/main" xmlns:p="http://schemas.openxmlformats.org/presentationml/2006/main" xmlns:r="http://schemas.openxmlformats.org/officeDocument/2006/relationships">
+  <p:cSld>
+    <p:spTree>
+      <p:nvGrpSpPr>
+        <p:cNvPr id="1" name=""/>
+        <p:cNvGrpSpPr/>
+        <p:nvPr/>
+      </p:nvGrpSpPr>
+      <p:grpSpPr/>
+      <p:sp>
+        <p:nvSpPr>
+          <p:cNvPr id="2" name="Rectangle 1"/>
+          <p:cNvSpPr/>
+          <p:nvPr/>
+        </p:nvSpPr>
+        <p:spPr>
+          <a:xfrm>
+            <a:off x="0" y="0"/>
+            <a:ext cx="9144000" cy="1371600"/>
+          </a:xfrm>
+          <a:prstGeom prst="rect">
+            <a:avLst/>
+          </a:prstGeom>
+          <a:solidFill>
+            <a:srgbClr val="FF9900"/>
+          </a:solidFill>
+          <a:ln>
+            <a:noFill/>
+          </a:ln>
+        </p:spPr>
+        <p:style>
+          <a:lnRef idx="1">
+            <a:schemeClr val="accent1"/>
+          </a:lnRef>
+          <a:fillRef idx="3">
+            <a:schemeClr val="accent1"/>
+          </a:fillRef>
+          <a:effectRef idx="2">
+            <a:schemeClr val="accent1"/>
+          </a:effectRef>
+          <a:fontRef idx="minor">
+            <a:schemeClr val="lt1"/>
+          </a:fontRef>
+        </p:style>
+        <p:txBody>
+          <a:bodyPr rtlCol="0" anchor="ctr"/>
+          <a:lstStyle/>
+          <a:p>
+            <a:pPr algn="ctr"/>
+          </a:p>
+        </p:txBody>
+      </p:sp>
+      <p:sp>
+        <p:nvSpPr>
+          <p:cNvPr id="3" name="TextBox 2"/>
+          <p:cNvSpPr txBox="1"/>
+          <p:nvPr/>
+        </p:nvSpPr>
+        <p:spPr>
+          <a:xfrm>
+            <a:off x="457200" y="182880"/>
+            <a:ext cx="8229600" cy="548640"/>
+          </a:xfrm>
+          <a:prstGeom prst="rect">
+            <a:avLst/>
+          </a:prstGeom>
+          <a:noFill/>
+        </p:spPr>
+        <p:txBody>
+          <a:bodyPr wrap="none">
+            <a:spAutoFit/>
+          </a:bodyPr>
+          <a:lstStyle/>
+          <a:p>
+            <a:pPr algn="ctr">
+              <a:defRPr sz="3600" b="1">
+                <a:solidFill>
+                  <a:srgbClr val="FFFFFF"/>
+                </a:solidFill>
+              </a:defRPr>
+            </a:pPr>
+            <a:r>
+              <a:t>🏭 OEM-Sicherheitsaudit</a:t>
+            </a:r>
+          </a:p>
+        </p:txBody>
+      </p:sp>
+      <p:sp>
+        <p:nvSpPr>
+          <p:cNvPr id="4" name="TextBox 3"/>
+          <p:cNvSpPr txBox="1"/>
+          <p:nvPr/>
+        </p:nvSpPr>
+        <p:spPr>
+          <a:xfrm>
+            <a:off x="457200" y="777240"/>
+            <a:ext cx="8229600" cy="457200"/>
+          </a:xfrm>
+          <a:prstGeom prst="rect">
+            <a:avLst/>
+          </a:prstGeom>
+          <a:noFill/>
+        </p:spPr>
+        <p:txBody>
+          <a:bodyPr wrap="none">
+            <a:spAutoFit/>
+          </a:bodyPr>
+          <a:lstStyle/>
+          <a:p>
+            <a:pPr algn="ctr">
+              <a:defRPr sz="1800">
+                <a:solidFill>
+                  <a:srgbClr val="FFFFFF"/>
+                </a:solidFill>
+              </a:defRPr>
+            </a:pPr>
+            <a:r>
+              <a:t>Welle 2</a:t>
+            </a:r>
+          </a:p>
+        </p:txBody>
+      </p:sp>
+      <p:sp>
+        <p:nvSpPr>
+          <p:cNvPr id="5" name="TextBox 4"/>
+          <p:cNvSpPr txBox="1"/>
+          <p:nvPr/>
+        </p:nvSpPr>
+        <p:spPr>
+          <a:xfrm>
+            <a:off x="457200" y="1554480"/>
+            <a:ext cx="8229600" cy="822960"/>
+          </a:xfrm>
+          <a:prstGeom prst="rect">
+            <a:avLst/>
+          </a:prstGeom>
+          <a:noFill/>
+        </p:spPr>
+        <p:txBody>
+          <a:bodyPr wrap="square">
+            <a:spAutoFit/>
+          </a:bodyPr>
+          <a:lstStyle/>
+          <a:p>
+            <a:pPr algn="ctr">
+              <a:defRPr sz="1800">
+                <a:solidFill>
+                  <a:srgbClr val="343A40"/>
+                </a:solidFill>
+              </a:defRPr>
+            </a:pPr>
+            <a:r>
+              <a:t>Ein wichtiger Automobilkunde führt ein Sicherheitsaudit durch.</a:t>
+            </a:r>
+          </a:p>
+        </p:txBody>
+      </p:sp>
+      <p:sp>
+        <p:nvSpPr>
+          <p:cNvPr id="6" name="Rounded Rectangle 5"/>
+          <p:cNvSpPr/>
+          <p:nvPr/>
+        </p:nvSpPr>
+        <p:spPr>
+          <a:xfrm>
+            <a:off x="457200" y="2514600"/>
+            <a:ext cx="8229600" cy="914400"/>
+          </a:xfrm>
+          <a:prstGeom prst="roundRect">
+            <a:avLst/>
+          </a:prstGeom>
+          <a:solidFill>
+            <a:srgbClr val="F8F9FA"/>
+          </a:solidFill>
+          <a:ln w="25400">
+            <a:solidFill>
+              <a:srgbClr val="007AC2"/>
+            </a:solidFill>
+          </a:ln>
+        </p:spPr>
+        <p:style>
+          <a:lnRef idx="1">
+            <a:schemeClr val="accent1"/>
+          </a:lnRef>
+          <a:fillRef idx="3">
+            <a:schemeClr val="accent1"/>
+          </a:fillRef>
+          <a:effectRef idx="2">
+            <a:schemeClr val="accent1"/>
+          </a:effectRef>
+          <a:fontRef idx="minor">
+            <a:schemeClr val="lt1"/>
+          </a:fontRef>
+        </p:style>
+        <p:txBody>
+          <a:bodyPr rtlCol="0" anchor="ctr"/>
+          <a:lstStyle/>
+          <a:p>
+            <a:pPr algn="ctr"/>
+          </a:p>
+        </p:txBody>
+      </p:sp>
+      <p:sp>
+        <p:nvSpPr>
+          <p:cNvPr id="7" name="TextBox 6"/>
+          <p:cNvSpPr txBox="1"/>
+          <p:nvPr/>
+        </p:nvSpPr>
+        <p:spPr>
+          <a:xfrm>
+            <a:off x="640080" y="2606040"/>
+            <a:ext cx="7863840" cy="731520"/>
+          </a:xfrm>
+          <a:prstGeom prst="rect">
+            <a:avLst/>
+          </a:prstGeom>
+          <a:noFill/>
+        </p:spPr>
+        <p:txBody>
+          <a:bodyPr wrap="square">
+            <a:spAutoFit/>
+          </a:bodyPr>
+          <a:lstStyle/>
+          <a:p>
+            <a:pPr>
+              <a:defRPr sz="1400" b="1">
+                <a:solidFill>
+                  <a:srgbClr val="343A40"/>
+                </a:solidFill>
+              </a:defRPr>
+            </a:pPr>
+            <a:r>
+              <a:t>Bedingung:</a:t>
+            </a:r>
+          </a:p>
+          <a:p>
+            <a:pPr>
+              <a:defRPr sz="1600">
+                <a:solidFill>
+                  <a:srgbClr val="005293"/>
+                </a:solidFill>
+              </a:defRPr>
+            </a:pPr>
+            <a:r>
+              <a:t>E-Wert mindestens 18</a:t>
+            </a:r>
+          </a:p>
+        </p:txBody>
+      </p:sp>
+      <p:sp>
+        <p:nvSpPr>
+          <p:cNvPr id="8" name="Rounded Rectangle 7"/>
+          <p:cNvSpPr/>
+          <p:nvPr/>
+        </p:nvSpPr>
+        <p:spPr>
+          <a:xfrm>
+            <a:off x="457200" y="3657600"/>
+            <a:ext cx="3931920" cy="1463040"/>
+          </a:xfrm>
+          <a:prstGeom prst="roundRect">
+            <a:avLst/>
+          </a:prstGeom>
+          <a:solidFill>
+            <a:srgbClr val="00994C"/>
+          </a:solidFill>
+          <a:ln>
+            <a:noFill/>
+          </a:ln>
+        </p:spPr>
+        <p:style>
+          <a:lnRef idx="1">
+            <a:schemeClr val="accent1"/>
+          </a:lnRef>
+          <a:fillRef idx="3">
+            <a:schemeClr val="accent1"/>
+          </a:fillRef>
+          <a:effectRef idx="2">
+            <a:schemeClr val="accent1"/>
+          </a:effectRef>
+          <a:fontRef idx="minor">
+            <a:schemeClr val="lt1"/>
+          </a:fontRef>
+        </p:style>
+        <p:txBody>
+          <a:bodyPr rtlCol="0" anchor="ctr"/>
+          <a:lstStyle/>
+          <a:p>
+            <a:pPr algn="ctr"/>
+          </a:p>
+        </p:txBody>
+      </p:sp>
+      <p:sp>
+        <p:nvSpPr>
+          <p:cNvPr id="9" name="TextBox 8"/>
+          <p:cNvSpPr txBox="1"/>
+          <p:nvPr/>
+        </p:nvSpPr>
+        <p:spPr>
+          <a:xfrm>
+            <a:off x="594360" y="3749040"/>
+            <a:ext cx="3657600" cy="1280160"/>
+          </a:xfrm>
+          <a:prstGeom prst="rect">
+            <a:avLst/>
+          </a:prstGeom>
+          <a:noFill/>
+        </p:spPr>
+        <p:txBody>
+          <a:bodyPr wrap="square">
+            <a:spAutoFit/>
+          </a:bodyPr>
+          <a:lstStyle/>
+          <a:p>
+            <a:pPr>
+              <a:defRPr sz="1300" b="1">
+                <a:solidFill>
+                  <a:srgbClr val="FFFFFF"/>
+                </a:solidFill>
+              </a:defRPr>
+            </a:pPr>
+            <a:r>
+              <a:t>Erfüllt:</a:t>
+            </a:r>
+          </a:p>
+          <a:p>
+            <a:pPr>
+              <a:defRPr sz="1800" b="1">
+                <a:solidFill>
+                  <a:srgbClr val="FFFFFF"/>
+                </a:solidFill>
+              </a:defRPr>
+            </a:pPr>
+            <a:r>
+              <a:t>KZ +5</a:t>
+            </a:r>
+          </a:p>
+          <a:p>
+            <a:pPr>
+              <a:defRPr sz="1100">
+                <a:solidFill>
+                  <a:srgbClr val="FFFFFF"/>
+                </a:solidFill>
+              </a:defRPr>
+            </a:pPr>
+            <a:r>
+              <a:t>Audit bestanden - Kundenvertrauen gestärkt</a:t>
+            </a:r>
+          </a:p>
+        </p:txBody>
+      </p:sp>
+      <p:sp>
+        <p:nvSpPr>
+          <p:cNvPr id="10" name="Rounded Rectangle 9"/>
+          <p:cNvSpPr/>
+          <p:nvPr/>
+        </p:nvSpPr>
+        <p:spPr>
+          <a:xfrm>
+            <a:off x="4754880" y="3657600"/>
+            <a:ext cx="3931920" cy="1463040"/>
+          </a:xfrm>
+          <a:prstGeom prst="roundRect">
+            <a:avLst/>
+          </a:prstGeom>
+          <a:solidFill>
+            <a:srgbClr val="DC3545"/>
+          </a:solidFill>
+          <a:ln>
+            <a:noFill/>
+          </a:ln>
+        </p:spPr>
+        <p:style>
+          <a:lnRef idx="1">
+            <a:schemeClr val="accent1"/>
+          </a:lnRef>
+          <a:fillRef idx="3">
+            <a:schemeClr val="accent1"/>
+          </a:fillRef>
+          <a:effectRef idx="2">
+            <a:schemeClr val="accent1"/>
+          </a:effectRef>
+          <a:fontRef idx="minor">
+            <a:schemeClr val="lt1"/>
+          </a:fontRef>
+        </p:style>
+        <p:txBody>
+          <a:bodyPr rtlCol="0" anchor="ctr"/>
+          <a:lstStyle/>
+          <a:p>
+            <a:pPr algn="ctr"/>
+          </a:p>
+        </p:txBody>
+      </p:sp>
+      <p:sp>
+        <p:nvSpPr>
+          <p:cNvPr id="11" name="TextBox 10"/>
+          <p:cNvSpPr txBox="1"/>
+          <p:nvPr/>
+        </p:nvSpPr>
+        <p:spPr>
+          <a:xfrm>
+            <a:off x="4892040" y="3749040"/>
+            <a:ext cx="3657600" cy="1280160"/>
+          </a:xfrm>
+          <a:prstGeom prst="rect">
+            <a:avLst/>
+          </a:prstGeom>
+          <a:noFill/>
+        </p:spPr>
+        <p:txBody>
+          <a:bodyPr wrap="square">
+            <a:spAutoFit/>
+          </a:bodyPr>
+          <a:lstStyle/>
+          <a:p>
+            <a:pPr>
+              <a:defRPr sz="1300" b="1">
+                <a:solidFill>
+                  <a:srgbClr val="FFFFFF"/>
+                </a:solidFill>
+              </a:defRPr>
+            </a:pPr>
+            <a:r>
+              <a:t>Nicht erfüllt:</a:t>
+            </a:r>
+          </a:p>
+          <a:p>
+            <a:pPr>
+              <a:defRPr sz="1800" b="1">
+                <a:solidFill>
+                  <a:srgbClr val="FFFFFF"/>
+                </a:solidFill>
+              </a:defRPr>
+            </a:pPr>
+            <a:r>
+              <a:t>KZ -5</a:t>
+            </a:r>
+          </a:p>
+          <a:p>
+            <a:pPr>
+              <a:defRPr sz="1100">
+                <a:solidFill>
+                  <a:srgbClr val="FFFFFF"/>
+                </a:solidFill>
+              </a:defRPr>
+            </a:pPr>
+            <a:r>
+              <a:t>Audit-Mängel gefährden Kundenbeziehung</a:t>
+            </a:r>
+          </a:p>
+        </p:txBody>
+      </p:sp>
+    </p:spTree>
+  </p:cSld>
+  <p:clrMapOvr>
+    <a:masterClrMapping/>
+  </p:clrMapOvr>
+</p:sld>
+</file>
+
+<file path=ppt/slides/slide6.xml><?xml version="1.0" encoding="utf-8"?>
+<p:sld xmlns:a="http://schemas.openxmlformats.org/drawingml/2006/main" xmlns:p="http://schemas.openxmlformats.org/presentationml/2006/main" xmlns:r="http://schemas.openxmlformats.org/officeDocument/2006/relationships">
+  <p:cSld>
+    <p:spTree>
+      <p:nvGrpSpPr>
+        <p:cNvPr id="1" name=""/>
+        <p:cNvGrpSpPr/>
+        <p:nvPr/>
+      </p:nvGrpSpPr>
+      <p:grpSpPr/>
+      <p:sp>
+        <p:nvSpPr>
+          <p:cNvPr id="2" name="Rectangle 1"/>
+          <p:cNvSpPr/>
+          <p:nvPr/>
+        </p:nvSpPr>
+        <p:spPr>
+          <a:xfrm>
+            <a:off x="0" y="0"/>
+            <a:ext cx="9144000" cy="1371600"/>
+          </a:xfrm>
+          <a:prstGeom prst="rect">
+            <a:avLst/>
+          </a:prstGeom>
+          <a:solidFill>
+            <a:srgbClr val="FF9900"/>
+          </a:solidFill>
+          <a:ln>
+            <a:noFill/>
+          </a:ln>
+        </p:spPr>
+        <p:style>
+          <a:lnRef idx="1">
+            <a:schemeClr val="accent1"/>
+          </a:lnRef>
+          <a:fillRef idx="3">
+            <a:schemeClr val="accent1"/>
+          </a:fillRef>
+          <a:effectRef idx="2">
+            <a:schemeClr val="accent1"/>
+          </a:effectRef>
+          <a:fontRef idx="minor">
+            <a:schemeClr val="lt1"/>
+          </a:fontRef>
+        </p:style>
+        <p:txBody>
+          <a:bodyPr rtlCol="0" anchor="ctr"/>
+          <a:lstStyle/>
+          <a:p>
+            <a:pPr algn="ctr"/>
+          </a:p>
+        </p:txBody>
+      </p:sp>
+      <p:sp>
+        <p:nvSpPr>
+          <p:cNvPr id="3" name="TextBox 2"/>
+          <p:cNvSpPr txBox="1"/>
+          <p:nvPr/>
+        </p:nvSpPr>
+        <p:spPr>
+          <a:xfrm>
+            <a:off x="457200" y="182880"/>
+            <a:ext cx="8229600" cy="548640"/>
+          </a:xfrm>
+          <a:prstGeom prst="rect">
+            <a:avLst/>
+          </a:prstGeom>
+          <a:noFill/>
+        </p:spPr>
+        <p:txBody>
+          <a:bodyPr wrap="none">
+            <a:spAutoFit/>
+          </a:bodyPr>
+          <a:lstStyle/>
+          <a:p>
+            <a:pPr algn="ctr">
+              <a:defRPr sz="3600" b="1">
+                <a:solidFill>
+                  <a:srgbClr val="FFFFFF"/>
+                </a:solidFill>
+              </a:defRPr>
+            </a:pPr>
+            <a:r>
+              <a:t>⚙️ Produktionsdruck</a:t>
+            </a:r>
+          </a:p>
+        </p:txBody>
+      </p:sp>
+      <p:sp>
+        <p:nvSpPr>
+          <p:cNvPr id="4" name="TextBox 3"/>
+          <p:cNvSpPr txBox="1"/>
+          <p:nvPr/>
+        </p:nvSpPr>
+        <p:spPr>
+          <a:xfrm>
+            <a:off x="457200" y="777240"/>
+            <a:ext cx="8229600" cy="457200"/>
+          </a:xfrm>
+          <a:prstGeom prst="rect">
+            <a:avLst/>
+          </a:prstGeom>
+          <a:noFill/>
+        </p:spPr>
+        <p:txBody>
+          <a:bodyPr wrap="none">
+            <a:spAutoFit/>
+          </a:bodyPr>
+          <a:lstStyle/>
+          <a:p>
+            <a:pPr algn="ctr">
+              <a:defRPr sz="1800">
+                <a:solidFill>
+                  <a:srgbClr val="FFFFFF"/>
+                </a:solidFill>
+              </a:defRPr>
+            </a:pPr>
+            <a:r>
+              <a:t>Welle 2</a:t>
+            </a:r>
+          </a:p>
+        </p:txBody>
+      </p:sp>
+      <p:sp>
+        <p:nvSpPr>
+          <p:cNvPr id="5" name="TextBox 4"/>
+          <p:cNvSpPr txBox="1"/>
+          <p:nvPr/>
+        </p:nvSpPr>
+        <p:spPr>
+          <a:xfrm>
+            <a:off x="457200" y="1554480"/>
+            <a:ext cx="8229600" cy="822960"/>
+          </a:xfrm>
+          <a:prstGeom prst="rect">
+            <a:avLst/>
+          </a:prstGeom>
+          <a:noFill/>
+        </p:spPr>
+        <p:txBody>
+          <a:bodyPr wrap="square">
+            <a:spAutoFit/>
+          </a:bodyPr>
+          <a:lstStyle/>
+          <a:p>
+            <a:pPr algn="ctr">
+              <a:defRPr sz="1800">
+                <a:solidFill>
+                  <a:srgbClr val="343A40"/>
+                </a:solidFill>
+              </a:defRPr>
+            </a:pPr>
+            <a:r>
+              <a:t>Lieferengpässe erfordern Überstunden und schnelle Lösungen.</a:t>
+            </a:r>
+          </a:p>
+        </p:txBody>
+      </p:sp>
+      <p:sp>
+        <p:nvSpPr>
+          <p:cNvPr id="6" name="Rounded Rectangle 5"/>
+          <p:cNvSpPr/>
+          <p:nvPr/>
+        </p:nvSpPr>
+        <p:spPr>
+          <a:xfrm>
+            <a:off x="457200" y="2514600"/>
+            <a:ext cx="8229600" cy="914400"/>
+          </a:xfrm>
+          <a:prstGeom prst="roundRect">
+            <a:avLst/>
+          </a:prstGeom>
+          <a:solidFill>
+            <a:srgbClr val="F8F9FA"/>
+          </a:solidFill>
+          <a:ln w="25400">
+            <a:solidFill>
+              <a:srgbClr val="007AC2"/>
+            </a:solidFill>
+          </a:ln>
+        </p:spPr>
+        <p:style>
+          <a:lnRef idx="1">
+            <a:schemeClr val="accent1"/>
+          </a:lnRef>
+          <a:fillRef idx="3">
+            <a:schemeClr val="accent1"/>
+          </a:fillRef>
+          <a:effectRef idx="2">
+            <a:schemeClr val="accent1"/>
+          </a:effectRef>
+          <a:fontRef idx="minor">
+            <a:schemeClr val="lt1"/>
+          </a:fontRef>
+        </p:style>
+        <p:txBody>
+          <a:bodyPr rtlCol="0" anchor="ctr"/>
+          <a:lstStyle/>
+          <a:p>
+            <a:pPr algn="ctr"/>
+          </a:p>
+        </p:txBody>
+      </p:sp>
+      <p:sp>
+        <p:nvSpPr>
+          <p:cNvPr id="7" name="TextBox 6"/>
+          <p:cNvSpPr txBox="1"/>
+          <p:nvPr/>
+        </p:nvSpPr>
+        <p:spPr>
+          <a:xfrm>
+            <a:off x="640080" y="2606040"/>
+            <a:ext cx="7863840" cy="731520"/>
+          </a:xfrm>
+          <a:prstGeom prst="rect">
+            <a:avLst/>
+          </a:prstGeom>
+          <a:noFill/>
+        </p:spPr>
+        <p:txBody>
+          <a:bodyPr wrap="square">
+            <a:spAutoFit/>
+          </a:bodyPr>
+          <a:lstStyle/>
+          <a:p>
+            <a:pPr>
+              <a:defRPr sz="1400" b="1">
+                <a:solidFill>
+                  <a:srgbClr val="343A40"/>
+                </a:solidFill>
+              </a:defRPr>
+            </a:pPr>
+            <a:r>
+              <a:t>Bedingung:</a:t>
+            </a:r>
+          </a:p>
+          <a:p>
+            <a:pPr>
+              <a:defRPr sz="1600">
+                <a:solidFill>
+                  <a:srgbClr val="005293"/>
+                </a:solidFill>
+              </a:defRPr>
+            </a:pPr>
+            <a:r>
+              <a:t>M5 mindestens Level 1</a:t>
+            </a:r>
+          </a:p>
+        </p:txBody>
+      </p:sp>
+      <p:sp>
+        <p:nvSpPr>
+          <p:cNvPr id="8" name="Rounded Rectangle 7"/>
+          <p:cNvSpPr/>
+          <p:nvPr/>
+        </p:nvSpPr>
+        <p:spPr>
+          <a:xfrm>
+            <a:off x="457200" y="3657600"/>
+            <a:ext cx="3931920" cy="1463040"/>
+          </a:xfrm>
+          <a:prstGeom prst="roundRect">
+            <a:avLst/>
+          </a:prstGeom>
+          <a:solidFill>
+            <a:srgbClr val="00994C"/>
+          </a:solidFill>
+          <a:ln>
+            <a:noFill/>
+          </a:ln>
+        </p:spPr>
+        <p:style>
+          <a:lnRef idx="1">
+            <a:schemeClr val="accent1"/>
+          </a:lnRef>
+          <a:fillRef idx="3">
+            <a:schemeClr val="accent1"/>
+          </a:fillRef>
+          <a:effectRef idx="2">
+            <a:schemeClr val="accent1"/>
+          </a:effectRef>
+          <a:fontRef idx="minor">
+            <a:schemeClr val="lt1"/>
+          </a:fontRef>
+        </p:style>
+        <p:txBody>
+          <a:bodyPr rtlCol="0" anchor="ctr"/>
+          <a:lstStyle/>
+          <a:p>
+            <a:pPr algn="ctr"/>
+          </a:p>
+        </p:txBody>
+      </p:sp>
+      <p:sp>
+        <p:nvSpPr>
+          <p:cNvPr id="9" name="TextBox 8"/>
+          <p:cNvSpPr txBox="1"/>
+          <p:nvPr/>
+        </p:nvSpPr>
+        <p:spPr>
+          <a:xfrm>
+            <a:off x="594360" y="3749040"/>
+            <a:ext cx="3657600" cy="1280160"/>
+          </a:xfrm>
+          <a:prstGeom prst="rect">
+            <a:avLst/>
+          </a:prstGeom>
+          <a:noFill/>
+        </p:spPr>
+        <p:txBody>
+          <a:bodyPr wrap="square">
+            <a:spAutoFit/>
+          </a:bodyPr>
+          <a:lstStyle/>
+          <a:p>
+            <a:pPr>
+              <a:defRPr sz="1300" b="1">
+                <a:solidFill>
+                  <a:srgbClr val="FFFFFF"/>
+                </a:solidFill>
+              </a:defRPr>
+            </a:pPr>
+            <a:r>
+              <a:t>Erfüllt:</a:t>
+            </a:r>
+          </a:p>
+          <a:p>
+            <a:pPr>
+              <a:defRPr sz="1800" b="1">
+                <a:solidFill>
+                  <a:srgbClr val="FFFFFF"/>
+                </a:solidFill>
+              </a:defRPr>
+            </a:pPr>
+            <a:r>
+              <a:t>Keine Auswirkung</a:t>
+            </a:r>
+          </a:p>
+          <a:p>
+            <a:pPr>
+              <a:defRPr sz="1100">
+                <a:solidFill>
+                  <a:srgbClr val="FFFFFF"/>
+                </a:solidFill>
+              </a:defRPr>
+            </a:pPr>
+            <a:r>
+              <a:t>Segmentierte Netze erlauben flexible Produktion</a:t>
+            </a:r>
+          </a:p>
+        </p:txBody>
+      </p:sp>
+      <p:sp>
+        <p:nvSpPr>
+          <p:cNvPr id="10" name="Rounded Rectangle 9"/>
+          <p:cNvSpPr/>
+          <p:nvPr/>
+        </p:nvSpPr>
+        <p:spPr>
+          <a:xfrm>
+            <a:off x="4754880" y="3657600"/>
+            <a:ext cx="3931920" cy="1463040"/>
+          </a:xfrm>
+          <a:prstGeom prst="roundRect">
+            <a:avLst/>
+          </a:prstGeom>
+          <a:solidFill>
+            <a:srgbClr val="DC3545"/>
+          </a:solidFill>
+          <a:ln>
+            <a:noFill/>
+          </a:ln>
+        </p:spPr>
+        <p:style>
+          <a:lnRef idx="1">
+            <a:schemeClr val="accent1"/>
+          </a:lnRef>
+          <a:fillRef idx="3">
+            <a:schemeClr val="accent1"/>
+          </a:fillRef>
+          <a:effectRef idx="2">
+            <a:schemeClr val="accent1"/>
+          </a:effectRef>
+          <a:fontRef idx="minor">
+            <a:schemeClr val="lt1"/>
+          </a:fontRef>
+        </p:style>
+        <p:txBody>
+          <a:bodyPr rtlCol="0" anchor="ctr"/>
+          <a:lstStyle/>
+          <a:p>
+            <a:pPr algn="ctr"/>
+          </a:p>
+        </p:txBody>
+      </p:sp>
+      <p:sp>
+        <p:nvSpPr>
+          <p:cNvPr id="11" name="TextBox 10"/>
+          <p:cNvSpPr txBox="1"/>
+          <p:nvPr/>
+        </p:nvSpPr>
+        <p:spPr>
+          <a:xfrm>
+            <a:off x="4892040" y="3749040"/>
+            <a:ext cx="3657600" cy="1280160"/>
+          </a:xfrm>
+          <a:prstGeom prst="rect">
+            <a:avLst/>
+          </a:prstGeom>
+          <a:noFill/>
+        </p:spPr>
+        <p:txBody>
+          <a:bodyPr wrap="square">
+            <a:spAutoFit/>
+          </a:bodyPr>
+          <a:lstStyle/>
+          <a:p>
+            <a:pPr>
+              <a:defRPr sz="1300" b="1">
+                <a:solidFill>
+                  <a:srgbClr val="FFFFFF"/>
+                </a:solidFill>
+              </a:defRPr>
+            </a:pPr>
+            <a:r>
+              <a:t>Nicht erfüllt:</a:t>
+            </a:r>
+          </a:p>
+          <a:p>
+            <a:pPr>
+              <a:defRPr sz="1800" b="1">
+                <a:solidFill>
+                  <a:srgbClr val="FFFFFF"/>
+                </a:solidFill>
+              </a:defRPr>
+            </a:pPr>
+            <a:r>
+              <a:t>OPEX +8k€</a:t>
+            </a:r>
+          </a:p>
+          <a:p>
+            <a:pPr>
+              <a:defRPr sz="1100">
+                <a:solidFill>
+                  <a:srgbClr val="FFFFFF"/>
+                </a:solidFill>
+              </a:defRPr>
+            </a:pPr>
+            <a:r>
+              <a:t>Notfall-Maßnahmen zur Absicherung der Produktion</a:t>
+            </a:r>
+          </a:p>
+        </p:txBody>
+      </p:sp>
+    </p:spTree>
+  </p:cSld>
+  <p:clrMapOvr>
+    <a:masterClrMapping/>
+  </p:clrMapOvr>
+</p:sld>
+</file>
+
+<file path=ppt/slides/slide7.xml><?xml version="1.0" encoding="utf-8"?>
+<p:sld xmlns:a="http://schemas.openxmlformats.org/drawingml/2006/main" xmlns:p="http://schemas.openxmlformats.org/presentationml/2006/main" xmlns:r="http://schemas.openxmlformats.org/officeDocument/2006/relationships">
+  <p:cSld>
+    <p:spTree>
+      <p:nvGrpSpPr>
+        <p:cNvPr id="1" name=""/>
+        <p:cNvGrpSpPr/>
+        <p:nvPr/>
+      </p:nvGrpSpPr>
+      <p:grpSpPr/>
+      <p:sp>
+        <p:nvSpPr>
+          <p:cNvPr id="2" name="Rectangle 1"/>
+          <p:cNvSpPr/>
+          <p:nvPr/>
+        </p:nvSpPr>
+        <p:spPr>
+          <a:xfrm>
+            <a:off x="0" y="0"/>
+            <a:ext cx="9144000" cy="1371600"/>
+          </a:xfrm>
+          <a:prstGeom prst="rect">
+            <a:avLst/>
+          </a:prstGeom>
+          <a:solidFill>
+            <a:srgbClr val="FF9900"/>
+          </a:solidFill>
+          <a:ln>
+            <a:noFill/>
+          </a:ln>
+        </p:spPr>
+        <p:style>
+          <a:lnRef idx="1">
+            <a:schemeClr val="accent1"/>
+          </a:lnRef>
+          <a:fillRef idx="3">
+            <a:schemeClr val="accent1"/>
+          </a:fillRef>
+          <a:effectRef idx="2">
+            <a:schemeClr val="accent1"/>
+          </a:effectRef>
+          <a:fontRef idx="minor">
+            <a:schemeClr val="lt1"/>
+          </a:fontRef>
+        </p:style>
+        <p:txBody>
+          <a:bodyPr rtlCol="0" anchor="ctr"/>
+          <a:lstStyle/>
+          <a:p>
+            <a:pPr algn="ctr"/>
+          </a:p>
+        </p:txBody>
+      </p:sp>
+      <p:sp>
+        <p:nvSpPr>
+          <p:cNvPr id="3" name="TextBox 2"/>
+          <p:cNvSpPr txBox="1"/>
+          <p:nvPr/>
+        </p:nvSpPr>
+        <p:spPr>
+          <a:xfrm>
+            <a:off x="457200" y="182880"/>
+            <a:ext cx="8229600" cy="548640"/>
+          </a:xfrm>
+          <a:prstGeom prst="rect">
+            <a:avLst/>
+          </a:prstGeom>
+          <a:noFill/>
+        </p:spPr>
+        <p:txBody>
+          <a:bodyPr wrap="none">
+            <a:spAutoFit/>
+          </a:bodyPr>
+          <a:lstStyle/>
+          <a:p>
+            <a:pPr algn="ctr">
+              <a:defRPr sz="3600" b="1">
+                <a:solidFill>
+                  <a:srgbClr val="FFFFFF"/>
+                </a:solidFill>
+              </a:defRPr>
+            </a:pPr>
+            <a:r>
+              <a:t>👤 Security-Experte kündigt</a:t>
+            </a:r>
+          </a:p>
+        </p:txBody>
+      </p:sp>
+      <p:sp>
+        <p:nvSpPr>
+          <p:cNvPr id="4" name="TextBox 3"/>
+          <p:cNvSpPr txBox="1"/>
+          <p:nvPr/>
+        </p:nvSpPr>
+        <p:spPr>
+          <a:xfrm>
+            <a:off x="457200" y="777240"/>
+            <a:ext cx="8229600" cy="457200"/>
+          </a:xfrm>
+          <a:prstGeom prst="rect">
+            <a:avLst/>
+          </a:prstGeom>
+          <a:noFill/>
+        </p:spPr>
+        <p:txBody>
+          <a:bodyPr wrap="none">
+            <a:spAutoFit/>
+          </a:bodyPr>
+          <a:lstStyle/>
+          <a:p>
+            <a:pPr algn="ctr">
+              <a:defRPr sz="1800">
+                <a:solidFill>
+                  <a:srgbClr val="FFFFFF"/>
+                </a:solidFill>
+              </a:defRPr>
+            </a:pPr>
+            <a:r>
+              <a:t>Welle 2</a:t>
+            </a:r>
+          </a:p>
+        </p:txBody>
+      </p:sp>
+      <p:sp>
+        <p:nvSpPr>
+          <p:cNvPr id="5" name="TextBox 4"/>
+          <p:cNvSpPr txBox="1"/>
+          <p:nvPr/>
+        </p:nvSpPr>
+        <p:spPr>
+          <a:xfrm>
+            <a:off x="457200" y="1554480"/>
+            <a:ext cx="8229600" cy="822960"/>
+          </a:xfrm>
+          <a:prstGeom prst="rect">
+            <a:avLst/>
+          </a:prstGeom>
+          <a:noFill/>
+        </p:spPr>
+        <p:txBody>
+          <a:bodyPr wrap="square">
+            <a:spAutoFit/>
+          </a:bodyPr>
+          <a:lstStyle/>
+          <a:p>
+            <a:pPr algn="ctr">
+              <a:defRPr sz="1800">
+                <a:solidFill>
+                  <a:srgbClr val="343A40"/>
+                </a:solidFill>
+              </a:defRPr>
+            </a:pPr>
+            <a:r>
+              <a:t>Ein wichtiger IT-Security-Mitarbeiter verlässt das Unternehmen.</a:t>
+            </a:r>
+          </a:p>
+        </p:txBody>
+      </p:sp>
+      <p:sp>
+        <p:nvSpPr>
+          <p:cNvPr id="6" name="Rounded Rectangle 5"/>
+          <p:cNvSpPr/>
+          <p:nvPr/>
+        </p:nvSpPr>
+        <p:spPr>
+          <a:xfrm>
+            <a:off x="457200" y="2514600"/>
+            <a:ext cx="8229600" cy="914400"/>
+          </a:xfrm>
+          <a:prstGeom prst="roundRect">
+            <a:avLst/>
+          </a:prstGeom>
+          <a:solidFill>
+            <a:srgbClr val="F8F9FA"/>
+          </a:solidFill>
+          <a:ln w="25400">
+            <a:solidFill>
+              <a:srgbClr val="007AC2"/>
+            </a:solidFill>
+          </a:ln>
+        </p:spPr>
+        <p:style>
+          <a:lnRef idx="1">
+            <a:schemeClr val="accent1"/>
+          </a:lnRef>
+          <a:fillRef idx="3">
+            <a:schemeClr val="accent1"/>
+          </a:fillRef>
+          <a:effectRef idx="2">
+            <a:schemeClr val="accent1"/>
+          </a:effectRef>
+          <a:fontRef idx="minor">
+            <a:schemeClr val="lt1"/>
+          </a:fontRef>
+        </p:style>
+        <p:txBody>
+          <a:bodyPr rtlCol="0" anchor="ctr"/>
+          <a:lstStyle/>
+          <a:p>
+            <a:pPr algn="ctr"/>
+          </a:p>
+        </p:txBody>
+      </p:sp>
+      <p:sp>
+        <p:nvSpPr>
+          <p:cNvPr id="7" name="TextBox 6"/>
+          <p:cNvSpPr txBox="1"/>
+          <p:nvPr/>
+        </p:nvSpPr>
+        <p:spPr>
+          <a:xfrm>
+            <a:off x="640080" y="2606040"/>
+            <a:ext cx="7863840" cy="731520"/>
+          </a:xfrm>
+          <a:prstGeom prst="rect">
+            <a:avLst/>
+          </a:prstGeom>
+          <a:noFill/>
+        </p:spPr>
+        <p:txBody>
+          <a:bodyPr wrap="square">
+            <a:spAutoFit/>
+          </a:bodyPr>
+          <a:lstStyle/>
+          <a:p>
+            <a:pPr>
+              <a:defRPr sz="1400" b="1">
+                <a:solidFill>
+                  <a:srgbClr val="343A40"/>
+                </a:solidFill>
+              </a:defRPr>
+            </a:pPr>
+            <a:r>
+              <a:t>Bedingung:</a:t>
+            </a:r>
+          </a:p>
+          <a:p>
+            <a:pPr>
+              <a:defRPr sz="1600">
+                <a:solidFill>
+                  <a:srgbClr val="005293"/>
+                </a:solidFill>
+              </a:defRPr>
+            </a:pPr>
+            <a:r>
+              <a:t>M2 mindestens Level 2</a:t>
+            </a:r>
+          </a:p>
+        </p:txBody>
+      </p:sp>
+      <p:sp>
+        <p:nvSpPr>
+          <p:cNvPr id="8" name="Rounded Rectangle 7"/>
+          <p:cNvSpPr/>
+          <p:nvPr/>
+        </p:nvSpPr>
+        <p:spPr>
+          <a:xfrm>
+            <a:off x="457200" y="3657600"/>
+            <a:ext cx="3931920" cy="1463040"/>
+          </a:xfrm>
+          <a:prstGeom prst="roundRect">
+            <a:avLst/>
+          </a:prstGeom>
+          <a:solidFill>
+            <a:srgbClr val="00994C"/>
+          </a:solidFill>
+          <a:ln>
+            <a:noFill/>
+          </a:ln>
+        </p:spPr>
+        <p:style>
+          <a:lnRef idx="1">
+            <a:schemeClr val="accent1"/>
+          </a:lnRef>
+          <a:fillRef idx="3">
+            <a:schemeClr val="accent1"/>
+          </a:fillRef>
+          <a:effectRef idx="2">
+            <a:schemeClr val="accent1"/>
+          </a:effectRef>
+          <a:fontRef idx="minor">
+            <a:schemeClr val="lt1"/>
+          </a:fontRef>
+        </p:style>
+        <p:txBody>
+          <a:bodyPr rtlCol="0" anchor="ctr"/>
+          <a:lstStyle/>
+          <a:p>
+            <a:pPr algn="ctr"/>
+          </a:p>
+        </p:txBody>
+      </p:sp>
+      <p:sp>
+        <p:nvSpPr>
+          <p:cNvPr id="9" name="TextBox 8"/>
+          <p:cNvSpPr txBox="1"/>
+          <p:nvPr/>
+        </p:nvSpPr>
+        <p:spPr>
+          <a:xfrm>
+            <a:off x="594360" y="3749040"/>
+            <a:ext cx="3657600" cy="1280160"/>
+          </a:xfrm>
+          <a:prstGeom prst="rect">
+            <a:avLst/>
+          </a:prstGeom>
+          <a:noFill/>
+        </p:spPr>
+        <p:txBody>
+          <a:bodyPr wrap="square">
+            <a:spAutoFit/>
+          </a:bodyPr>
+          <a:lstStyle/>
+          <a:p>
+            <a:pPr>
+              <a:defRPr sz="1300" b="1">
+                <a:solidFill>
+                  <a:srgbClr val="FFFFFF"/>
+                </a:solidFill>
+              </a:defRPr>
+            </a:pPr>
+            <a:r>
+              <a:t>Erfüllt:</a:t>
+            </a:r>
+          </a:p>
+          <a:p>
+            <a:pPr>
+              <a:defRPr sz="1800" b="1">
+                <a:solidFill>
+                  <a:srgbClr val="FFFFFF"/>
+                </a:solidFill>
+              </a:defRPr>
+            </a:pPr>
+            <a:r>
+              <a:t>Keine Auswirkung</a:t>
+            </a:r>
+          </a:p>
+          <a:p>
+            <a:pPr>
+              <a:defRPr sz="1100">
+                <a:solidFill>
+                  <a:srgbClr val="FFFFFF"/>
+                </a:solidFill>
+              </a:defRPr>
+            </a:pPr>
+            <a:r>
+              <a:t>Dokumentierte Prozesse ermöglichen Übergabe</a:t>
+            </a:r>
+          </a:p>
+        </p:txBody>
+      </p:sp>
+      <p:sp>
+        <p:nvSpPr>
+          <p:cNvPr id="10" name="Rounded Rectangle 9"/>
+          <p:cNvSpPr/>
+          <p:nvPr/>
+        </p:nvSpPr>
+        <p:spPr>
+          <a:xfrm>
+            <a:off x="4754880" y="3657600"/>
+            <a:ext cx="3931920" cy="1463040"/>
+          </a:xfrm>
+          <a:prstGeom prst="roundRect">
+            <a:avLst/>
+          </a:prstGeom>
+          <a:solidFill>
+            <a:srgbClr val="DC3545"/>
+          </a:solidFill>
+          <a:ln>
+            <a:noFill/>
+          </a:ln>
+        </p:spPr>
+        <p:style>
+          <a:lnRef idx="1">
+            <a:schemeClr val="accent1"/>
+          </a:lnRef>
+          <a:fillRef idx="3">
+            <a:schemeClr val="accent1"/>
+          </a:fillRef>
+          <a:effectRef idx="2">
+            <a:schemeClr val="accent1"/>
+          </a:effectRef>
+          <a:fontRef idx="minor">
+            <a:schemeClr val="lt1"/>
+          </a:fontRef>
+        </p:style>
+        <p:txBody>
+          <a:bodyPr rtlCol="0" anchor="ctr"/>
+          <a:lstStyle/>
+          <a:p>
+            <a:pPr algn="ctr"/>
+          </a:p>
+        </p:txBody>
+      </p:sp>
+      <p:sp>
+        <p:nvSpPr>
+          <p:cNvPr id="11" name="TextBox 10"/>
+          <p:cNvSpPr txBox="1"/>
+          <p:nvPr/>
+        </p:nvSpPr>
+        <p:spPr>
+          <a:xfrm>
+            <a:off x="4892040" y="3749040"/>
+            <a:ext cx="3657600" cy="1280160"/>
+          </a:xfrm>
+          <a:prstGeom prst="rect">
+            <a:avLst/>
+          </a:prstGeom>
+          <a:noFill/>
+        </p:spPr>
+        <p:txBody>
+          <a:bodyPr wrap="square">
+            <a:spAutoFit/>
+          </a:bodyPr>
+          <a:lstStyle/>
+          <a:p>
+            <a:pPr>
+              <a:defRPr sz="1300" b="1">
+                <a:solidFill>
+                  <a:srgbClr val="FFFFFF"/>
+                </a:solidFill>
+              </a:defRPr>
+            </a:pPr>
+            <a:r>
+              <a:t>Nicht erfüllt:</a:t>
+            </a:r>
+          </a:p>
+          <a:p>
+            <a:pPr>
+              <a:defRPr sz="1800" b="1">
+                <a:solidFill>
+                  <a:srgbClr val="FFFFFF"/>
+                </a:solidFill>
+              </a:defRPr>
+            </a:pPr>
+            <a:r>
+              <a:t>KZ -3, OPEX +5k€</a:t>
+            </a:r>
+          </a:p>
+          <a:p>
+            <a:pPr>
+              <a:defRPr sz="1100">
+                <a:solidFill>
+                  <a:srgbClr val="FFFFFF"/>
+                </a:solidFill>
+              </a:defRPr>
+            </a:pPr>
+            <a:r>
+              <a:t>Wissensverlust erfordert teure Berater</a:t>
+            </a:r>
+          </a:p>
+        </p:txBody>
+      </p:sp>
+    </p:spTree>
+  </p:cSld>
+  <p:clrMapOvr>
+    <a:masterClrMapping/>
+  </p:clrMapOvr>
+</p:sld>
+</file>
+
+<file path=ppt/slides/slide8.xml><?xml version="1.0" encoding="utf-8"?>
+<p:sld xmlns:a="http://schemas.openxmlformats.org/drawingml/2006/main" xmlns:p="http://schemas.openxmlformats.org/presentationml/2006/main" xmlns:r="http://schemas.openxmlformats.org/officeDocument/2006/relationships">
+  <p:cSld>
+    <p:spTree>
+      <p:nvGrpSpPr>
+        <p:cNvPr id="1" name=""/>
+        <p:cNvGrpSpPr/>
+        <p:nvPr/>
+      </p:nvGrpSpPr>
+      <p:grpSpPr/>
+      <p:sp>
+        <p:nvSpPr>
+          <p:cNvPr id="2" name="Rectangle 1"/>
+          <p:cNvSpPr/>
+          <p:nvPr/>
+        </p:nvSpPr>
+        <p:spPr>
+          <a:xfrm>
+            <a:off x="0" y="0"/>
+            <a:ext cx="9144000" cy="1371600"/>
+          </a:xfrm>
+          <a:prstGeom prst="rect">
+            <a:avLst/>
+          </a:prstGeom>
+          <a:solidFill>
+            <a:srgbClr val="FF9900"/>
+          </a:solidFill>
+          <a:ln>
+            <a:noFill/>
+          </a:ln>
+        </p:spPr>
+        <p:style>
+          <a:lnRef idx="1">
+            <a:schemeClr val="accent1"/>
+          </a:lnRef>
+          <a:fillRef idx="3">
+            <a:schemeClr val="accent1"/>
+          </a:fillRef>
+          <a:effectRef idx="2">
+            <a:schemeClr val="accent1"/>
+          </a:effectRef>
+          <a:fontRef idx="minor">
+            <a:schemeClr val="lt1"/>
+          </a:fontRef>
+        </p:style>
+        <p:txBody>
+          <a:bodyPr rtlCol="0" anchor="ctr"/>
+          <a:lstStyle/>
+          <a:p>
+            <a:pPr algn="ctr"/>
+          </a:p>
+        </p:txBody>
+      </p:sp>
+      <p:sp>
+        <p:nvSpPr>
+          <p:cNvPr id="3" name="TextBox 2"/>
+          <p:cNvSpPr txBox="1"/>
+          <p:nvPr/>
+        </p:nvSpPr>
+        <p:spPr>
+          <a:xfrm>
+            <a:off x="457200" y="182880"/>
+            <a:ext cx="8229600" cy="548640"/>
+          </a:xfrm>
+          <a:prstGeom prst="rect">
+            <a:avLst/>
+          </a:prstGeom>
+          <a:noFill/>
+        </p:spPr>
+        <p:txBody>
+          <a:bodyPr wrap="none">
+            <a:spAutoFit/>
+          </a:bodyPr>
+          <a:lstStyle/>
+          <a:p>
+            <a:pPr algn="ctr">
+              <a:defRPr sz="3600" b="1">
+                <a:solidFill>
+                  <a:srgbClr val="FFFFFF"/>
+                </a:solidFill>
+              </a:defRPr>
+            </a:pPr>
+            <a:r>
+              <a:t>⚖️ NIS2/KRITIS-Prüfung</a:t>
+            </a:r>
+          </a:p>
+        </p:txBody>
+      </p:sp>
+      <p:sp>
+        <p:nvSpPr>
+          <p:cNvPr id="4" name="TextBox 3"/>
+          <p:cNvSpPr txBox="1"/>
+          <p:nvPr/>
+        </p:nvSpPr>
+        <p:spPr>
+          <a:xfrm>
+            <a:off x="457200" y="777240"/>
+            <a:ext cx="8229600" cy="457200"/>
+          </a:xfrm>
+          <a:prstGeom prst="rect">
+            <a:avLst/>
+          </a:prstGeom>
+          <a:noFill/>
+        </p:spPr>
+        <p:txBody>
+          <a:bodyPr wrap="none">
+            <a:spAutoFit/>
+          </a:bodyPr>
+          <a:lstStyle/>
+          <a:p>
+            <a:pPr algn="ctr">
+              <a:defRPr sz="1800">
+                <a:solidFill>
+                  <a:srgbClr val="FFFFFF"/>
+                </a:solidFill>
+              </a:defRPr>
+            </a:pPr>
+            <a:r>
+              <a:t>Welle 3</a:t>
+            </a:r>
+          </a:p>
+        </p:txBody>
+      </p:sp>
+      <p:sp>
+        <p:nvSpPr>
+          <p:cNvPr id="5" name="TextBox 4"/>
+          <p:cNvSpPr txBox="1"/>
+          <p:nvPr/>
+        </p:nvSpPr>
+        <p:spPr>
+          <a:xfrm>
+            <a:off x="457200" y="1554480"/>
+            <a:ext cx="8229600" cy="822960"/>
+          </a:xfrm>
+          <a:prstGeom prst="rect">
+            <a:avLst/>
+          </a:prstGeom>
+          <a:noFill/>
+        </p:spPr>
+        <p:txBody>
+          <a:bodyPr wrap="square">
+            <a:spAutoFit/>
+          </a:bodyPr>
+          <a:lstStyle/>
+          <a:p>
+            <a:pPr algn="ctr">
+              <a:defRPr sz="1800">
+                <a:solidFill>
+                  <a:srgbClr val="343A40"/>
+                </a:solidFill>
+              </a:defRPr>
+            </a:pPr>
+            <a:r>
+              <a:t>Die Behörde prüft Ihre Compliance mit NIS2-Anforderungen.</a:t>
+            </a:r>
+          </a:p>
+        </p:txBody>
+      </p:sp>
+      <p:sp>
+        <p:nvSpPr>
+          <p:cNvPr id="6" name="Rounded Rectangle 5"/>
+          <p:cNvSpPr/>
+          <p:nvPr/>
+        </p:nvSpPr>
+        <p:spPr>
+          <a:xfrm>
+            <a:off x="457200" y="2514600"/>
+            <a:ext cx="8229600" cy="914400"/>
+          </a:xfrm>
+          <a:prstGeom prst="roundRect">
+            <a:avLst/>
+          </a:prstGeom>
+          <a:solidFill>
+            <a:srgbClr val="F8F9FA"/>
+          </a:solidFill>
+          <a:ln w="25400">
+            <a:solidFill>
+              <a:srgbClr val="007AC2"/>
+            </a:solidFill>
+          </a:ln>
+        </p:spPr>
+        <p:style>
+          <a:lnRef idx="1">
+            <a:schemeClr val="accent1"/>
+          </a:lnRef>
+          <a:fillRef idx="3">
+            <a:schemeClr val="accent1"/>
+          </a:fillRef>
+          <a:effectRef idx="2">
+            <a:schemeClr val="accent1"/>
+          </a:effectRef>
+          <a:fontRef idx="minor">
+            <a:schemeClr val="lt1"/>
+          </a:fontRef>
+        </p:style>
+        <p:txBody>
+          <a:bodyPr rtlCol="0" anchor="ctr"/>
+          <a:lstStyle/>
+          <a:p>
+            <a:pPr algn="ctr"/>
+          </a:p>
+        </p:txBody>
+      </p:sp>
+      <p:sp>
+        <p:nvSpPr>
+          <p:cNvPr id="7" name="TextBox 6"/>
+          <p:cNvSpPr txBox="1"/>
+          <p:nvPr/>
+        </p:nvSpPr>
+        <p:spPr>
+          <a:xfrm>
+            <a:off x="640080" y="2606040"/>
+            <a:ext cx="7863840" cy="731520"/>
+          </a:xfrm>
+          <a:prstGeom prst="rect">
+            <a:avLst/>
+          </a:prstGeom>
+          <a:noFill/>
+        </p:spPr>
+        <p:txBody>
+          <a:bodyPr wrap="square">
+            <a:spAutoFit/>
+          </a:bodyPr>
+          <a:lstStyle/>
+          <a:p>
+            <a:pPr>
+              <a:defRPr sz="1400" b="1">
+                <a:solidFill>
+                  <a:srgbClr val="343A40"/>
+                </a:solidFill>
+              </a:defRPr>
+            </a:pPr>
+            <a:r>
+              <a:t>Bedingung:</a:t>
+            </a:r>
+          </a:p>
+          <a:p>
+            <a:pPr>
+              <a:defRPr sz="1600">
+                <a:solidFill>
+                  <a:srgbClr val="005293"/>
+                </a:solidFill>
+              </a:defRPr>
+            </a:pPr>
+            <a:r>
+              <a:t>Mindestens 4 Maßnahmen auf Level 2</a:t>
+            </a:r>
+          </a:p>
+        </p:txBody>
+      </p:sp>
+      <p:sp>
+        <p:nvSpPr>
+          <p:cNvPr id="8" name="Rounded Rectangle 7"/>
+          <p:cNvSpPr/>
+          <p:nvPr/>
+        </p:nvSpPr>
+        <p:spPr>
+          <a:xfrm>
+            <a:off x="457200" y="3657600"/>
+            <a:ext cx="3931920" cy="1463040"/>
+          </a:xfrm>
+          <a:prstGeom prst="roundRect">
+            <a:avLst/>
+          </a:prstGeom>
+          <a:solidFill>
+            <a:srgbClr val="00994C"/>
+          </a:solidFill>
+          <a:ln>
+            <a:noFill/>
+          </a:ln>
+        </p:spPr>
+        <p:style>
+          <a:lnRef idx="1">
+            <a:schemeClr val="accent1"/>
+          </a:lnRef>
+          <a:fillRef idx="3">
+            <a:schemeClr val="accent1"/>
+          </a:fillRef>
+          <a:effectRef idx="2">
+            <a:schemeClr val="accent1"/>
+          </a:effectRef>
+          <a:fontRef idx="minor">
+            <a:schemeClr val="lt1"/>
+          </a:fontRef>
+        </p:style>
+        <p:txBody>
+          <a:bodyPr rtlCol="0" anchor="ctr"/>
+          <a:lstStyle/>
+          <a:p>
+            <a:pPr algn="ctr"/>
+          </a:p>
+        </p:txBody>
+      </p:sp>
+      <p:sp>
+        <p:nvSpPr>
+          <p:cNvPr id="9" name="TextBox 8"/>
+          <p:cNvSpPr txBox="1"/>
+          <p:nvPr/>
+        </p:nvSpPr>
+        <p:spPr>
+          <a:xfrm>
+            <a:off x="594360" y="3749040"/>
+            <a:ext cx="3657600" cy="1280160"/>
+          </a:xfrm>
+          <a:prstGeom prst="rect">
+            <a:avLst/>
+          </a:prstGeom>
+          <a:noFill/>
+        </p:spPr>
+        <p:txBody>
+          <a:bodyPr wrap="square">
+            <a:spAutoFit/>
+          </a:bodyPr>
+          <a:lstStyle/>
+          <a:p>
+            <a:pPr>
+              <a:defRPr sz="1300" b="1">
+                <a:solidFill>
+                  <a:srgbClr val="FFFFFF"/>
+                </a:solidFill>
+              </a:defRPr>
+            </a:pPr>
+            <a:r>
+              <a:t>Erfüllt:</a:t>
+            </a:r>
+          </a:p>
+          <a:p>
+            <a:pPr>
+              <a:defRPr sz="1800" b="1">
+                <a:solidFill>
+                  <a:srgbClr val="FFFFFF"/>
+                </a:solidFill>
+              </a:defRPr>
+            </a:pPr>
+            <a:r>
+              <a:t>KZ +5</a:t>
+            </a:r>
+          </a:p>
+          <a:p>
+            <a:pPr>
+              <a:defRPr sz="1100">
+                <a:solidFill>
+                  <a:srgbClr val="FFFFFF"/>
+                </a:solidFill>
+              </a:defRPr>
+            </a:pPr>
+            <a:r>
+              <a:t>Compliance nachgewiesen - positive Bewertung</a:t>
+            </a:r>
+          </a:p>
+        </p:txBody>
+      </p:sp>
+      <p:sp>
+        <p:nvSpPr>
+          <p:cNvPr id="10" name="Rounded Rectangle 9"/>
+          <p:cNvSpPr/>
+          <p:nvPr/>
+        </p:nvSpPr>
+        <p:spPr>
+          <a:xfrm>
+            <a:off x="4754880" y="3657600"/>
+            <a:ext cx="3931920" cy="1463040"/>
+          </a:xfrm>
+          <a:prstGeom prst="roundRect">
+            <a:avLst/>
+          </a:prstGeom>
+          <a:solidFill>
+            <a:srgbClr val="DC3545"/>
+          </a:solidFill>
+          <a:ln>
+            <a:noFill/>
+          </a:ln>
+        </p:spPr>
+        <p:style>
+          <a:lnRef idx="1">
+            <a:schemeClr val="accent1"/>
+          </a:lnRef>
+          <a:fillRef idx="3">
+            <a:schemeClr val="accent1"/>
+          </a:fillRef>
+          <a:effectRef idx="2">
+            <a:schemeClr val="accent1"/>
+          </a:effectRef>
+          <a:fontRef idx="minor">
+            <a:schemeClr val="lt1"/>
+          </a:fontRef>
+        </p:style>
+        <p:txBody>
+          <a:bodyPr rtlCol="0" anchor="ctr"/>
+          <a:lstStyle/>
+          <a:p>
+            <a:pPr algn="ctr"/>
+          </a:p>
+        </p:txBody>
+      </p:sp>
+      <p:sp>
+        <p:nvSpPr>
+          <p:cNvPr id="11" name="TextBox 10"/>
+          <p:cNvSpPr txBox="1"/>
+          <p:nvPr/>
+        </p:nvSpPr>
+        <p:spPr>
+          <a:xfrm>
+            <a:off x="4892040" y="3749040"/>
+            <a:ext cx="3657600" cy="1280160"/>
+          </a:xfrm>
+          <a:prstGeom prst="rect">
+            <a:avLst/>
+          </a:prstGeom>
+          <a:noFill/>
+        </p:spPr>
+        <p:txBody>
+          <a:bodyPr wrap="square">
+            <a:spAutoFit/>
+          </a:bodyPr>
+          <a:lstStyle/>
+          <a:p>
+            <a:pPr>
+              <a:defRPr sz="1300" b="1">
+                <a:solidFill>
+                  <a:srgbClr val="FFFFFF"/>
+                </a:solidFill>
+              </a:defRPr>
+            </a:pPr>
+            <a:r>
+              <a:t>Nicht erfüllt:</a:t>
+            </a:r>
+          </a:p>
+          <a:p>
+            <a:pPr>
+              <a:defRPr sz="1800" b="1">
+                <a:solidFill>
+                  <a:srgbClr val="FFFFFF"/>
+                </a:solidFill>
+              </a:defRPr>
+            </a:pPr>
+            <a:r>
+              <a:t>KZ -5, Budget -15k€</a:t>
+            </a:r>
+          </a:p>
+          <a:p>
+            <a:pPr>
+              <a:defRPr sz="1100">
+                <a:solidFill>
+                  <a:srgbClr val="FFFFFF"/>
+                </a:solidFill>
+              </a:defRPr>
+            </a:pPr>
+            <a:r>
+              <a:t>Bußgeld und Nachbesserungspflicht</a:t>
+            </a:r>
+          </a:p>
+        </p:txBody>
+      </p:sp>
+    </p:spTree>
+  </p:cSld>
+  <p:clrMapOvr>
+    <a:masterClrMapping/>
+  </p:clrMapOvr>
+</p:sld>
+</file>
+
+<file path=ppt/slides/slide9.xml><?xml version="1.0" encoding="utf-8"?>
+<p:sld xmlns:a="http://schemas.openxmlformats.org/drawingml/2006/main" xmlns:p="http://schemas.openxmlformats.org/presentationml/2006/main" xmlns:r="http://schemas.openxmlformats.org/officeDocument/2006/relationships">
+  <p:cSld>
+    <p:spTree>
+      <p:nvGrpSpPr>
+        <p:cNvPr id="1" name=""/>
+        <p:cNvGrpSpPr/>
+        <p:nvPr/>
+      </p:nvGrpSpPr>
+      <p:grpSpPr/>
+      <p:sp>
+        <p:nvSpPr>
+          <p:cNvPr id="2" name="Rectangle 1"/>
+          <p:cNvSpPr/>
+          <p:nvPr/>
+        </p:nvSpPr>
+        <p:spPr>
+          <a:xfrm>
+            <a:off x="0" y="0"/>
+            <a:ext cx="9144000" cy="1371600"/>
+          </a:xfrm>
+          <a:prstGeom prst="rect">
+            <a:avLst/>
+          </a:prstGeom>
+          <a:solidFill>
+            <a:srgbClr val="FF9900"/>
+          </a:solidFill>
+          <a:ln>
+            <a:noFill/>
+          </a:ln>
+        </p:spPr>
+        <p:style>
+          <a:lnRef idx="1">
+            <a:schemeClr val="accent1"/>
+          </a:lnRef>
+          <a:fillRef idx="3">
+            <a:schemeClr val="accent1"/>
+          </a:fillRef>
+          <a:effectRef idx="2">
+            <a:schemeClr val="accent1"/>
+          </a:effectRef>
+          <a:fontRef idx="minor">
+            <a:schemeClr val="lt1"/>
+          </a:fontRef>
+        </p:style>
+        <p:txBody>
+          <a:bodyPr rtlCol="0" anchor="ctr"/>
+          <a:lstStyle/>
+          <a:p>
+            <a:pPr algn="ctr"/>
+          </a:p>
+        </p:txBody>
+      </p:sp>
+      <p:sp>
+        <p:nvSpPr>
+          <p:cNvPr id="3" name="TextBox 2"/>
+          <p:cNvSpPr txBox="1"/>
+          <p:nvPr/>
+        </p:nvSpPr>
+        <p:spPr>
+          <a:xfrm>
+            <a:off x="457200" y="182880"/>
+            <a:ext cx="8229600" cy="548640"/>
+          </a:xfrm>
+          <a:prstGeom prst="rect">
+            <a:avLst/>
+          </a:prstGeom>
+          <a:noFill/>
+        </p:spPr>
+        <p:txBody>
+          <a:bodyPr wrap="none">
+            <a:spAutoFit/>
+          </a:bodyPr>
+          <a:lstStyle/>
+          <a:p>
+            <a:pPr algn="ctr">
+              <a:defRPr sz="3600" b="1">
+                <a:solidFill>
+                  <a:srgbClr val="FFFFFF"/>
+                </a:solidFill>
+              </a:defRPr>
+            </a:pPr>
+            <a:r>
+              <a:t>🔗 Lieferanten-Datenpanne</a:t>
+            </a:r>
+          </a:p>
+        </p:txBody>
+      </p:sp>
+      <p:sp>
+        <p:nvSpPr>
+          <p:cNvPr id="4" name="TextBox 3"/>
+          <p:cNvSpPr txBox="1"/>
+          <p:nvPr/>
+        </p:nvSpPr>
+        <p:spPr>
+          <a:xfrm>
+            <a:off x="457200" y="777240"/>
+            <a:ext cx="8229600" cy="457200"/>
+          </a:xfrm>
+          <a:prstGeom prst="rect">
+            <a:avLst/>
+          </a:prstGeom>
+          <a:noFill/>
+        </p:spPr>
+        <p:txBody>
+          <a:bodyPr wrap="none">
+            <a:spAutoFit/>
+          </a:bodyPr>
+          <a:lstStyle/>
+          <a:p>
+            <a:pPr algn="ctr">
+              <a:defRPr sz="1800">
+                <a:solidFill>
+                  <a:srgbClr val="FFFFFF"/>
+                </a:solidFill>
+              </a:defRPr>
+            </a:pPr>
+            <a:r>
+              <a:t>Welle 3</a:t>
+            </a:r>
+          </a:p>
+        </p:txBody>
+      </p:sp>
+      <p:sp>
+        <p:nvSpPr>
+          <p:cNvPr id="5" name="TextBox 4"/>
+          <p:cNvSpPr txBox="1"/>
+          <p:nvPr/>
+        </p:nvSpPr>
+        <p:spPr>
+          <a:xfrm>
+            <a:off x="457200" y="1554480"/>
+            <a:ext cx="8229600" cy="822960"/>
+          </a:xfrm>
+          <a:prstGeom prst="rect">
+            <a:avLst/>
+          </a:prstGeom>
+          <a:noFill/>
+        </p:spPr>
+        <p:txBody>
+          <a:bodyPr wrap="square">
+            <a:spAutoFit/>
+          </a:bodyPr>
+          <a:lstStyle/>
+          <a:p>
+            <a:pPr algn="ctr">
+              <a:defRPr sz="1800">
+                <a:solidFill>
+                  <a:srgbClr val="343A40"/>
+                </a:solidFill>
+              </a:defRPr>
+            </a:pPr>
+            <a:r>
+              <a:t>Ein wichtiger Lieferant meldet einen Sicherheitsvorfall.</a:t>
+            </a:r>
+          </a:p>
+        </p:txBody>
+      </p:sp>
+      <p:sp>
+        <p:nvSpPr>
+          <p:cNvPr id="6" name="Rounded Rectangle 5"/>
+          <p:cNvSpPr/>
+          <p:nvPr/>
+        </p:nvSpPr>
+        <p:spPr>
+          <a:xfrm>
+            <a:off x="457200" y="2514600"/>
+            <a:ext cx="8229600" cy="914400"/>
+          </a:xfrm>
+          <a:prstGeom prst="roundRect">
+            <a:avLst/>
+          </a:prstGeom>
+          <a:solidFill>
+            <a:srgbClr val="F8F9FA"/>
+          </a:solidFill>
+          <a:ln w="25400">
+            <a:solidFill>
+              <a:srgbClr val="007AC2"/>
+            </a:solidFill>
+          </a:ln>
+        </p:spPr>
+        <p:style>
+          <a:lnRef idx="1">
+            <a:schemeClr val="accent1"/>
+          </a:lnRef>
+          <a:fillRef idx="3">
+            <a:schemeClr val="accent1"/>
+          </a:fillRef>
+          <a:effectRef idx="2">
+            <a:schemeClr val="accent1"/>
+          </a:effectRef>
+          <a:fontRef idx="minor">
+            <a:schemeClr val="lt1"/>
+          </a:fontRef>
+        </p:style>
+        <p:txBody>
+          <a:bodyPr rtlCol="0" anchor="ctr"/>
+          <a:lstStyle/>
+          <a:p>
+            <a:pPr algn="ctr"/>
+          </a:p>
+        </p:txBody>
+      </p:sp>
+      <p:sp>
+        <p:nvSpPr>
+          <p:cNvPr id="7" name="TextBox 6"/>
+          <p:cNvSpPr txBox="1"/>
+          <p:nvPr/>
+        </p:nvSpPr>
+        <p:spPr>
+          <a:xfrm>
+            <a:off x="640080" y="2606040"/>
+            <a:ext cx="7863840" cy="731520"/>
+          </a:xfrm>
+          <a:prstGeom prst="rect">
+            <a:avLst/>
+          </a:prstGeom>
+          <a:noFill/>
+        </p:spPr>
+        <p:txBody>
+          <a:bodyPr wrap="square">
+            <a:spAutoFit/>
+          </a:bodyPr>
+          <a:lstStyle/>
+          <a:p>
+            <a:pPr>
+              <a:defRPr sz="1400" b="1">
+                <a:solidFill>
+                  <a:srgbClr val="343A40"/>
+                </a:solidFill>
+              </a:defRPr>
+            </a:pPr>
+            <a:r>
+              <a:t>Bedingung:</a:t>
+            </a:r>
+          </a:p>
+          <a:p>
+            <a:pPr>
+              <a:defRPr sz="1600">
+                <a:solidFill>
+                  <a:srgbClr val="005293"/>
+                </a:solidFill>
+              </a:defRPr>
+            </a:pPr>
+            <a:r>
+              <a:t>M8 mindestens Level 2</a:t>
+            </a:r>
+          </a:p>
+        </p:txBody>
+      </p:sp>
+      <p:sp>
+        <p:nvSpPr>
+          <p:cNvPr id="8" name="Rounded Rectangle 7"/>
+          <p:cNvSpPr/>
+          <p:nvPr/>
+        </p:nvSpPr>
+        <p:spPr>
+          <a:xfrm>
+            <a:off x="457200" y="3657600"/>
+            <a:ext cx="3931920" cy="1463040"/>
+          </a:xfrm>
+          <a:prstGeom prst="roundRect">
+            <a:avLst/>
+          </a:prstGeom>
+          <a:solidFill>
+            <a:srgbClr val="00994C"/>
+          </a:solidFill>
+          <a:ln>
+            <a:noFill/>
+          </a:ln>
+        </p:spPr>
+        <p:style>
+          <a:lnRef idx="1">
+            <a:schemeClr val="accent1"/>
+          </a:lnRef>
+          <a:fillRef idx="3">
+            <a:schemeClr val="accent1"/>
+          </a:fillRef>
+          <a:effectRef idx="2">
+            <a:schemeClr val="accent1"/>
+          </a:effectRef>
+          <a:fontRef idx="minor">
+            <a:schemeClr val="lt1"/>
+          </a:fontRef>
+        </p:style>
+        <p:txBody>
+          <a:bodyPr rtlCol="0" anchor="ctr"/>
+          <a:lstStyle/>
+          <a:p>
+            <a:pPr algn="ctr"/>
+          </a:p>
+        </p:txBody>
+      </p:sp>
+      <p:sp>
+        <p:nvSpPr>
+          <p:cNvPr id="9" name="TextBox 8"/>
+          <p:cNvSpPr txBox="1"/>
+          <p:nvPr/>
+        </p:nvSpPr>
+        <p:spPr>
+          <a:xfrm>
+            <a:off x="594360" y="3749040"/>
+            <a:ext cx="3657600" cy="1280160"/>
+          </a:xfrm>
+          <a:prstGeom prst="rect">
+            <a:avLst/>
+          </a:prstGeom>
+          <a:noFill/>
+        </p:spPr>
+        <p:txBody>
+          <a:bodyPr wrap="square">
+            <a:spAutoFit/>
+          </a:bodyPr>
+          <a:lstStyle/>
+          <a:p>
+            <a:pPr>
+              <a:defRPr sz="1300" b="1">
+                <a:solidFill>
+                  <a:srgbClr val="FFFFFF"/>
+                </a:solidFill>
+              </a:defRPr>
+            </a:pPr>
+            <a:r>
+              <a:t>Erfüllt:</a:t>
+            </a:r>
+          </a:p>
+          <a:p>
+            <a:pPr>
+              <a:defRPr sz="1800" b="1">
+                <a:solidFill>
+                  <a:srgbClr val="FFFFFF"/>
+                </a:solidFill>
+              </a:defRPr>
+            </a:pPr>
+            <a:r>
+              <a:t>KZ +3</a:t>
+            </a:r>
+          </a:p>
+          <a:p>
+            <a:pPr>
+              <a:defRPr sz="1100">
+                <a:solidFill>
+                  <a:srgbClr val="FFFFFF"/>
+                </a:solidFill>
+              </a:defRPr>
+            </a:pPr>
+            <a:r>
+              <a:t>Vertraglich gesicherte Meldepflicht begrenzt Schaden</a:t>
+            </a:r>
+          </a:p>
+        </p:txBody>
+      </p:sp>
+      <p:sp>
+        <p:nvSpPr>
+          <p:cNvPr id="10" name="Rounded Rectangle 9"/>
+          <p:cNvSpPr/>
+          <p:nvPr/>
+        </p:nvSpPr>
+        <p:spPr>
+          <a:xfrm>
+            <a:off x="4754880" y="3657600"/>
+            <a:ext cx="3931920" cy="1463040"/>
+          </a:xfrm>
+          <a:prstGeom prst="roundRect">
+            <a:avLst/>
+          </a:prstGeom>
+          <a:solidFill>
+            <a:srgbClr val="DC3545"/>
+          </a:solidFill>
+          <a:ln>
+            <a:noFill/>
+          </a:ln>
+        </p:spPr>
+        <p:style>
+          <a:lnRef idx="1">
+            <a:schemeClr val="accent1"/>
+          </a:lnRef>
+          <a:fillRef idx="3">
+            <a:schemeClr val="accent1"/>
+          </a:fillRef>
+          <a:effectRef idx="2">
+            <a:schemeClr val="accent1"/>
+          </a:effectRef>
+          <a:fontRef idx="minor">
+            <a:schemeClr val="lt1"/>
+          </a:fontRef>
+        </p:style>
+        <p:txBody>
+          <a:bodyPr rtlCol="0" anchor="ctr"/>
+          <a:lstStyle/>
+          <a:p>
+            <a:pPr algn="ctr"/>
+          </a:p>
+        </p:txBody>
+      </p:sp>
+      <p:sp>
+        <p:nvSpPr>
+          <p:cNvPr id="11" name="TextBox 10"/>
+          <p:cNvSpPr txBox="1"/>
+          <p:nvPr/>
+        </p:nvSpPr>
+        <p:spPr>
+          <a:xfrm>
+            <a:off x="4892040" y="3749040"/>
+            <a:ext cx="3657600" cy="1280160"/>
+          </a:xfrm>
+          <a:prstGeom prst="rect">
+            <a:avLst/>
+          </a:prstGeom>
+          <a:noFill/>
+        </p:spPr>
+        <p:txBody>
+          <a:bodyPr wrap="square">
+            <a:spAutoFit/>
+          </a:bodyPr>
+          <a:lstStyle/>
+          <a:p>
+            <a:pPr>
+              <a:defRPr sz="1300" b="1">
+                <a:solidFill>
+                  <a:srgbClr val="FFFFFF"/>
+                </a:solidFill>
+              </a:defRPr>
+            </a:pPr>
+            <a:r>
+              <a:t>Nicht erfüllt:</a:t>
+            </a:r>
+          </a:p>
+          <a:p>
+            <a:pPr>
+              <a:defRPr sz="1800" b="1">
+                <a:solidFill>
+                  <a:srgbClr val="FFFFFF"/>
+                </a:solidFill>
+              </a:defRPr>
+            </a:pPr>
+            <a:r>
+              <a:t>KZ -3</a:t>
+            </a:r>
+          </a:p>
+          <a:p>
+            <a:pPr>
+              <a:defRPr sz="1100">
+                <a:solidFill>
+                  <a:srgbClr val="FFFFFF"/>
+                </a:solidFill>
+              </a:defRPr>
+            </a:pPr>
+            <a:r>
+              <a:t>Unklare Auswirkungen verunsichern Management</a:t>
             </a:r>
           </a:p>
         </p:txBody>

</xml_diff>